<commit_message>
Cramer's rule 계속 작성 중
</commit_message>
<xml_diff>
--- a/pics/2021-06-08-Cramers_rule/pics.pptx
+++ b/pics/2021-06-08-Cramers_rule/pics.pptx
@@ -6,9 +6,10 @@
   </p:sldMasterIdLst>
   <p:sldIdLst>
     <p:sldId id="256" r:id="rId2"/>
-    <p:sldId id="257" r:id="rId3"/>
-    <p:sldId id="258" r:id="rId4"/>
-    <p:sldId id="259" r:id="rId5"/>
+    <p:sldId id="260" r:id="rId3"/>
+    <p:sldId id="257" r:id="rId4"/>
+    <p:sldId id="258" r:id="rId5"/>
+    <p:sldId id="259" r:id="rId6"/>
   </p:sldIdLst>
   <p:sldSz cx="12192000" cy="6858000"/>
   <p:notesSz cx="6858000" cy="9144000"/>
@@ -109,7 +110,7 @@
   </p:defaultTextStyle>
   <p:extLst>
     <p:ext uri="{EFAFB233-063F-42B5-8137-9DF3F51BA10A}">
-      <p15:sldGuideLst xmlns:p15="http://schemas.microsoft.com/office/powerpoint/2012/main"/>
+      <p15:sldGuideLst xmlns:p15="http://schemas.microsoft.com/office/powerpoint/2012/main" xmlns=""/>
     </p:ext>
   </p:extLst>
 </p:presentation>
@@ -137,7 +138,7 @@
           <p:cNvPr id="2" name="제목 1">
             <a:extLst>
               <a:ext uri="{FF2B5EF4-FFF2-40B4-BE49-F238E27FC236}">
-                <a16:creationId xmlns:a16="http://schemas.microsoft.com/office/drawing/2014/main" id="{6FE79F05-B8C6-463C-838B-1ABC72965328}"/>
+                <a16:creationId xmlns:a16="http://schemas.microsoft.com/office/drawing/2014/main" xmlns="" id="{6FE79F05-B8C6-463C-838B-1ABC72965328}"/>
               </a:ext>
             </a:extLst>
           </p:cNvPr>
@@ -174,7 +175,7 @@
           <p:cNvPr id="3" name="부제목 2">
             <a:extLst>
               <a:ext uri="{FF2B5EF4-FFF2-40B4-BE49-F238E27FC236}">
-                <a16:creationId xmlns:a16="http://schemas.microsoft.com/office/drawing/2014/main" id="{4EF00956-AB36-40F7-9279-88EF4CBEF7D8}"/>
+                <a16:creationId xmlns:a16="http://schemas.microsoft.com/office/drawing/2014/main" xmlns="" id="{4EF00956-AB36-40F7-9279-88EF4CBEF7D8}"/>
               </a:ext>
             </a:extLst>
           </p:cNvPr>
@@ -244,7 +245,7 @@
           <p:cNvPr id="4" name="날짜 개체 틀 3">
             <a:extLst>
               <a:ext uri="{FF2B5EF4-FFF2-40B4-BE49-F238E27FC236}">
-                <a16:creationId xmlns:a16="http://schemas.microsoft.com/office/drawing/2014/main" id="{459A6303-8BCE-4924-8E08-DFE1988C933C}"/>
+                <a16:creationId xmlns:a16="http://schemas.microsoft.com/office/drawing/2014/main" xmlns="" id="{459A6303-8BCE-4924-8E08-DFE1988C933C}"/>
               </a:ext>
             </a:extLst>
           </p:cNvPr>
@@ -262,7 +263,7 @@
           <a:p>
             <a:fld id="{14B8F19A-11B1-4A63-9EC9-31A501072D42}" type="datetimeFigureOut">
               <a:rPr lang="ko-KR" altLang="en-US" smtClean="0"/>
-              <a:t>2021-07-11</a:t>
+              <a:t>2021-07-12</a:t>
             </a:fld>
             <a:endParaRPr lang="ko-KR" altLang="en-US"/>
           </a:p>
@@ -273,7 +274,7 @@
           <p:cNvPr id="5" name="바닥글 개체 틀 4">
             <a:extLst>
               <a:ext uri="{FF2B5EF4-FFF2-40B4-BE49-F238E27FC236}">
-                <a16:creationId xmlns:a16="http://schemas.microsoft.com/office/drawing/2014/main" id="{D7836100-49F3-460D-9A29-1ED52250381A}"/>
+                <a16:creationId xmlns:a16="http://schemas.microsoft.com/office/drawing/2014/main" xmlns="" id="{D7836100-49F3-460D-9A29-1ED52250381A}"/>
               </a:ext>
             </a:extLst>
           </p:cNvPr>
@@ -298,7 +299,7 @@
           <p:cNvPr id="6" name="슬라이드 번호 개체 틀 5">
             <a:extLst>
               <a:ext uri="{FF2B5EF4-FFF2-40B4-BE49-F238E27FC236}">
-                <a16:creationId xmlns:a16="http://schemas.microsoft.com/office/drawing/2014/main" id="{0E2911F3-29AF-4BAE-B1C5-0879476D964B}"/>
+                <a16:creationId xmlns:a16="http://schemas.microsoft.com/office/drawing/2014/main" xmlns="" id="{0E2911F3-29AF-4BAE-B1C5-0879476D964B}"/>
               </a:ext>
             </a:extLst>
           </p:cNvPr>
@@ -357,7 +358,7 @@
           <p:cNvPr id="2" name="제목 1">
             <a:extLst>
               <a:ext uri="{FF2B5EF4-FFF2-40B4-BE49-F238E27FC236}">
-                <a16:creationId xmlns:a16="http://schemas.microsoft.com/office/drawing/2014/main" id="{4B0050C8-1C88-4E5B-948A-F9875B15D018}"/>
+                <a16:creationId xmlns:a16="http://schemas.microsoft.com/office/drawing/2014/main" xmlns="" id="{4B0050C8-1C88-4E5B-948A-F9875B15D018}"/>
               </a:ext>
             </a:extLst>
           </p:cNvPr>
@@ -385,7 +386,7 @@
           <p:cNvPr id="3" name="세로 텍스트 개체 틀 2">
             <a:extLst>
               <a:ext uri="{FF2B5EF4-FFF2-40B4-BE49-F238E27FC236}">
-                <a16:creationId xmlns:a16="http://schemas.microsoft.com/office/drawing/2014/main" id="{47A7AC2C-782C-4099-9C66-C6B2E883C28C}"/>
+                <a16:creationId xmlns:a16="http://schemas.microsoft.com/office/drawing/2014/main" xmlns="" id="{47A7AC2C-782C-4099-9C66-C6B2E883C28C}"/>
               </a:ext>
             </a:extLst>
           </p:cNvPr>
@@ -442,7 +443,7 @@
           <p:cNvPr id="4" name="날짜 개체 틀 3">
             <a:extLst>
               <a:ext uri="{FF2B5EF4-FFF2-40B4-BE49-F238E27FC236}">
-                <a16:creationId xmlns:a16="http://schemas.microsoft.com/office/drawing/2014/main" id="{BACB70F0-E62C-43AF-B277-23458F414E7B}"/>
+                <a16:creationId xmlns:a16="http://schemas.microsoft.com/office/drawing/2014/main" xmlns="" id="{BACB70F0-E62C-43AF-B277-23458F414E7B}"/>
               </a:ext>
             </a:extLst>
           </p:cNvPr>
@@ -460,7 +461,7 @@
           <a:p>
             <a:fld id="{14B8F19A-11B1-4A63-9EC9-31A501072D42}" type="datetimeFigureOut">
               <a:rPr lang="ko-KR" altLang="en-US" smtClean="0"/>
-              <a:t>2021-07-11</a:t>
+              <a:t>2021-07-12</a:t>
             </a:fld>
             <a:endParaRPr lang="ko-KR" altLang="en-US"/>
           </a:p>
@@ -471,7 +472,7 @@
           <p:cNvPr id="5" name="바닥글 개체 틀 4">
             <a:extLst>
               <a:ext uri="{FF2B5EF4-FFF2-40B4-BE49-F238E27FC236}">
-                <a16:creationId xmlns:a16="http://schemas.microsoft.com/office/drawing/2014/main" id="{0007FCA5-B768-4B40-904B-BB86ADADCF73}"/>
+                <a16:creationId xmlns:a16="http://schemas.microsoft.com/office/drawing/2014/main" xmlns="" id="{0007FCA5-B768-4B40-904B-BB86ADADCF73}"/>
               </a:ext>
             </a:extLst>
           </p:cNvPr>
@@ -496,7 +497,7 @@
           <p:cNvPr id="6" name="슬라이드 번호 개체 틀 5">
             <a:extLst>
               <a:ext uri="{FF2B5EF4-FFF2-40B4-BE49-F238E27FC236}">
-                <a16:creationId xmlns:a16="http://schemas.microsoft.com/office/drawing/2014/main" id="{BC19B3AC-59A3-42B8-9891-5D6AFC91D7BC}"/>
+                <a16:creationId xmlns:a16="http://schemas.microsoft.com/office/drawing/2014/main" xmlns="" id="{BC19B3AC-59A3-42B8-9891-5D6AFC91D7BC}"/>
               </a:ext>
             </a:extLst>
           </p:cNvPr>
@@ -555,7 +556,7 @@
           <p:cNvPr id="2" name="세로 제목 1">
             <a:extLst>
               <a:ext uri="{FF2B5EF4-FFF2-40B4-BE49-F238E27FC236}">
-                <a16:creationId xmlns:a16="http://schemas.microsoft.com/office/drawing/2014/main" id="{42E1C204-4079-4205-950C-13691AE7984F}"/>
+                <a16:creationId xmlns:a16="http://schemas.microsoft.com/office/drawing/2014/main" xmlns="" id="{42E1C204-4079-4205-950C-13691AE7984F}"/>
               </a:ext>
             </a:extLst>
           </p:cNvPr>
@@ -588,7 +589,7 @@
           <p:cNvPr id="3" name="세로 텍스트 개체 틀 2">
             <a:extLst>
               <a:ext uri="{FF2B5EF4-FFF2-40B4-BE49-F238E27FC236}">
-                <a16:creationId xmlns:a16="http://schemas.microsoft.com/office/drawing/2014/main" id="{39DC96BA-CFFB-4517-A857-2DB0976BC478}"/>
+                <a16:creationId xmlns:a16="http://schemas.microsoft.com/office/drawing/2014/main" xmlns="" id="{39DC96BA-CFFB-4517-A857-2DB0976BC478}"/>
               </a:ext>
             </a:extLst>
           </p:cNvPr>
@@ -650,7 +651,7 @@
           <p:cNvPr id="4" name="날짜 개체 틀 3">
             <a:extLst>
               <a:ext uri="{FF2B5EF4-FFF2-40B4-BE49-F238E27FC236}">
-                <a16:creationId xmlns:a16="http://schemas.microsoft.com/office/drawing/2014/main" id="{C791CFC7-29A7-4690-A6A3-C90D594BAD11}"/>
+                <a16:creationId xmlns:a16="http://schemas.microsoft.com/office/drawing/2014/main" xmlns="" id="{C791CFC7-29A7-4690-A6A3-C90D594BAD11}"/>
               </a:ext>
             </a:extLst>
           </p:cNvPr>
@@ -668,7 +669,7 @@
           <a:p>
             <a:fld id="{14B8F19A-11B1-4A63-9EC9-31A501072D42}" type="datetimeFigureOut">
               <a:rPr lang="ko-KR" altLang="en-US" smtClean="0"/>
-              <a:t>2021-07-11</a:t>
+              <a:t>2021-07-12</a:t>
             </a:fld>
             <a:endParaRPr lang="ko-KR" altLang="en-US"/>
           </a:p>
@@ -679,7 +680,7 @@
           <p:cNvPr id="5" name="바닥글 개체 틀 4">
             <a:extLst>
               <a:ext uri="{FF2B5EF4-FFF2-40B4-BE49-F238E27FC236}">
-                <a16:creationId xmlns:a16="http://schemas.microsoft.com/office/drawing/2014/main" id="{B6913331-FC24-4605-A633-E91AEA7A6883}"/>
+                <a16:creationId xmlns:a16="http://schemas.microsoft.com/office/drawing/2014/main" xmlns="" id="{B6913331-FC24-4605-A633-E91AEA7A6883}"/>
               </a:ext>
             </a:extLst>
           </p:cNvPr>
@@ -704,7 +705,7 @@
           <p:cNvPr id="6" name="슬라이드 번호 개체 틀 5">
             <a:extLst>
               <a:ext uri="{FF2B5EF4-FFF2-40B4-BE49-F238E27FC236}">
-                <a16:creationId xmlns:a16="http://schemas.microsoft.com/office/drawing/2014/main" id="{425008FA-754D-45A3-8DB2-FD1F282F048B}"/>
+                <a16:creationId xmlns:a16="http://schemas.microsoft.com/office/drawing/2014/main" xmlns="" id="{425008FA-754D-45A3-8DB2-FD1F282F048B}"/>
               </a:ext>
             </a:extLst>
           </p:cNvPr>
@@ -763,7 +764,7 @@
           <p:cNvPr id="2" name="제목 1">
             <a:extLst>
               <a:ext uri="{FF2B5EF4-FFF2-40B4-BE49-F238E27FC236}">
-                <a16:creationId xmlns:a16="http://schemas.microsoft.com/office/drawing/2014/main" id="{D46662A9-E008-41E9-AA3F-C402BD21CF77}"/>
+                <a16:creationId xmlns:a16="http://schemas.microsoft.com/office/drawing/2014/main" xmlns="" id="{D46662A9-E008-41E9-AA3F-C402BD21CF77}"/>
               </a:ext>
             </a:extLst>
           </p:cNvPr>
@@ -791,7 +792,7 @@
           <p:cNvPr id="3" name="내용 개체 틀 2">
             <a:extLst>
               <a:ext uri="{FF2B5EF4-FFF2-40B4-BE49-F238E27FC236}">
-                <a16:creationId xmlns:a16="http://schemas.microsoft.com/office/drawing/2014/main" id="{6D5E99DA-E4DF-4BCA-98E7-881D67BD68F3}"/>
+                <a16:creationId xmlns:a16="http://schemas.microsoft.com/office/drawing/2014/main" xmlns="" id="{6D5E99DA-E4DF-4BCA-98E7-881D67BD68F3}"/>
               </a:ext>
             </a:extLst>
           </p:cNvPr>
@@ -848,7 +849,7 @@
           <p:cNvPr id="4" name="날짜 개체 틀 3">
             <a:extLst>
               <a:ext uri="{FF2B5EF4-FFF2-40B4-BE49-F238E27FC236}">
-                <a16:creationId xmlns:a16="http://schemas.microsoft.com/office/drawing/2014/main" id="{908A1ED4-1A4D-42A6-A057-A25E217D6EEF}"/>
+                <a16:creationId xmlns:a16="http://schemas.microsoft.com/office/drawing/2014/main" xmlns="" id="{908A1ED4-1A4D-42A6-A057-A25E217D6EEF}"/>
               </a:ext>
             </a:extLst>
           </p:cNvPr>
@@ -866,7 +867,7 @@
           <a:p>
             <a:fld id="{14B8F19A-11B1-4A63-9EC9-31A501072D42}" type="datetimeFigureOut">
               <a:rPr lang="ko-KR" altLang="en-US" smtClean="0"/>
-              <a:t>2021-07-11</a:t>
+              <a:t>2021-07-12</a:t>
             </a:fld>
             <a:endParaRPr lang="ko-KR" altLang="en-US"/>
           </a:p>
@@ -877,7 +878,7 @@
           <p:cNvPr id="5" name="바닥글 개체 틀 4">
             <a:extLst>
               <a:ext uri="{FF2B5EF4-FFF2-40B4-BE49-F238E27FC236}">
-                <a16:creationId xmlns:a16="http://schemas.microsoft.com/office/drawing/2014/main" id="{3795E551-5FF5-49FB-B65D-1B1DBD726FDF}"/>
+                <a16:creationId xmlns:a16="http://schemas.microsoft.com/office/drawing/2014/main" xmlns="" id="{3795E551-5FF5-49FB-B65D-1B1DBD726FDF}"/>
               </a:ext>
             </a:extLst>
           </p:cNvPr>
@@ -902,7 +903,7 @@
           <p:cNvPr id="6" name="슬라이드 번호 개체 틀 5">
             <a:extLst>
               <a:ext uri="{FF2B5EF4-FFF2-40B4-BE49-F238E27FC236}">
-                <a16:creationId xmlns:a16="http://schemas.microsoft.com/office/drawing/2014/main" id="{14625CC1-7B59-4CAC-B877-27AACA77C712}"/>
+                <a16:creationId xmlns:a16="http://schemas.microsoft.com/office/drawing/2014/main" xmlns="" id="{14625CC1-7B59-4CAC-B877-27AACA77C712}"/>
               </a:ext>
             </a:extLst>
           </p:cNvPr>
@@ -961,7 +962,7 @@
           <p:cNvPr id="2" name="제목 1">
             <a:extLst>
               <a:ext uri="{FF2B5EF4-FFF2-40B4-BE49-F238E27FC236}">
-                <a16:creationId xmlns:a16="http://schemas.microsoft.com/office/drawing/2014/main" id="{52BC985E-B6C9-4162-B926-39BD2E678C68}"/>
+                <a16:creationId xmlns:a16="http://schemas.microsoft.com/office/drawing/2014/main" xmlns="" id="{52BC985E-B6C9-4162-B926-39BD2E678C68}"/>
               </a:ext>
             </a:extLst>
           </p:cNvPr>
@@ -998,7 +999,7 @@
           <p:cNvPr id="3" name="텍스트 개체 틀 2">
             <a:extLst>
               <a:ext uri="{FF2B5EF4-FFF2-40B4-BE49-F238E27FC236}">
-                <a16:creationId xmlns:a16="http://schemas.microsoft.com/office/drawing/2014/main" id="{A2E6A6DC-EB67-4703-B403-ABFD4DAD5492}"/>
+                <a16:creationId xmlns:a16="http://schemas.microsoft.com/office/drawing/2014/main" xmlns="" id="{A2E6A6DC-EB67-4703-B403-ABFD4DAD5492}"/>
               </a:ext>
             </a:extLst>
           </p:cNvPr>
@@ -1123,7 +1124,7 @@
           <p:cNvPr id="4" name="날짜 개체 틀 3">
             <a:extLst>
               <a:ext uri="{FF2B5EF4-FFF2-40B4-BE49-F238E27FC236}">
-                <a16:creationId xmlns:a16="http://schemas.microsoft.com/office/drawing/2014/main" id="{0DE78881-5A94-4910-8D98-1147F307F48A}"/>
+                <a16:creationId xmlns:a16="http://schemas.microsoft.com/office/drawing/2014/main" xmlns="" id="{0DE78881-5A94-4910-8D98-1147F307F48A}"/>
               </a:ext>
             </a:extLst>
           </p:cNvPr>
@@ -1141,7 +1142,7 @@
           <a:p>
             <a:fld id="{14B8F19A-11B1-4A63-9EC9-31A501072D42}" type="datetimeFigureOut">
               <a:rPr lang="ko-KR" altLang="en-US" smtClean="0"/>
-              <a:t>2021-07-11</a:t>
+              <a:t>2021-07-12</a:t>
             </a:fld>
             <a:endParaRPr lang="ko-KR" altLang="en-US"/>
           </a:p>
@@ -1152,7 +1153,7 @@
           <p:cNvPr id="5" name="바닥글 개체 틀 4">
             <a:extLst>
               <a:ext uri="{FF2B5EF4-FFF2-40B4-BE49-F238E27FC236}">
-                <a16:creationId xmlns:a16="http://schemas.microsoft.com/office/drawing/2014/main" id="{C37A719E-DF0D-418A-B8BE-642C03CF7A3F}"/>
+                <a16:creationId xmlns:a16="http://schemas.microsoft.com/office/drawing/2014/main" xmlns="" id="{C37A719E-DF0D-418A-B8BE-642C03CF7A3F}"/>
               </a:ext>
             </a:extLst>
           </p:cNvPr>
@@ -1177,7 +1178,7 @@
           <p:cNvPr id="6" name="슬라이드 번호 개체 틀 5">
             <a:extLst>
               <a:ext uri="{FF2B5EF4-FFF2-40B4-BE49-F238E27FC236}">
-                <a16:creationId xmlns:a16="http://schemas.microsoft.com/office/drawing/2014/main" id="{FE1AE32E-3D73-4B0B-9F56-B16994EF4672}"/>
+                <a16:creationId xmlns:a16="http://schemas.microsoft.com/office/drawing/2014/main" xmlns="" id="{FE1AE32E-3D73-4B0B-9F56-B16994EF4672}"/>
               </a:ext>
             </a:extLst>
           </p:cNvPr>
@@ -1236,7 +1237,7 @@
           <p:cNvPr id="2" name="제목 1">
             <a:extLst>
               <a:ext uri="{FF2B5EF4-FFF2-40B4-BE49-F238E27FC236}">
-                <a16:creationId xmlns:a16="http://schemas.microsoft.com/office/drawing/2014/main" id="{ECC0029C-9BB3-4FE1-A480-8E9BAC35D97A}"/>
+                <a16:creationId xmlns:a16="http://schemas.microsoft.com/office/drawing/2014/main" xmlns="" id="{ECC0029C-9BB3-4FE1-A480-8E9BAC35D97A}"/>
               </a:ext>
             </a:extLst>
           </p:cNvPr>
@@ -1264,7 +1265,7 @@
           <p:cNvPr id="3" name="내용 개체 틀 2">
             <a:extLst>
               <a:ext uri="{FF2B5EF4-FFF2-40B4-BE49-F238E27FC236}">
-                <a16:creationId xmlns:a16="http://schemas.microsoft.com/office/drawing/2014/main" id="{B6A0C288-3B22-44B5-A612-428E3049DA24}"/>
+                <a16:creationId xmlns:a16="http://schemas.microsoft.com/office/drawing/2014/main" xmlns="" id="{B6A0C288-3B22-44B5-A612-428E3049DA24}"/>
               </a:ext>
             </a:extLst>
           </p:cNvPr>
@@ -1326,7 +1327,7 @@
           <p:cNvPr id="4" name="내용 개체 틀 3">
             <a:extLst>
               <a:ext uri="{FF2B5EF4-FFF2-40B4-BE49-F238E27FC236}">
-                <a16:creationId xmlns:a16="http://schemas.microsoft.com/office/drawing/2014/main" id="{0BDE9CC0-B8D9-43DA-8BA7-D73234B89DD6}"/>
+                <a16:creationId xmlns:a16="http://schemas.microsoft.com/office/drawing/2014/main" xmlns="" id="{0BDE9CC0-B8D9-43DA-8BA7-D73234B89DD6}"/>
               </a:ext>
             </a:extLst>
           </p:cNvPr>
@@ -1388,7 +1389,7 @@
           <p:cNvPr id="5" name="날짜 개체 틀 4">
             <a:extLst>
               <a:ext uri="{FF2B5EF4-FFF2-40B4-BE49-F238E27FC236}">
-                <a16:creationId xmlns:a16="http://schemas.microsoft.com/office/drawing/2014/main" id="{49E730BF-6518-4FC1-A50B-82F8B5ACC181}"/>
+                <a16:creationId xmlns:a16="http://schemas.microsoft.com/office/drawing/2014/main" xmlns="" id="{49E730BF-6518-4FC1-A50B-82F8B5ACC181}"/>
               </a:ext>
             </a:extLst>
           </p:cNvPr>
@@ -1406,7 +1407,7 @@
           <a:p>
             <a:fld id="{14B8F19A-11B1-4A63-9EC9-31A501072D42}" type="datetimeFigureOut">
               <a:rPr lang="ko-KR" altLang="en-US" smtClean="0"/>
-              <a:t>2021-07-11</a:t>
+              <a:t>2021-07-12</a:t>
             </a:fld>
             <a:endParaRPr lang="ko-KR" altLang="en-US"/>
           </a:p>
@@ -1417,7 +1418,7 @@
           <p:cNvPr id="6" name="바닥글 개체 틀 5">
             <a:extLst>
               <a:ext uri="{FF2B5EF4-FFF2-40B4-BE49-F238E27FC236}">
-                <a16:creationId xmlns:a16="http://schemas.microsoft.com/office/drawing/2014/main" id="{EBE39B25-2544-45FB-B80F-A4E52C6E04F6}"/>
+                <a16:creationId xmlns:a16="http://schemas.microsoft.com/office/drawing/2014/main" xmlns="" id="{EBE39B25-2544-45FB-B80F-A4E52C6E04F6}"/>
               </a:ext>
             </a:extLst>
           </p:cNvPr>
@@ -1442,7 +1443,7 @@
           <p:cNvPr id="7" name="슬라이드 번호 개체 틀 6">
             <a:extLst>
               <a:ext uri="{FF2B5EF4-FFF2-40B4-BE49-F238E27FC236}">
-                <a16:creationId xmlns:a16="http://schemas.microsoft.com/office/drawing/2014/main" id="{D9A822BA-3524-4CAB-9743-35171EACAE62}"/>
+                <a16:creationId xmlns:a16="http://schemas.microsoft.com/office/drawing/2014/main" xmlns="" id="{D9A822BA-3524-4CAB-9743-35171EACAE62}"/>
               </a:ext>
             </a:extLst>
           </p:cNvPr>
@@ -1501,7 +1502,7 @@
           <p:cNvPr id="2" name="제목 1">
             <a:extLst>
               <a:ext uri="{FF2B5EF4-FFF2-40B4-BE49-F238E27FC236}">
-                <a16:creationId xmlns:a16="http://schemas.microsoft.com/office/drawing/2014/main" id="{4E1BA0AC-5493-4858-8A57-DE2FE1EB7D6A}"/>
+                <a16:creationId xmlns:a16="http://schemas.microsoft.com/office/drawing/2014/main" xmlns="" id="{4E1BA0AC-5493-4858-8A57-DE2FE1EB7D6A}"/>
               </a:ext>
             </a:extLst>
           </p:cNvPr>
@@ -1534,7 +1535,7 @@
           <p:cNvPr id="3" name="텍스트 개체 틀 2">
             <a:extLst>
               <a:ext uri="{FF2B5EF4-FFF2-40B4-BE49-F238E27FC236}">
-                <a16:creationId xmlns:a16="http://schemas.microsoft.com/office/drawing/2014/main" id="{CB7B8518-4CE4-4361-BA62-68FA821EF780}"/>
+                <a16:creationId xmlns:a16="http://schemas.microsoft.com/office/drawing/2014/main" xmlns="" id="{CB7B8518-4CE4-4361-BA62-68FA821EF780}"/>
               </a:ext>
             </a:extLst>
           </p:cNvPr>
@@ -1605,7 +1606,7 @@
           <p:cNvPr id="4" name="내용 개체 틀 3">
             <a:extLst>
               <a:ext uri="{FF2B5EF4-FFF2-40B4-BE49-F238E27FC236}">
-                <a16:creationId xmlns:a16="http://schemas.microsoft.com/office/drawing/2014/main" id="{BA005471-91C6-4267-BBF7-5296E84A50B0}"/>
+                <a16:creationId xmlns:a16="http://schemas.microsoft.com/office/drawing/2014/main" xmlns="" id="{BA005471-91C6-4267-BBF7-5296E84A50B0}"/>
               </a:ext>
             </a:extLst>
           </p:cNvPr>
@@ -1667,7 +1668,7 @@
           <p:cNvPr id="5" name="텍스트 개체 틀 4">
             <a:extLst>
               <a:ext uri="{FF2B5EF4-FFF2-40B4-BE49-F238E27FC236}">
-                <a16:creationId xmlns:a16="http://schemas.microsoft.com/office/drawing/2014/main" id="{362687F0-F9E7-4DEA-A49C-95CCD72FEA9E}"/>
+                <a16:creationId xmlns:a16="http://schemas.microsoft.com/office/drawing/2014/main" xmlns="" id="{362687F0-F9E7-4DEA-A49C-95CCD72FEA9E}"/>
               </a:ext>
             </a:extLst>
           </p:cNvPr>
@@ -1738,7 +1739,7 @@
           <p:cNvPr id="6" name="내용 개체 틀 5">
             <a:extLst>
               <a:ext uri="{FF2B5EF4-FFF2-40B4-BE49-F238E27FC236}">
-                <a16:creationId xmlns:a16="http://schemas.microsoft.com/office/drawing/2014/main" id="{6016A153-47F7-408C-A355-BCB73C936F72}"/>
+                <a16:creationId xmlns:a16="http://schemas.microsoft.com/office/drawing/2014/main" xmlns="" id="{6016A153-47F7-408C-A355-BCB73C936F72}"/>
               </a:ext>
             </a:extLst>
           </p:cNvPr>
@@ -1800,7 +1801,7 @@
           <p:cNvPr id="7" name="날짜 개체 틀 6">
             <a:extLst>
               <a:ext uri="{FF2B5EF4-FFF2-40B4-BE49-F238E27FC236}">
-                <a16:creationId xmlns:a16="http://schemas.microsoft.com/office/drawing/2014/main" id="{8762983B-6523-4F76-A0BF-1E1158B10DB6}"/>
+                <a16:creationId xmlns:a16="http://schemas.microsoft.com/office/drawing/2014/main" xmlns="" id="{8762983B-6523-4F76-A0BF-1E1158B10DB6}"/>
               </a:ext>
             </a:extLst>
           </p:cNvPr>
@@ -1818,7 +1819,7 @@
           <a:p>
             <a:fld id="{14B8F19A-11B1-4A63-9EC9-31A501072D42}" type="datetimeFigureOut">
               <a:rPr lang="ko-KR" altLang="en-US" smtClean="0"/>
-              <a:t>2021-07-11</a:t>
+              <a:t>2021-07-12</a:t>
             </a:fld>
             <a:endParaRPr lang="ko-KR" altLang="en-US"/>
           </a:p>
@@ -1829,7 +1830,7 @@
           <p:cNvPr id="8" name="바닥글 개체 틀 7">
             <a:extLst>
               <a:ext uri="{FF2B5EF4-FFF2-40B4-BE49-F238E27FC236}">
-                <a16:creationId xmlns:a16="http://schemas.microsoft.com/office/drawing/2014/main" id="{61D43231-F418-4002-B857-F4EEF418112A}"/>
+                <a16:creationId xmlns:a16="http://schemas.microsoft.com/office/drawing/2014/main" xmlns="" id="{61D43231-F418-4002-B857-F4EEF418112A}"/>
               </a:ext>
             </a:extLst>
           </p:cNvPr>
@@ -1854,7 +1855,7 @@
           <p:cNvPr id="9" name="슬라이드 번호 개체 틀 8">
             <a:extLst>
               <a:ext uri="{FF2B5EF4-FFF2-40B4-BE49-F238E27FC236}">
-                <a16:creationId xmlns:a16="http://schemas.microsoft.com/office/drawing/2014/main" id="{FE8E0AE3-4661-4FC0-A801-A2CA73876182}"/>
+                <a16:creationId xmlns:a16="http://schemas.microsoft.com/office/drawing/2014/main" xmlns="" id="{FE8E0AE3-4661-4FC0-A801-A2CA73876182}"/>
               </a:ext>
             </a:extLst>
           </p:cNvPr>
@@ -1913,7 +1914,7 @@
           <p:cNvPr id="2" name="제목 1">
             <a:extLst>
               <a:ext uri="{FF2B5EF4-FFF2-40B4-BE49-F238E27FC236}">
-                <a16:creationId xmlns:a16="http://schemas.microsoft.com/office/drawing/2014/main" id="{6749F096-52DC-4E4F-A109-BE0457B1ED2A}"/>
+                <a16:creationId xmlns:a16="http://schemas.microsoft.com/office/drawing/2014/main" xmlns="" id="{6749F096-52DC-4E4F-A109-BE0457B1ED2A}"/>
               </a:ext>
             </a:extLst>
           </p:cNvPr>
@@ -1941,7 +1942,7 @@
           <p:cNvPr id="3" name="날짜 개체 틀 2">
             <a:extLst>
               <a:ext uri="{FF2B5EF4-FFF2-40B4-BE49-F238E27FC236}">
-                <a16:creationId xmlns:a16="http://schemas.microsoft.com/office/drawing/2014/main" id="{AE928917-2F69-49EB-B253-DED510345673}"/>
+                <a16:creationId xmlns:a16="http://schemas.microsoft.com/office/drawing/2014/main" xmlns="" id="{AE928917-2F69-49EB-B253-DED510345673}"/>
               </a:ext>
             </a:extLst>
           </p:cNvPr>
@@ -1959,7 +1960,7 @@
           <a:p>
             <a:fld id="{14B8F19A-11B1-4A63-9EC9-31A501072D42}" type="datetimeFigureOut">
               <a:rPr lang="ko-KR" altLang="en-US" smtClean="0"/>
-              <a:t>2021-07-11</a:t>
+              <a:t>2021-07-12</a:t>
             </a:fld>
             <a:endParaRPr lang="ko-KR" altLang="en-US"/>
           </a:p>
@@ -1970,7 +1971,7 @@
           <p:cNvPr id="4" name="바닥글 개체 틀 3">
             <a:extLst>
               <a:ext uri="{FF2B5EF4-FFF2-40B4-BE49-F238E27FC236}">
-                <a16:creationId xmlns:a16="http://schemas.microsoft.com/office/drawing/2014/main" id="{A8CFB7EA-BADA-4927-971B-0666373F16AF}"/>
+                <a16:creationId xmlns:a16="http://schemas.microsoft.com/office/drawing/2014/main" xmlns="" id="{A8CFB7EA-BADA-4927-971B-0666373F16AF}"/>
               </a:ext>
             </a:extLst>
           </p:cNvPr>
@@ -1995,7 +1996,7 @@
           <p:cNvPr id="5" name="슬라이드 번호 개체 틀 4">
             <a:extLst>
               <a:ext uri="{FF2B5EF4-FFF2-40B4-BE49-F238E27FC236}">
-                <a16:creationId xmlns:a16="http://schemas.microsoft.com/office/drawing/2014/main" id="{86944D3F-E721-4E29-935C-ACD0826EEFD0}"/>
+                <a16:creationId xmlns:a16="http://schemas.microsoft.com/office/drawing/2014/main" xmlns="" id="{86944D3F-E721-4E29-935C-ACD0826EEFD0}"/>
               </a:ext>
             </a:extLst>
           </p:cNvPr>
@@ -2054,7 +2055,7 @@
           <p:cNvPr id="2" name="날짜 개체 틀 1">
             <a:extLst>
               <a:ext uri="{FF2B5EF4-FFF2-40B4-BE49-F238E27FC236}">
-                <a16:creationId xmlns:a16="http://schemas.microsoft.com/office/drawing/2014/main" id="{336559A3-A3EA-4BC2-A7E8-48CCE8A39FD4}"/>
+                <a16:creationId xmlns:a16="http://schemas.microsoft.com/office/drawing/2014/main" xmlns="" id="{336559A3-A3EA-4BC2-A7E8-48CCE8A39FD4}"/>
               </a:ext>
             </a:extLst>
           </p:cNvPr>
@@ -2072,7 +2073,7 @@
           <a:p>
             <a:fld id="{14B8F19A-11B1-4A63-9EC9-31A501072D42}" type="datetimeFigureOut">
               <a:rPr lang="ko-KR" altLang="en-US" smtClean="0"/>
-              <a:t>2021-07-11</a:t>
+              <a:t>2021-07-12</a:t>
             </a:fld>
             <a:endParaRPr lang="ko-KR" altLang="en-US"/>
           </a:p>
@@ -2083,7 +2084,7 @@
           <p:cNvPr id="3" name="바닥글 개체 틀 2">
             <a:extLst>
               <a:ext uri="{FF2B5EF4-FFF2-40B4-BE49-F238E27FC236}">
-                <a16:creationId xmlns:a16="http://schemas.microsoft.com/office/drawing/2014/main" id="{A133F221-5DCA-4426-BF40-82AC2A685FFA}"/>
+                <a16:creationId xmlns:a16="http://schemas.microsoft.com/office/drawing/2014/main" xmlns="" id="{A133F221-5DCA-4426-BF40-82AC2A685FFA}"/>
               </a:ext>
             </a:extLst>
           </p:cNvPr>
@@ -2108,7 +2109,7 @@
           <p:cNvPr id="4" name="슬라이드 번호 개체 틀 3">
             <a:extLst>
               <a:ext uri="{FF2B5EF4-FFF2-40B4-BE49-F238E27FC236}">
-                <a16:creationId xmlns:a16="http://schemas.microsoft.com/office/drawing/2014/main" id="{ACE4CAFB-73A5-421E-816D-BCACB8C81A6E}"/>
+                <a16:creationId xmlns:a16="http://schemas.microsoft.com/office/drawing/2014/main" xmlns="" id="{ACE4CAFB-73A5-421E-816D-BCACB8C81A6E}"/>
               </a:ext>
             </a:extLst>
           </p:cNvPr>
@@ -2167,7 +2168,7 @@
           <p:cNvPr id="2" name="제목 1">
             <a:extLst>
               <a:ext uri="{FF2B5EF4-FFF2-40B4-BE49-F238E27FC236}">
-                <a16:creationId xmlns:a16="http://schemas.microsoft.com/office/drawing/2014/main" id="{94B594C2-514A-415C-B252-63253ABBE276}"/>
+                <a16:creationId xmlns:a16="http://schemas.microsoft.com/office/drawing/2014/main" xmlns="" id="{94B594C2-514A-415C-B252-63253ABBE276}"/>
               </a:ext>
             </a:extLst>
           </p:cNvPr>
@@ -2204,7 +2205,7 @@
           <p:cNvPr id="3" name="내용 개체 틀 2">
             <a:extLst>
               <a:ext uri="{FF2B5EF4-FFF2-40B4-BE49-F238E27FC236}">
-                <a16:creationId xmlns:a16="http://schemas.microsoft.com/office/drawing/2014/main" id="{BE35DF8E-E2C5-4F0F-8041-4C199A9C1F06}"/>
+                <a16:creationId xmlns:a16="http://schemas.microsoft.com/office/drawing/2014/main" xmlns="" id="{BE35DF8E-E2C5-4F0F-8041-4C199A9C1F06}"/>
               </a:ext>
             </a:extLst>
           </p:cNvPr>
@@ -2294,7 +2295,7 @@
           <p:cNvPr id="4" name="텍스트 개체 틀 3">
             <a:extLst>
               <a:ext uri="{FF2B5EF4-FFF2-40B4-BE49-F238E27FC236}">
-                <a16:creationId xmlns:a16="http://schemas.microsoft.com/office/drawing/2014/main" id="{55D3203D-FAC0-40B1-B36A-95438C5F8E2C}"/>
+                <a16:creationId xmlns:a16="http://schemas.microsoft.com/office/drawing/2014/main" xmlns="" id="{55D3203D-FAC0-40B1-B36A-95438C5F8E2C}"/>
               </a:ext>
             </a:extLst>
           </p:cNvPr>
@@ -2365,7 +2366,7 @@
           <p:cNvPr id="5" name="날짜 개체 틀 4">
             <a:extLst>
               <a:ext uri="{FF2B5EF4-FFF2-40B4-BE49-F238E27FC236}">
-                <a16:creationId xmlns:a16="http://schemas.microsoft.com/office/drawing/2014/main" id="{512CAF81-12B4-422B-B0DA-80CEC245B756}"/>
+                <a16:creationId xmlns:a16="http://schemas.microsoft.com/office/drawing/2014/main" xmlns="" id="{512CAF81-12B4-422B-B0DA-80CEC245B756}"/>
               </a:ext>
             </a:extLst>
           </p:cNvPr>
@@ -2383,7 +2384,7 @@
           <a:p>
             <a:fld id="{14B8F19A-11B1-4A63-9EC9-31A501072D42}" type="datetimeFigureOut">
               <a:rPr lang="ko-KR" altLang="en-US" smtClean="0"/>
-              <a:t>2021-07-11</a:t>
+              <a:t>2021-07-12</a:t>
             </a:fld>
             <a:endParaRPr lang="ko-KR" altLang="en-US"/>
           </a:p>
@@ -2394,7 +2395,7 @@
           <p:cNvPr id="6" name="바닥글 개체 틀 5">
             <a:extLst>
               <a:ext uri="{FF2B5EF4-FFF2-40B4-BE49-F238E27FC236}">
-                <a16:creationId xmlns:a16="http://schemas.microsoft.com/office/drawing/2014/main" id="{11942B12-7C8B-4491-A238-23134E6CF708}"/>
+                <a16:creationId xmlns:a16="http://schemas.microsoft.com/office/drawing/2014/main" xmlns="" id="{11942B12-7C8B-4491-A238-23134E6CF708}"/>
               </a:ext>
             </a:extLst>
           </p:cNvPr>
@@ -2419,7 +2420,7 @@
           <p:cNvPr id="7" name="슬라이드 번호 개체 틀 6">
             <a:extLst>
               <a:ext uri="{FF2B5EF4-FFF2-40B4-BE49-F238E27FC236}">
-                <a16:creationId xmlns:a16="http://schemas.microsoft.com/office/drawing/2014/main" id="{C1CC6DF5-D5D7-42D5-8E77-51F174F3BAFE}"/>
+                <a16:creationId xmlns:a16="http://schemas.microsoft.com/office/drawing/2014/main" xmlns="" id="{C1CC6DF5-D5D7-42D5-8E77-51F174F3BAFE}"/>
               </a:ext>
             </a:extLst>
           </p:cNvPr>
@@ -2478,7 +2479,7 @@
           <p:cNvPr id="2" name="제목 1">
             <a:extLst>
               <a:ext uri="{FF2B5EF4-FFF2-40B4-BE49-F238E27FC236}">
-                <a16:creationId xmlns:a16="http://schemas.microsoft.com/office/drawing/2014/main" id="{1EF960D1-1695-42AB-8426-437EBD24CC0E}"/>
+                <a16:creationId xmlns:a16="http://schemas.microsoft.com/office/drawing/2014/main" xmlns="" id="{1EF960D1-1695-42AB-8426-437EBD24CC0E}"/>
               </a:ext>
             </a:extLst>
           </p:cNvPr>
@@ -2515,7 +2516,7 @@
           <p:cNvPr id="3" name="그림 개체 틀 2">
             <a:extLst>
               <a:ext uri="{FF2B5EF4-FFF2-40B4-BE49-F238E27FC236}">
-                <a16:creationId xmlns:a16="http://schemas.microsoft.com/office/drawing/2014/main" id="{4CCA1A8C-D003-4686-B5C5-12EAF1C65222}"/>
+                <a16:creationId xmlns:a16="http://schemas.microsoft.com/office/drawing/2014/main" xmlns="" id="{4CCA1A8C-D003-4686-B5C5-12EAF1C65222}"/>
               </a:ext>
             </a:extLst>
           </p:cNvPr>
@@ -2582,7 +2583,7 @@
           <p:cNvPr id="4" name="텍스트 개체 틀 3">
             <a:extLst>
               <a:ext uri="{FF2B5EF4-FFF2-40B4-BE49-F238E27FC236}">
-                <a16:creationId xmlns:a16="http://schemas.microsoft.com/office/drawing/2014/main" id="{0B1AE501-51C1-4EE4-90CF-8F785A2109E4}"/>
+                <a16:creationId xmlns:a16="http://schemas.microsoft.com/office/drawing/2014/main" xmlns="" id="{0B1AE501-51C1-4EE4-90CF-8F785A2109E4}"/>
               </a:ext>
             </a:extLst>
           </p:cNvPr>
@@ -2653,7 +2654,7 @@
           <p:cNvPr id="5" name="날짜 개체 틀 4">
             <a:extLst>
               <a:ext uri="{FF2B5EF4-FFF2-40B4-BE49-F238E27FC236}">
-                <a16:creationId xmlns:a16="http://schemas.microsoft.com/office/drawing/2014/main" id="{E68D4366-9670-4D32-BCEF-8CFCF1B53132}"/>
+                <a16:creationId xmlns:a16="http://schemas.microsoft.com/office/drawing/2014/main" xmlns="" id="{E68D4366-9670-4D32-BCEF-8CFCF1B53132}"/>
               </a:ext>
             </a:extLst>
           </p:cNvPr>
@@ -2671,7 +2672,7 @@
           <a:p>
             <a:fld id="{14B8F19A-11B1-4A63-9EC9-31A501072D42}" type="datetimeFigureOut">
               <a:rPr lang="ko-KR" altLang="en-US" smtClean="0"/>
-              <a:t>2021-07-11</a:t>
+              <a:t>2021-07-12</a:t>
             </a:fld>
             <a:endParaRPr lang="ko-KR" altLang="en-US"/>
           </a:p>
@@ -2682,7 +2683,7 @@
           <p:cNvPr id="6" name="바닥글 개체 틀 5">
             <a:extLst>
               <a:ext uri="{FF2B5EF4-FFF2-40B4-BE49-F238E27FC236}">
-                <a16:creationId xmlns:a16="http://schemas.microsoft.com/office/drawing/2014/main" id="{58B91F72-7941-48CA-A6CC-A07E26C9FBBF}"/>
+                <a16:creationId xmlns:a16="http://schemas.microsoft.com/office/drawing/2014/main" xmlns="" id="{58B91F72-7941-48CA-A6CC-A07E26C9FBBF}"/>
               </a:ext>
             </a:extLst>
           </p:cNvPr>
@@ -2707,7 +2708,7 @@
           <p:cNvPr id="7" name="슬라이드 번호 개체 틀 6">
             <a:extLst>
               <a:ext uri="{FF2B5EF4-FFF2-40B4-BE49-F238E27FC236}">
-                <a16:creationId xmlns:a16="http://schemas.microsoft.com/office/drawing/2014/main" id="{52D0FA22-A4AD-44E0-BCE7-C79A720F88D6}"/>
+                <a16:creationId xmlns:a16="http://schemas.microsoft.com/office/drawing/2014/main" xmlns="" id="{52D0FA22-A4AD-44E0-BCE7-C79A720F88D6}"/>
               </a:ext>
             </a:extLst>
           </p:cNvPr>
@@ -2771,7 +2772,7 @@
           <p:cNvPr id="2" name="제목 개체 틀 1">
             <a:extLst>
               <a:ext uri="{FF2B5EF4-FFF2-40B4-BE49-F238E27FC236}">
-                <a16:creationId xmlns:a16="http://schemas.microsoft.com/office/drawing/2014/main" id="{A00C0756-944F-4B2E-A39F-A8CE98A68611}"/>
+                <a16:creationId xmlns:a16="http://schemas.microsoft.com/office/drawing/2014/main" xmlns="" id="{A00C0756-944F-4B2E-A39F-A8CE98A68611}"/>
               </a:ext>
             </a:extLst>
           </p:cNvPr>
@@ -2809,7 +2810,7 @@
           <p:cNvPr id="3" name="텍스트 개체 틀 2">
             <a:extLst>
               <a:ext uri="{FF2B5EF4-FFF2-40B4-BE49-F238E27FC236}">
-                <a16:creationId xmlns:a16="http://schemas.microsoft.com/office/drawing/2014/main" id="{CF2948D7-FF9C-4F73-A5A7-6E4BB597DA55}"/>
+                <a16:creationId xmlns:a16="http://schemas.microsoft.com/office/drawing/2014/main" xmlns="" id="{CF2948D7-FF9C-4F73-A5A7-6E4BB597DA55}"/>
               </a:ext>
             </a:extLst>
           </p:cNvPr>
@@ -2876,7 +2877,7 @@
           <p:cNvPr id="4" name="날짜 개체 틀 3">
             <a:extLst>
               <a:ext uri="{FF2B5EF4-FFF2-40B4-BE49-F238E27FC236}">
-                <a16:creationId xmlns:a16="http://schemas.microsoft.com/office/drawing/2014/main" id="{722D6B10-DE49-4CEF-837E-3B8A4BDA3084}"/>
+                <a16:creationId xmlns:a16="http://schemas.microsoft.com/office/drawing/2014/main" xmlns="" id="{722D6B10-DE49-4CEF-837E-3B8A4BDA3084}"/>
               </a:ext>
             </a:extLst>
           </p:cNvPr>
@@ -2912,7 +2913,7 @@
           <a:p>
             <a:fld id="{14B8F19A-11B1-4A63-9EC9-31A501072D42}" type="datetimeFigureOut">
               <a:rPr lang="ko-KR" altLang="en-US" smtClean="0"/>
-              <a:t>2021-07-11</a:t>
+              <a:t>2021-07-12</a:t>
             </a:fld>
             <a:endParaRPr lang="ko-KR" altLang="en-US"/>
           </a:p>
@@ -2923,7 +2924,7 @@
           <p:cNvPr id="5" name="바닥글 개체 틀 4">
             <a:extLst>
               <a:ext uri="{FF2B5EF4-FFF2-40B4-BE49-F238E27FC236}">
-                <a16:creationId xmlns:a16="http://schemas.microsoft.com/office/drawing/2014/main" id="{E8844822-0B67-4A6F-A2C4-F345456C2003}"/>
+                <a16:creationId xmlns:a16="http://schemas.microsoft.com/office/drawing/2014/main" xmlns="" id="{E8844822-0B67-4A6F-A2C4-F345456C2003}"/>
               </a:ext>
             </a:extLst>
           </p:cNvPr>
@@ -2966,7 +2967,7 @@
           <p:cNvPr id="6" name="슬라이드 번호 개체 틀 5">
             <a:extLst>
               <a:ext uri="{FF2B5EF4-FFF2-40B4-BE49-F238E27FC236}">
-                <a16:creationId xmlns:a16="http://schemas.microsoft.com/office/drawing/2014/main" id="{7F160A98-7324-4AE8-940D-B77A195714CB}"/>
+                <a16:creationId xmlns:a16="http://schemas.microsoft.com/office/drawing/2014/main" xmlns="" id="{7F160A98-7324-4AE8-940D-B77A195714CB}"/>
               </a:ext>
             </a:extLst>
           </p:cNvPr>
@@ -3334,7 +3335,7 @@
           <p:cNvPr id="21" name="직선 화살표 연결선 20">
             <a:extLst>
               <a:ext uri="{FF2B5EF4-FFF2-40B4-BE49-F238E27FC236}">
-                <a16:creationId xmlns:a16="http://schemas.microsoft.com/office/drawing/2014/main" id="{63FBEDD2-9FDD-4417-8099-C8AAE33FABFC}"/>
+                <a16:creationId xmlns:a16="http://schemas.microsoft.com/office/drawing/2014/main" xmlns="" id="{63FBEDD2-9FDD-4417-8099-C8AAE33FABFC}"/>
               </a:ext>
             </a:extLst>
           </p:cNvPr>
@@ -3379,7 +3380,7 @@
           <p:cNvPr id="18" name="직선 화살표 연결선 17">
             <a:extLst>
               <a:ext uri="{FF2B5EF4-FFF2-40B4-BE49-F238E27FC236}">
-                <a16:creationId xmlns:a16="http://schemas.microsoft.com/office/drawing/2014/main" id="{B4DDF3C4-C30E-465B-BFD6-9C6F153ECD21}"/>
+                <a16:creationId xmlns:a16="http://schemas.microsoft.com/office/drawing/2014/main" xmlns="" id="{B4DDF3C4-C30E-465B-BFD6-9C6F153ECD21}"/>
               </a:ext>
             </a:extLst>
           </p:cNvPr>
@@ -3424,7 +3425,7 @@
           <p:cNvPr id="13" name="직선 화살표 연결선 12">
             <a:extLst>
               <a:ext uri="{FF2B5EF4-FFF2-40B4-BE49-F238E27FC236}">
-                <a16:creationId xmlns:a16="http://schemas.microsoft.com/office/drawing/2014/main" id="{479EAD9D-DDD0-4CAE-8E4A-409E686834DF}"/>
+                <a16:creationId xmlns:a16="http://schemas.microsoft.com/office/drawing/2014/main" xmlns="" id="{479EAD9D-DDD0-4CAE-8E4A-409E686834DF}"/>
               </a:ext>
             </a:extLst>
           </p:cNvPr>
@@ -3463,7 +3464,7 @@
           <p:cNvPr id="14" name="직선 화살표 연결선 13">
             <a:extLst>
               <a:ext uri="{FF2B5EF4-FFF2-40B4-BE49-F238E27FC236}">
-                <a16:creationId xmlns:a16="http://schemas.microsoft.com/office/drawing/2014/main" id="{CF1D3714-B5A2-440B-A543-9AD09A05DCF9}"/>
+                <a16:creationId xmlns:a16="http://schemas.microsoft.com/office/drawing/2014/main" xmlns="" id="{CF1D3714-B5A2-440B-A543-9AD09A05DCF9}"/>
               </a:ext>
             </a:extLst>
           </p:cNvPr>
@@ -3509,7 +3510,7 @@
               <p:cNvPr id="39" name="TextBox 38">
                 <a:extLst>
                   <a:ext uri="{FF2B5EF4-FFF2-40B4-BE49-F238E27FC236}">
-                    <a16:creationId xmlns:a16="http://schemas.microsoft.com/office/drawing/2014/main" id="{FF1C23B8-2998-4007-8A52-6E605179BA34}"/>
+                    <a16:creationId xmlns:a16="http://schemas.microsoft.com/office/drawing/2014/main" xmlns="" id="{FF1C23B8-2998-4007-8A52-6E605179BA34}"/>
                   </a:ext>
                 </a:extLst>
               </p:cNvPr>
@@ -3548,7 +3549,7 @@
                               <a:solidFill>
                                 <a:schemeClr val="accent1"/>
                               </a:solidFill>
-                              <a:latin typeface="Cambria Math" panose="02040503050406030204" pitchFamily="18" charset="0"/>
+                              <a:latin typeface="Cambria Math"/>
                             </a:rPr>
                           </m:ctrlPr>
                         </m:dPr>
@@ -3568,7 +3569,7 @@
                                   <a:solidFill>
                                     <a:schemeClr val="accent1"/>
                                   </a:solidFill>
-                                  <a:latin typeface="Cambria Math" panose="02040503050406030204" pitchFamily="18" charset="0"/>
+                                  <a:latin typeface="Cambria Math"/>
                                 </a:rPr>
                               </m:ctrlPr>
                             </m:mPr>
@@ -3668,7 +3669,7 @@
               <p:cNvPr id="41" name="TextBox 40">
                 <a:extLst>
                   <a:ext uri="{FF2B5EF4-FFF2-40B4-BE49-F238E27FC236}">
-                    <a16:creationId xmlns:a16="http://schemas.microsoft.com/office/drawing/2014/main" id="{A6FFDD7E-9292-42FD-8C42-EC950A10460A}"/>
+                    <a16:creationId xmlns:a16="http://schemas.microsoft.com/office/drawing/2014/main" xmlns="" id="{A6FFDD7E-9292-42FD-8C42-EC950A10460A}"/>
                   </a:ext>
                 </a:extLst>
               </p:cNvPr>
@@ -3705,7 +3706,7 @@
                               <a:solidFill>
                                 <a:schemeClr val="accent1"/>
                               </a:solidFill>
-                              <a:latin typeface="Cambria Math" panose="02040503050406030204" pitchFamily="18" charset="0"/>
+                              <a:latin typeface="Cambria Math"/>
                             </a:rPr>
                           </m:ctrlPr>
                         </m:sSubPr>
@@ -3741,7 +3742,7 @@
                               <a:solidFill>
                                 <a:schemeClr val="accent1"/>
                               </a:solidFill>
-                              <a:latin typeface="Cambria Math" panose="02040503050406030204" pitchFamily="18" charset="0"/>
+                              <a:latin typeface="Cambria Math"/>
                             </a:rPr>
                           </m:ctrlPr>
                         </m:dPr>
@@ -3761,7 +3762,7 @@
                                   <a:solidFill>
                                     <a:schemeClr val="accent1"/>
                                   </a:solidFill>
-                                  <a:latin typeface="Cambria Math" panose="02040503050406030204" pitchFamily="18" charset="0"/>
+                                  <a:latin typeface="Cambria Math"/>
                                 </a:rPr>
                               </m:ctrlPr>
                             </m:mPr>
@@ -3861,7 +3862,7 @@
               <p:cNvPr id="42" name="TextBox 41">
                 <a:extLst>
                   <a:ext uri="{FF2B5EF4-FFF2-40B4-BE49-F238E27FC236}">
-                    <a16:creationId xmlns:a16="http://schemas.microsoft.com/office/drawing/2014/main" id="{3167C7FE-2BED-4D69-9D09-8E641660B37F}"/>
+                    <a16:creationId xmlns:a16="http://schemas.microsoft.com/office/drawing/2014/main" xmlns="" id="{3167C7FE-2BED-4D69-9D09-8E641660B37F}"/>
                   </a:ext>
                 </a:extLst>
               </p:cNvPr>
@@ -3900,7 +3901,7 @@
                               <a:solidFill>
                                 <a:schemeClr val="accent2"/>
                               </a:solidFill>
-                              <a:latin typeface="Cambria Math" panose="02040503050406030204" pitchFamily="18" charset="0"/>
+                              <a:latin typeface="Cambria Math"/>
                             </a:rPr>
                           </m:ctrlPr>
                         </m:dPr>
@@ -3920,7 +3921,7 @@
                                   <a:solidFill>
                                     <a:schemeClr val="accent2"/>
                                   </a:solidFill>
-                                  <a:latin typeface="Cambria Math" panose="02040503050406030204" pitchFamily="18" charset="0"/>
+                                  <a:latin typeface="Cambria Math"/>
                                 </a:rPr>
                               </m:ctrlPr>
                             </m:mPr>
@@ -4017,7 +4018,7 @@
               <p:cNvPr id="43" name="TextBox 42">
                 <a:extLst>
                   <a:ext uri="{FF2B5EF4-FFF2-40B4-BE49-F238E27FC236}">
-                    <a16:creationId xmlns:a16="http://schemas.microsoft.com/office/drawing/2014/main" id="{68C30D00-2045-4CBB-818E-7E315DBE5CB3}"/>
+                    <a16:creationId xmlns:a16="http://schemas.microsoft.com/office/drawing/2014/main" xmlns="" id="{68C30D00-2045-4CBB-818E-7E315DBE5CB3}"/>
                   </a:ext>
                 </a:extLst>
               </p:cNvPr>
@@ -4054,7 +4055,7 @@
                               <a:solidFill>
                                 <a:schemeClr val="accent2"/>
                               </a:solidFill>
-                              <a:latin typeface="Cambria Math" panose="02040503050406030204" pitchFamily="18" charset="0"/>
+                              <a:latin typeface="Cambria Math"/>
                             </a:rPr>
                           </m:ctrlPr>
                         </m:sSubPr>
@@ -4090,7 +4091,7 @@
                               <a:solidFill>
                                 <a:schemeClr val="accent2"/>
                               </a:solidFill>
-                              <a:latin typeface="Cambria Math" panose="02040503050406030204" pitchFamily="18" charset="0"/>
+                              <a:latin typeface="Cambria Math"/>
                             </a:rPr>
                           </m:ctrlPr>
                         </m:dPr>
@@ -4110,7 +4111,7 @@
                                   <a:solidFill>
                                     <a:schemeClr val="accent2"/>
                                   </a:solidFill>
-                                  <a:latin typeface="Cambria Math" panose="02040503050406030204" pitchFamily="18" charset="0"/>
+                                  <a:latin typeface="Cambria Math"/>
                                 </a:rPr>
                               </m:ctrlPr>
                             </m:mPr>
@@ -4205,7 +4206,7 @@
           <p:cNvPr id="49" name="직선 화살표 연결선 48">
             <a:extLst>
               <a:ext uri="{FF2B5EF4-FFF2-40B4-BE49-F238E27FC236}">
-                <a16:creationId xmlns:a16="http://schemas.microsoft.com/office/drawing/2014/main" id="{25ACF200-05F2-4660-92AE-B1A7B9F5D4B9}"/>
+                <a16:creationId xmlns:a16="http://schemas.microsoft.com/office/drawing/2014/main" xmlns="" id="{25ACF200-05F2-4660-92AE-B1A7B9F5D4B9}"/>
               </a:ext>
             </a:extLst>
           </p:cNvPr>
@@ -4253,7 +4254,7 @@
           <p:cNvPr id="50" name="직선 화살표 연결선 49">
             <a:extLst>
               <a:ext uri="{FF2B5EF4-FFF2-40B4-BE49-F238E27FC236}">
-                <a16:creationId xmlns:a16="http://schemas.microsoft.com/office/drawing/2014/main" id="{0F178B99-7DC6-4819-8EC6-929DF8488493}"/>
+                <a16:creationId xmlns:a16="http://schemas.microsoft.com/office/drawing/2014/main" xmlns="" id="{0F178B99-7DC6-4819-8EC6-929DF8488493}"/>
               </a:ext>
             </a:extLst>
           </p:cNvPr>
@@ -4301,7 +4302,7 @@
           <p:cNvPr id="44" name="직선 화살표 연결선 43">
             <a:extLst>
               <a:ext uri="{FF2B5EF4-FFF2-40B4-BE49-F238E27FC236}">
-                <a16:creationId xmlns:a16="http://schemas.microsoft.com/office/drawing/2014/main" id="{408DA4CA-9C07-4C1F-816E-6FF32020E8EE}"/>
+                <a16:creationId xmlns:a16="http://schemas.microsoft.com/office/drawing/2014/main" xmlns="" id="{408DA4CA-9C07-4C1F-816E-6FF32020E8EE}"/>
               </a:ext>
             </a:extLst>
           </p:cNvPr>
@@ -4348,7 +4349,7 @@
               <p:cNvPr id="51" name="TextBox 50">
                 <a:extLst>
                   <a:ext uri="{FF2B5EF4-FFF2-40B4-BE49-F238E27FC236}">
-                    <a16:creationId xmlns:a16="http://schemas.microsoft.com/office/drawing/2014/main" id="{80815AC4-E8FC-4C18-B0E8-03F1581CAA66}"/>
+                    <a16:creationId xmlns:a16="http://schemas.microsoft.com/office/drawing/2014/main" xmlns="" id="{80815AC4-E8FC-4C18-B0E8-03F1581CAA66}"/>
                   </a:ext>
                 </a:extLst>
               </p:cNvPr>
@@ -4387,7 +4388,7 @@
                               <a:solidFill>
                                 <a:schemeClr val="tx1"/>
                               </a:solidFill>
-                              <a:latin typeface="Cambria Math" panose="02040503050406030204" pitchFamily="18" charset="0"/>
+                              <a:latin typeface="Cambria Math"/>
                             </a:rPr>
                           </m:ctrlPr>
                         </m:dPr>
@@ -4407,7 +4408,7 @@
                                   <a:solidFill>
                                     <a:schemeClr val="tx1"/>
                                   </a:solidFill>
-                                  <a:latin typeface="Cambria Math" panose="02040503050406030204" pitchFamily="18" charset="0"/>
+                                  <a:latin typeface="Cambria Math"/>
                                 </a:rPr>
                               </m:ctrlPr>
                             </m:mPr>
@@ -4420,7 +4421,7 @@
                                         <a:solidFill>
                                           <a:schemeClr val="tx1"/>
                                         </a:solidFill>
-                                        <a:latin typeface="Cambria Math" panose="02040503050406030204" pitchFamily="18" charset="0"/>
+                                        <a:latin typeface="Cambria Math"/>
                                       </a:rPr>
                                     </m:ctrlPr>
                                   </m:sSubPr>
@@ -4458,7 +4459,7 @@
                                         <a:solidFill>
                                           <a:schemeClr val="tx1"/>
                                         </a:solidFill>
-                                        <a:latin typeface="Cambria Math" panose="02040503050406030204" pitchFamily="18" charset="0"/>
+                                        <a:latin typeface="Cambria Math"/>
                                       </a:rPr>
                                     </m:ctrlPr>
                                   </m:sSubPr>
@@ -4506,7 +4507,7 @@
                               <a:solidFill>
                                 <a:schemeClr val="tx1"/>
                               </a:solidFill>
-                              <a:latin typeface="Cambria Math" panose="02040503050406030204" pitchFamily="18" charset="0"/>
+                              <a:latin typeface="Cambria Math"/>
                             </a:rPr>
                           </m:ctrlPr>
                         </m:sSubPr>
@@ -4542,7 +4543,7 @@
                               <a:solidFill>
                                 <a:schemeClr val="tx1"/>
                               </a:solidFill>
-                              <a:latin typeface="Cambria Math" panose="02040503050406030204" pitchFamily="18" charset="0"/>
+                              <a:latin typeface="Cambria Math"/>
                             </a:rPr>
                           </m:ctrlPr>
                         </m:dPr>
@@ -4562,7 +4563,7 @@
                                   <a:solidFill>
                                     <a:schemeClr val="tx1"/>
                                   </a:solidFill>
-                                  <a:latin typeface="Cambria Math" panose="02040503050406030204" pitchFamily="18" charset="0"/>
+                                  <a:latin typeface="Cambria Math"/>
                                 </a:rPr>
                               </m:ctrlPr>
                             </m:mPr>
@@ -4614,7 +4615,7 @@
                               <a:solidFill>
                                 <a:schemeClr val="tx1"/>
                               </a:solidFill>
-                              <a:latin typeface="Cambria Math" panose="02040503050406030204" pitchFamily="18" charset="0"/>
+                              <a:latin typeface="Cambria Math"/>
                             </a:rPr>
                           </m:ctrlPr>
                         </m:sSubPr>
@@ -4650,7 +4651,7 @@
                               <a:solidFill>
                                 <a:schemeClr val="tx1"/>
                               </a:solidFill>
-                              <a:latin typeface="Cambria Math" panose="02040503050406030204" pitchFamily="18" charset="0"/>
+                              <a:latin typeface="Cambria Math"/>
                             </a:rPr>
                           </m:ctrlPr>
                         </m:dPr>
@@ -4670,7 +4671,7 @@
                                   <a:solidFill>
                                     <a:schemeClr val="tx1"/>
                                   </a:solidFill>
-                                  <a:latin typeface="Cambria Math" panose="02040503050406030204" pitchFamily="18" charset="0"/>
+                                  <a:latin typeface="Cambria Math"/>
                                 </a:rPr>
                               </m:ctrlPr>
                             </m:mPr>
@@ -4797,12 +4798,2591 @@
           <a:chExt cx="0" cy="0"/>
         </a:xfrm>
       </p:grpSpPr>
+      <mc:AlternateContent xmlns:mc="http://schemas.openxmlformats.org/markup-compatibility/2006">
+        <mc:Choice xmlns:a14="http://schemas.microsoft.com/office/drawing/2010/main" Requires="a14">
+          <p:sp>
+            <p:nvSpPr>
+              <p:cNvPr id="4" name="내용 개체 틀 2">
+                <a:extLst>
+                  <a:ext uri="{FF2B5EF4-FFF2-40B4-BE49-F238E27FC236}">
+                    <a16:creationId xmlns:a16="http://schemas.microsoft.com/office/drawing/2014/main" xmlns="" id="{CCF159EF-1CF5-4F52-939B-F9AC2F719955}"/>
+                  </a:ext>
+                </a:extLst>
+              </p:cNvPr>
+              <p:cNvSpPr>
+                <a:spLocks noGrp="1"/>
+              </p:cNvSpPr>
+              <p:nvPr>
+                <p:ph idx="1"/>
+              </p:nvPr>
+            </p:nvSpPr>
+            <p:spPr>
+              <a:xfrm>
+                <a:off x="838200" y="690113"/>
+                <a:ext cx="10515600" cy="5510000"/>
+              </a:xfrm>
+            </p:spPr>
+            <p:txBody>
+              <a:bodyPr>
+                <a:normAutofit/>
+              </a:bodyPr>
+              <a:lstStyle/>
+              <a:p>
+                <a:pPr marL="0" indent="0">
+                  <a:buNone/>
+                </a:pPr>
+                <a14:m>
+                  <m:oMathPara xmlns:m="http://schemas.openxmlformats.org/officeDocument/2006/math">
+                    <m:oMathParaPr>
+                      <m:jc m:val="centerGroup"/>
+                    </m:oMathParaPr>
+                    <m:oMath xmlns:m="http://schemas.openxmlformats.org/officeDocument/2006/math">
+                      <m:r>
+                        <a:rPr lang="en-US" altLang="ko-KR" b="0" i="1" smtClean="0">
+                          <a:latin typeface="Cambria Math" panose="02040503050406030204" pitchFamily="18" charset="0"/>
+                        </a:rPr>
+                        <m:t>𝐴𝑥</m:t>
+                      </m:r>
+                      <m:r>
+                        <a:rPr lang="en-US" altLang="ko-KR" b="0" i="1" smtClean="0">
+                          <a:latin typeface="Cambria Math" panose="02040503050406030204" pitchFamily="18" charset="0"/>
+                        </a:rPr>
+                        <m:t>=</m:t>
+                      </m:r>
+                      <m:r>
+                        <a:rPr lang="en-US" altLang="ko-KR" b="0" i="1" smtClean="0">
+                          <a:latin typeface="Cambria Math" panose="02040503050406030204" pitchFamily="18" charset="0"/>
+                        </a:rPr>
+                        <m:t>𝑏</m:t>
+                      </m:r>
+                      <m:r>
+                        <a:rPr lang="en-US" altLang="ko-KR" b="0" i="1" smtClean="0">
+                          <a:latin typeface="Cambria Math" panose="02040503050406030204" pitchFamily="18" charset="0"/>
+                          <a:ea typeface="Cambria Math" panose="02040503050406030204" pitchFamily="18" charset="0"/>
+                        </a:rPr>
+                        <m:t>⟺</m:t>
+                      </m:r>
+                      <m:d>
+                        <m:dPr>
+                          <m:begChr m:val="["/>
+                          <m:endChr m:val="]"/>
+                          <m:ctrlPr>
+                            <a:rPr lang="en-US" altLang="ko-KR" b="0" i="1" smtClean="0">
+                              <a:latin typeface="Cambria Math"/>
+                            </a:rPr>
+                          </m:ctrlPr>
+                        </m:dPr>
+                        <m:e>
+                          <m:m>
+                            <m:mPr>
+                              <m:mcs>
+                                <m:mc>
+                                  <m:mcPr>
+                                    <m:count m:val="3"/>
+                                    <m:mcJc m:val="center"/>
+                                  </m:mcPr>
+                                </m:mc>
+                              </m:mcs>
+                              <m:ctrlPr>
+                                <a:rPr lang="en-US" altLang="ko-KR" b="0" i="1" smtClean="0">
+                                  <a:latin typeface="Cambria Math"/>
+                                </a:rPr>
+                              </m:ctrlPr>
+                            </m:mPr>
+                            <m:mr>
+                              <m:e>
+                                <m:m>
+                                  <m:mPr>
+                                    <m:mcs>
+                                      <m:mc>
+                                        <m:mcPr>
+                                          <m:count m:val="2"/>
+                                          <m:mcJc m:val="center"/>
+                                        </m:mcPr>
+                                      </m:mc>
+                                    </m:mcs>
+                                    <m:ctrlPr>
+                                      <a:rPr lang="en-US" altLang="ko-KR" b="0" i="1" smtClean="0">
+                                        <a:latin typeface="Cambria Math"/>
+                                      </a:rPr>
+                                    </m:ctrlPr>
+                                  </m:mPr>
+                                  <m:mr>
+                                    <m:e>
+                                      <m:sSub>
+                                        <m:sSubPr>
+                                          <m:ctrlPr>
+                                            <a:rPr lang="en-US" altLang="ko-KR" b="0" i="1" smtClean="0">
+                                              <a:latin typeface="Cambria Math"/>
+                                            </a:rPr>
+                                          </m:ctrlPr>
+                                        </m:sSubPr>
+                                        <m:e>
+                                          <m:r>
+                                            <m:rPr>
+                                              <m:brk m:alnAt="7"/>
+                                            </m:rPr>
+                                            <a:rPr lang="en-US" altLang="ko-KR" b="0" i="1" smtClean="0">
+                                              <a:latin typeface="Cambria Math" panose="02040503050406030204" pitchFamily="18" charset="0"/>
+                                            </a:rPr>
+                                            <m:t>𝑎</m:t>
+                                          </m:r>
+                                        </m:e>
+                                        <m:sub>
+                                          <m:r>
+                                            <m:rPr>
+                                              <m:brk m:alnAt="7"/>
+                                            </m:rPr>
+                                            <a:rPr lang="en-US" altLang="ko-KR" b="0" i="1" smtClean="0">
+                                              <a:latin typeface="Cambria Math" panose="02040503050406030204" pitchFamily="18" charset="0"/>
+                                            </a:rPr>
+                                            <m:t>1</m:t>
+                                          </m:r>
+                                          <m:r>
+                                            <a:rPr lang="en-US" altLang="ko-KR" b="0" i="1" smtClean="0">
+                                              <a:latin typeface="Cambria Math" panose="02040503050406030204" pitchFamily="18" charset="0"/>
+                                            </a:rPr>
+                                            <m:t>1</m:t>
+                                          </m:r>
+                                        </m:sub>
+                                      </m:sSub>
+                                    </m:e>
+                                    <m:e>
+                                      <m:r>
+                                        <a:rPr lang="en-US" altLang="ko-KR" b="0" i="1" smtClean="0">
+                                          <a:latin typeface="Cambria Math" panose="02040503050406030204" pitchFamily="18" charset="0"/>
+                                        </a:rPr>
+                                        <m:t>⋯</m:t>
+                                      </m:r>
+                                    </m:e>
+                                  </m:mr>
+                                  <m:mr>
+                                    <m:e>
+                                      <m:sSub>
+                                        <m:sSubPr>
+                                          <m:ctrlPr>
+                                            <a:rPr lang="en-US" altLang="ko-KR" b="0" i="1" smtClean="0">
+                                              <a:latin typeface="Cambria Math"/>
+                                            </a:rPr>
+                                          </m:ctrlPr>
+                                        </m:sSubPr>
+                                        <m:e>
+                                          <m:r>
+                                            <a:rPr lang="en-US" altLang="ko-KR" b="0" i="1" smtClean="0">
+                                              <a:latin typeface="Cambria Math" panose="02040503050406030204" pitchFamily="18" charset="0"/>
+                                            </a:rPr>
+                                            <m:t>𝑎</m:t>
+                                          </m:r>
+                                        </m:e>
+                                        <m:sub>
+                                          <m:r>
+                                            <a:rPr lang="en-US" altLang="ko-KR" b="0" i="1" smtClean="0">
+                                              <a:latin typeface="Cambria Math" panose="02040503050406030204" pitchFamily="18" charset="0"/>
+                                            </a:rPr>
+                                            <m:t>21</m:t>
+                                          </m:r>
+                                        </m:sub>
+                                      </m:sSub>
+                                    </m:e>
+                                    <m:e>
+                                      <m:r>
+                                        <m:rPr>
+                                          <m:brk m:alnAt="7"/>
+                                        </m:rPr>
+                                        <a:rPr lang="en-US" altLang="ko-KR" b="0" i="1" smtClean="0">
+                                          <a:latin typeface="Cambria Math" panose="02040503050406030204" pitchFamily="18" charset="0"/>
+                                        </a:rPr>
+                                        <m:t>⋯</m:t>
+                                      </m:r>
+                                    </m:e>
+                                  </m:mr>
+                                </m:m>
+                              </m:e>
+                              <m:e>
+                                <m:m>
+                                  <m:mPr>
+                                    <m:mcs>
+                                      <m:mc>
+                                        <m:mcPr>
+                                          <m:count m:val="2"/>
+                                          <m:mcJc m:val="center"/>
+                                        </m:mcPr>
+                                      </m:mc>
+                                    </m:mcs>
+                                    <m:ctrlPr>
+                                      <a:rPr lang="en-US" altLang="ko-KR" b="0" i="1" smtClean="0">
+                                        <a:latin typeface="Cambria Math"/>
+                                      </a:rPr>
+                                    </m:ctrlPr>
+                                  </m:mPr>
+                                  <m:mr>
+                                    <m:e>
+                                      <m:sSub>
+                                        <m:sSubPr>
+                                          <m:ctrlPr>
+                                            <a:rPr lang="en-US" altLang="ko-KR" b="0" i="1" smtClean="0">
+                                              <a:solidFill>
+                                                <a:srgbClr val="FF0000"/>
+                                              </a:solidFill>
+                                              <a:latin typeface="Cambria Math"/>
+                                            </a:rPr>
+                                          </m:ctrlPr>
+                                        </m:sSubPr>
+                                        <m:e>
+                                          <m:r>
+                                            <m:rPr>
+                                              <m:brk m:alnAt="7"/>
+                                            </m:rPr>
+                                            <a:rPr lang="en-US" altLang="ko-KR" b="0" i="1" smtClean="0">
+                                              <a:solidFill>
+                                                <a:srgbClr val="FF0000"/>
+                                              </a:solidFill>
+                                              <a:latin typeface="Cambria Math" panose="02040503050406030204" pitchFamily="18" charset="0"/>
+                                            </a:rPr>
+                                            <m:t>𝑎</m:t>
+                                          </m:r>
+                                        </m:e>
+                                        <m:sub>
+                                          <m:r>
+                                            <m:rPr>
+                                              <m:brk m:alnAt="7"/>
+                                            </m:rPr>
+                                            <a:rPr lang="en-US" altLang="ko-KR" b="0" i="1" smtClean="0">
+                                              <a:solidFill>
+                                                <a:srgbClr val="FF0000"/>
+                                              </a:solidFill>
+                                              <a:latin typeface="Cambria Math" panose="02040503050406030204" pitchFamily="18" charset="0"/>
+                                            </a:rPr>
+                                            <m:t>1</m:t>
+                                          </m:r>
+                                          <m:r>
+                                            <a:rPr lang="en-US" altLang="ko-KR" b="0" i="1" smtClean="0">
+                                              <a:solidFill>
+                                                <a:srgbClr val="FF0000"/>
+                                              </a:solidFill>
+                                              <a:latin typeface="Cambria Math" panose="02040503050406030204" pitchFamily="18" charset="0"/>
+                                            </a:rPr>
+                                            <m:t>𝑖</m:t>
+                                          </m:r>
+                                        </m:sub>
+                                      </m:sSub>
+                                    </m:e>
+                                    <m:e>
+                                      <m:r>
+                                        <a:rPr lang="en-US" altLang="ko-KR" b="0" i="1" smtClean="0">
+                                          <a:latin typeface="Cambria Math" panose="02040503050406030204" pitchFamily="18" charset="0"/>
+                                        </a:rPr>
+                                        <m:t>⋯</m:t>
+                                      </m:r>
+                                    </m:e>
+                                  </m:mr>
+                                  <m:mr>
+                                    <m:e>
+                                      <m:sSub>
+                                        <m:sSubPr>
+                                          <m:ctrlPr>
+                                            <a:rPr lang="en-US" altLang="ko-KR" b="0" i="1" smtClean="0">
+                                              <a:solidFill>
+                                                <a:srgbClr val="FF0000"/>
+                                              </a:solidFill>
+                                              <a:latin typeface="Cambria Math"/>
+                                            </a:rPr>
+                                          </m:ctrlPr>
+                                        </m:sSubPr>
+                                        <m:e>
+                                          <m:r>
+                                            <a:rPr lang="en-US" altLang="ko-KR" b="0" i="1" smtClean="0">
+                                              <a:solidFill>
+                                                <a:srgbClr val="FF0000"/>
+                                              </a:solidFill>
+                                              <a:latin typeface="Cambria Math" panose="02040503050406030204" pitchFamily="18" charset="0"/>
+                                            </a:rPr>
+                                            <m:t>𝑎</m:t>
+                                          </m:r>
+                                        </m:e>
+                                        <m:sub>
+                                          <m:r>
+                                            <a:rPr lang="en-US" altLang="ko-KR" b="0" i="1" smtClean="0">
+                                              <a:solidFill>
+                                                <a:srgbClr val="FF0000"/>
+                                              </a:solidFill>
+                                              <a:latin typeface="Cambria Math" panose="02040503050406030204" pitchFamily="18" charset="0"/>
+                                            </a:rPr>
+                                            <m:t>2</m:t>
+                                          </m:r>
+                                          <m:r>
+                                            <a:rPr lang="en-US" altLang="ko-KR" b="0" i="1" smtClean="0">
+                                              <a:solidFill>
+                                                <a:srgbClr val="FF0000"/>
+                                              </a:solidFill>
+                                              <a:latin typeface="Cambria Math" panose="02040503050406030204" pitchFamily="18" charset="0"/>
+                                            </a:rPr>
+                                            <m:t>𝑖</m:t>
+                                          </m:r>
+                                        </m:sub>
+                                      </m:sSub>
+                                    </m:e>
+                                    <m:e>
+                                      <m:r>
+                                        <a:rPr lang="en-US" altLang="ko-KR" b="0" i="1" smtClean="0">
+                                          <a:latin typeface="Cambria Math" panose="02040503050406030204" pitchFamily="18" charset="0"/>
+                                        </a:rPr>
+                                        <m:t>⋯</m:t>
+                                      </m:r>
+                                    </m:e>
+                                  </m:mr>
+                                </m:m>
+                              </m:e>
+                              <m:e>
+                                <m:m>
+                                  <m:mPr>
+                                    <m:mcs>
+                                      <m:mc>
+                                        <m:mcPr>
+                                          <m:count m:val="1"/>
+                                          <m:mcJc m:val="center"/>
+                                        </m:mcPr>
+                                      </m:mc>
+                                    </m:mcs>
+                                    <m:ctrlPr>
+                                      <a:rPr lang="en-US" altLang="ko-KR" b="0" i="1" smtClean="0">
+                                        <a:latin typeface="Cambria Math"/>
+                                      </a:rPr>
+                                    </m:ctrlPr>
+                                  </m:mPr>
+                                  <m:mr>
+                                    <m:e>
+                                      <m:sSub>
+                                        <m:sSubPr>
+                                          <m:ctrlPr>
+                                            <a:rPr lang="en-US" altLang="ko-KR" b="0" i="1" smtClean="0">
+                                              <a:latin typeface="Cambria Math"/>
+                                            </a:rPr>
+                                          </m:ctrlPr>
+                                        </m:sSubPr>
+                                        <m:e>
+                                          <m:r>
+                                            <m:rPr>
+                                              <m:brk m:alnAt="7"/>
+                                            </m:rPr>
+                                            <a:rPr lang="en-US" altLang="ko-KR" b="0" i="1" smtClean="0">
+                                              <a:latin typeface="Cambria Math" panose="02040503050406030204" pitchFamily="18" charset="0"/>
+                                            </a:rPr>
+                                            <m:t>𝑎</m:t>
+                                          </m:r>
+                                        </m:e>
+                                        <m:sub>
+                                          <m:r>
+                                            <m:rPr>
+                                              <m:brk m:alnAt="7"/>
+                                            </m:rPr>
+                                            <a:rPr lang="en-US" altLang="ko-KR" b="0" i="1" smtClean="0">
+                                              <a:latin typeface="Cambria Math" panose="02040503050406030204" pitchFamily="18" charset="0"/>
+                                            </a:rPr>
+                                            <m:t>1</m:t>
+                                          </m:r>
+                                          <m:r>
+                                            <a:rPr lang="en-US" altLang="ko-KR" b="0" i="1" smtClean="0">
+                                              <a:latin typeface="Cambria Math" panose="02040503050406030204" pitchFamily="18" charset="0"/>
+                                            </a:rPr>
+                                            <m:t>𝑛</m:t>
+                                          </m:r>
+                                        </m:sub>
+                                      </m:sSub>
+                                    </m:e>
+                                  </m:mr>
+                                  <m:mr>
+                                    <m:e>
+                                      <m:sSub>
+                                        <m:sSubPr>
+                                          <m:ctrlPr>
+                                            <a:rPr lang="en-US" altLang="ko-KR" b="0" i="1" smtClean="0">
+                                              <a:latin typeface="Cambria Math"/>
+                                            </a:rPr>
+                                          </m:ctrlPr>
+                                        </m:sSubPr>
+                                        <m:e>
+                                          <m:r>
+                                            <a:rPr lang="en-US" altLang="ko-KR" b="0" i="1" smtClean="0">
+                                              <a:latin typeface="Cambria Math" panose="02040503050406030204" pitchFamily="18" charset="0"/>
+                                            </a:rPr>
+                                            <m:t>𝑎</m:t>
+                                          </m:r>
+                                        </m:e>
+                                        <m:sub>
+                                          <m:r>
+                                            <a:rPr lang="en-US" altLang="ko-KR" b="0" i="1" smtClean="0">
+                                              <a:latin typeface="Cambria Math" panose="02040503050406030204" pitchFamily="18" charset="0"/>
+                                            </a:rPr>
+                                            <m:t>2</m:t>
+                                          </m:r>
+                                          <m:r>
+                                            <a:rPr lang="en-US" altLang="ko-KR" b="0" i="1" smtClean="0">
+                                              <a:latin typeface="Cambria Math" panose="02040503050406030204" pitchFamily="18" charset="0"/>
+                                            </a:rPr>
+                                            <m:t>𝑛</m:t>
+                                          </m:r>
+                                        </m:sub>
+                                      </m:sSub>
+                                    </m:e>
+                                  </m:mr>
+                                </m:m>
+                              </m:e>
+                            </m:mr>
+                            <m:mr>
+                              <m:e>
+                                <m:m>
+                                  <m:mPr>
+                                    <m:mcs>
+                                      <m:mc>
+                                        <m:mcPr>
+                                          <m:count m:val="2"/>
+                                          <m:mcJc m:val="center"/>
+                                        </m:mcPr>
+                                      </m:mc>
+                                    </m:mcs>
+                                    <m:ctrlPr>
+                                      <a:rPr lang="en-US" altLang="ko-KR" b="0" i="1" smtClean="0">
+                                        <a:latin typeface="Cambria Math"/>
+                                      </a:rPr>
+                                    </m:ctrlPr>
+                                  </m:mPr>
+                                  <m:mr>
+                                    <m:e>
+                                      <m:r>
+                                        <a:rPr lang="en-US" altLang="ko-KR" b="0" i="1" smtClean="0">
+                                          <a:latin typeface="Cambria Math" panose="02040503050406030204" pitchFamily="18" charset="0"/>
+                                        </a:rPr>
+                                        <m:t>⋮  </m:t>
+                                      </m:r>
+                                    </m:e>
+                                    <m:e>
+                                      <m:r>
+                                        <a:rPr lang="en-US" altLang="ko-KR" b="0" i="1" smtClean="0">
+                                          <a:latin typeface="Cambria Math" panose="02040503050406030204" pitchFamily="18" charset="0"/>
+                                        </a:rPr>
+                                        <m:t> </m:t>
+                                      </m:r>
+                                    </m:e>
+                                  </m:mr>
+                                </m:m>
+                              </m:e>
+                              <m:e>
+                                <m:m>
+                                  <m:mPr>
+                                    <m:mcs>
+                                      <m:mc>
+                                        <m:mcPr>
+                                          <m:count m:val="2"/>
+                                          <m:mcJc m:val="center"/>
+                                        </m:mcPr>
+                                      </m:mc>
+                                    </m:mcs>
+                                    <m:ctrlPr>
+                                      <a:rPr lang="en-US" altLang="ko-KR" b="0" i="1" smtClean="0">
+                                        <a:solidFill>
+                                          <a:srgbClr val="FF0000"/>
+                                        </a:solidFill>
+                                        <a:latin typeface="Cambria Math"/>
+                                      </a:rPr>
+                                    </m:ctrlPr>
+                                  </m:mPr>
+                                  <m:mr>
+                                    <m:e>
+                                      <m:r>
+                                        <a:rPr lang="en-US" altLang="ko-KR" b="0" i="1" smtClean="0">
+                                          <a:solidFill>
+                                            <a:srgbClr val="FF0000"/>
+                                          </a:solidFill>
+                                          <a:latin typeface="Cambria Math" panose="02040503050406030204" pitchFamily="18" charset="0"/>
+                                        </a:rPr>
+                                        <m:t>⋮  </m:t>
+                                      </m:r>
+                                    </m:e>
+                                    <m:e>
+                                      <m:r>
+                                        <a:rPr lang="en-US" altLang="ko-KR" b="0" i="1" smtClean="0">
+                                          <a:solidFill>
+                                            <a:srgbClr val="FF0000"/>
+                                          </a:solidFill>
+                                          <a:latin typeface="Cambria Math" panose="02040503050406030204" pitchFamily="18" charset="0"/>
+                                        </a:rPr>
+                                        <m:t> </m:t>
+                                      </m:r>
+                                    </m:e>
+                                  </m:mr>
+                                </m:m>
+                              </m:e>
+                              <m:e>
+                                <m:r>
+                                  <a:rPr lang="en-US" altLang="ko-KR" b="0" i="1" smtClean="0">
+                                    <a:latin typeface="Cambria Math" panose="02040503050406030204" pitchFamily="18" charset="0"/>
+                                  </a:rPr>
+                                  <m:t>⋮</m:t>
+                                </m:r>
+                              </m:e>
+                            </m:mr>
+                            <m:mr>
+                              <m:e>
+                                <m:m>
+                                  <m:mPr>
+                                    <m:mcs>
+                                      <m:mc>
+                                        <m:mcPr>
+                                          <m:count m:val="2"/>
+                                          <m:mcJc m:val="center"/>
+                                        </m:mcPr>
+                                      </m:mc>
+                                    </m:mcs>
+                                    <m:ctrlPr>
+                                      <a:rPr lang="en-US" altLang="ko-KR" b="0" i="1" smtClean="0">
+                                        <a:latin typeface="Cambria Math"/>
+                                      </a:rPr>
+                                    </m:ctrlPr>
+                                  </m:mPr>
+                                  <m:mr>
+                                    <m:e>
+                                      <m:sSub>
+                                        <m:sSubPr>
+                                          <m:ctrlPr>
+                                            <a:rPr lang="en-US" altLang="ko-KR" b="0" i="1" smtClean="0">
+                                              <a:latin typeface="Cambria Math"/>
+                                            </a:rPr>
+                                          </m:ctrlPr>
+                                        </m:sSubPr>
+                                        <m:e>
+                                          <m:r>
+                                            <m:rPr>
+                                              <m:brk m:alnAt="7"/>
+                                            </m:rPr>
+                                            <a:rPr lang="en-US" altLang="ko-KR" b="0" i="1" smtClean="0">
+                                              <a:latin typeface="Cambria Math" panose="02040503050406030204" pitchFamily="18" charset="0"/>
+                                            </a:rPr>
+                                            <m:t>𝑎</m:t>
+                                          </m:r>
+                                        </m:e>
+                                        <m:sub>
+                                          <m:r>
+                                            <m:rPr>
+                                              <m:brk m:alnAt="7"/>
+                                            </m:rPr>
+                                            <a:rPr lang="en-US" altLang="ko-KR" b="0" i="1" smtClean="0">
+                                              <a:latin typeface="Cambria Math" panose="02040503050406030204" pitchFamily="18" charset="0"/>
+                                            </a:rPr>
+                                            <m:t>𝑛</m:t>
+                                          </m:r>
+                                          <m:r>
+                                            <a:rPr lang="en-US" altLang="ko-KR" b="0" i="1" smtClean="0">
+                                              <a:latin typeface="Cambria Math" panose="02040503050406030204" pitchFamily="18" charset="0"/>
+                                            </a:rPr>
+                                            <m:t>1</m:t>
+                                          </m:r>
+                                        </m:sub>
+                                      </m:sSub>
+                                    </m:e>
+                                    <m:e>
+                                      <m:r>
+                                        <a:rPr lang="en-US" altLang="ko-KR" b="0" i="1" smtClean="0">
+                                          <a:latin typeface="Cambria Math" panose="02040503050406030204" pitchFamily="18" charset="0"/>
+                                        </a:rPr>
+                                        <m:t>⋯</m:t>
+                                      </m:r>
+                                    </m:e>
+                                  </m:mr>
+                                </m:m>
+                              </m:e>
+                              <m:e>
+                                <m:m>
+                                  <m:mPr>
+                                    <m:mcs>
+                                      <m:mc>
+                                        <m:mcPr>
+                                          <m:count m:val="2"/>
+                                          <m:mcJc m:val="center"/>
+                                        </m:mcPr>
+                                      </m:mc>
+                                    </m:mcs>
+                                    <m:ctrlPr>
+                                      <a:rPr lang="en-US" altLang="ko-KR" b="0" i="1" smtClean="0">
+                                        <a:latin typeface="Cambria Math"/>
+                                      </a:rPr>
+                                    </m:ctrlPr>
+                                  </m:mPr>
+                                  <m:mr>
+                                    <m:e>
+                                      <m:sSub>
+                                        <m:sSubPr>
+                                          <m:ctrlPr>
+                                            <a:rPr lang="en-US" altLang="ko-KR" b="0" i="1" smtClean="0">
+                                              <a:solidFill>
+                                                <a:srgbClr val="FF0000"/>
+                                              </a:solidFill>
+                                              <a:latin typeface="Cambria Math"/>
+                                            </a:rPr>
+                                          </m:ctrlPr>
+                                        </m:sSubPr>
+                                        <m:e>
+                                          <m:r>
+                                            <m:rPr>
+                                              <m:brk m:alnAt="7"/>
+                                            </m:rPr>
+                                            <a:rPr lang="en-US" altLang="ko-KR" b="0" i="1" smtClean="0">
+                                              <a:solidFill>
+                                                <a:srgbClr val="FF0000"/>
+                                              </a:solidFill>
+                                              <a:latin typeface="Cambria Math" panose="02040503050406030204" pitchFamily="18" charset="0"/>
+                                            </a:rPr>
+                                            <m:t>𝑎</m:t>
+                                          </m:r>
+                                        </m:e>
+                                        <m:sub>
+                                          <m:r>
+                                            <m:rPr>
+                                              <m:brk m:alnAt="7"/>
+                                            </m:rPr>
+                                            <a:rPr lang="en-US" altLang="ko-KR" b="0" i="1" smtClean="0">
+                                              <a:solidFill>
+                                                <a:srgbClr val="FF0000"/>
+                                              </a:solidFill>
+                                              <a:latin typeface="Cambria Math" panose="02040503050406030204" pitchFamily="18" charset="0"/>
+                                            </a:rPr>
+                                            <m:t>𝑛</m:t>
+                                          </m:r>
+                                          <m:r>
+                                            <a:rPr lang="en-US" altLang="ko-KR" b="0" i="1" smtClean="0">
+                                              <a:solidFill>
+                                                <a:srgbClr val="FF0000"/>
+                                              </a:solidFill>
+                                              <a:latin typeface="Cambria Math" panose="02040503050406030204" pitchFamily="18" charset="0"/>
+                                            </a:rPr>
+                                            <m:t>𝑖</m:t>
+                                          </m:r>
+                                        </m:sub>
+                                      </m:sSub>
+                                    </m:e>
+                                    <m:e>
+                                      <m:r>
+                                        <a:rPr lang="en-US" altLang="ko-KR" b="0" i="1" smtClean="0">
+                                          <a:latin typeface="Cambria Math" panose="02040503050406030204" pitchFamily="18" charset="0"/>
+                                        </a:rPr>
+                                        <m:t>⋯</m:t>
+                                      </m:r>
+                                    </m:e>
+                                  </m:mr>
+                                </m:m>
+                              </m:e>
+                              <m:e>
+                                <m:sSub>
+                                  <m:sSubPr>
+                                    <m:ctrlPr>
+                                      <a:rPr lang="en-US" altLang="ko-KR" b="0" i="1" smtClean="0">
+                                        <a:latin typeface="Cambria Math"/>
+                                      </a:rPr>
+                                    </m:ctrlPr>
+                                  </m:sSubPr>
+                                  <m:e>
+                                    <m:r>
+                                      <a:rPr lang="en-US" altLang="ko-KR" b="0" i="1" smtClean="0">
+                                        <a:latin typeface="Cambria Math" panose="02040503050406030204" pitchFamily="18" charset="0"/>
+                                      </a:rPr>
+                                      <m:t>𝑎</m:t>
+                                    </m:r>
+                                  </m:e>
+                                  <m:sub>
+                                    <m:r>
+                                      <a:rPr lang="en-US" altLang="ko-KR" b="0" i="1" smtClean="0">
+                                        <a:latin typeface="Cambria Math" panose="02040503050406030204" pitchFamily="18" charset="0"/>
+                                      </a:rPr>
+                                      <m:t>𝑛𝑛</m:t>
+                                    </m:r>
+                                  </m:sub>
+                                </m:sSub>
+                              </m:e>
+                            </m:mr>
+                          </m:m>
+                        </m:e>
+                      </m:d>
+                      <m:d>
+                        <m:dPr>
+                          <m:begChr m:val="["/>
+                          <m:endChr m:val="]"/>
+                          <m:ctrlPr>
+                            <a:rPr lang="en-US" altLang="ko-KR" b="0" i="1" smtClean="0">
+                              <a:latin typeface="Cambria Math"/>
+                            </a:rPr>
+                          </m:ctrlPr>
+                        </m:dPr>
+                        <m:e>
+                          <m:m>
+                            <m:mPr>
+                              <m:mcs>
+                                <m:mc>
+                                  <m:mcPr>
+                                    <m:count m:val="1"/>
+                                    <m:mcJc m:val="center"/>
+                                  </m:mcPr>
+                                </m:mc>
+                              </m:mcs>
+                              <m:ctrlPr>
+                                <a:rPr lang="en-US" altLang="ko-KR" b="0" i="1" smtClean="0">
+                                  <a:latin typeface="Cambria Math"/>
+                                </a:rPr>
+                              </m:ctrlPr>
+                            </m:mPr>
+                            <m:mr>
+                              <m:e>
+                                <m:m>
+                                  <m:mPr>
+                                    <m:mcs>
+                                      <m:mc>
+                                        <m:mcPr>
+                                          <m:count m:val="1"/>
+                                          <m:mcJc m:val="center"/>
+                                        </m:mcPr>
+                                      </m:mc>
+                                    </m:mcs>
+                                    <m:ctrlPr>
+                                      <a:rPr lang="en-US" altLang="ko-KR" b="0" i="1" smtClean="0">
+                                        <a:latin typeface="Cambria Math"/>
+                                      </a:rPr>
+                                    </m:ctrlPr>
+                                  </m:mPr>
+                                  <m:mr>
+                                    <m:e>
+                                      <m:sSub>
+                                        <m:sSubPr>
+                                          <m:ctrlPr>
+                                            <a:rPr lang="en-US" altLang="ko-KR" b="0" i="1" smtClean="0">
+                                              <a:latin typeface="Cambria Math"/>
+                                            </a:rPr>
+                                          </m:ctrlPr>
+                                        </m:sSubPr>
+                                        <m:e>
+                                          <m:r>
+                                            <m:rPr>
+                                              <m:brk m:alnAt="7"/>
+                                            </m:rPr>
+                                            <a:rPr lang="en-US" altLang="ko-KR" b="0" i="1" smtClean="0">
+                                              <a:latin typeface="Cambria Math" panose="02040503050406030204" pitchFamily="18" charset="0"/>
+                                            </a:rPr>
+                                            <m:t>𝑥</m:t>
+                                          </m:r>
+                                        </m:e>
+                                        <m:sub>
+                                          <m:r>
+                                            <m:rPr>
+                                              <m:brk m:alnAt="7"/>
+                                            </m:rPr>
+                                            <a:rPr lang="en-US" altLang="ko-KR" b="0" i="1" smtClean="0">
+                                              <a:latin typeface="Cambria Math" panose="02040503050406030204" pitchFamily="18" charset="0"/>
+                                            </a:rPr>
+                                            <m:t>1</m:t>
+                                          </m:r>
+                                        </m:sub>
+                                      </m:sSub>
+                                    </m:e>
+                                  </m:mr>
+                                  <m:mr>
+                                    <m:e>
+                                      <m:sSub>
+                                        <m:sSubPr>
+                                          <m:ctrlPr>
+                                            <a:rPr lang="en-US" altLang="ko-KR" b="0" i="1" smtClean="0">
+                                              <a:latin typeface="Cambria Math"/>
+                                            </a:rPr>
+                                          </m:ctrlPr>
+                                        </m:sSubPr>
+                                        <m:e>
+                                          <m:r>
+                                            <a:rPr lang="en-US" altLang="ko-KR" b="0" i="1" smtClean="0">
+                                              <a:latin typeface="Cambria Math" panose="02040503050406030204" pitchFamily="18" charset="0"/>
+                                            </a:rPr>
+                                            <m:t>𝑥</m:t>
+                                          </m:r>
+                                        </m:e>
+                                        <m:sub>
+                                          <m:r>
+                                            <a:rPr lang="en-US" altLang="ko-KR" b="0" i="1" smtClean="0">
+                                              <a:latin typeface="Cambria Math" panose="02040503050406030204" pitchFamily="18" charset="0"/>
+                                            </a:rPr>
+                                            <m:t>2</m:t>
+                                          </m:r>
+                                        </m:sub>
+                                      </m:sSub>
+                                    </m:e>
+                                  </m:mr>
+                                </m:m>
+                              </m:e>
+                            </m:mr>
+                            <m:mr>
+                              <m:e>
+                                <m:m>
+                                  <m:mPr>
+                                    <m:mcs>
+                                      <m:mc>
+                                        <m:mcPr>
+                                          <m:count m:val="1"/>
+                                          <m:mcJc m:val="center"/>
+                                        </m:mcPr>
+                                      </m:mc>
+                                    </m:mcs>
+                                    <m:ctrlPr>
+                                      <a:rPr lang="en-US" altLang="ko-KR" b="0" i="1" smtClean="0">
+                                        <a:latin typeface="Cambria Math"/>
+                                      </a:rPr>
+                                    </m:ctrlPr>
+                                  </m:mPr>
+                                  <m:mr>
+                                    <m:e>
+                                      <m:r>
+                                        <a:rPr lang="en-US" altLang="ko-KR" b="0" i="1" smtClean="0">
+                                          <a:latin typeface="Cambria Math" panose="02040503050406030204" pitchFamily="18" charset="0"/>
+                                        </a:rPr>
+                                        <m:t>⋮</m:t>
+                                      </m:r>
+                                    </m:e>
+                                  </m:mr>
+                                  <m:mr>
+                                    <m:e>
+                                      <m:sSub>
+                                        <m:sSubPr>
+                                          <m:ctrlPr>
+                                            <a:rPr lang="en-US" altLang="ko-KR" b="0" i="1" smtClean="0">
+                                              <a:latin typeface="Cambria Math"/>
+                                            </a:rPr>
+                                          </m:ctrlPr>
+                                        </m:sSubPr>
+                                        <m:e>
+                                          <m:r>
+                                            <a:rPr lang="en-US" altLang="ko-KR" b="0" i="1" smtClean="0">
+                                              <a:latin typeface="Cambria Math" panose="02040503050406030204" pitchFamily="18" charset="0"/>
+                                            </a:rPr>
+                                            <m:t>𝑥</m:t>
+                                          </m:r>
+                                        </m:e>
+                                        <m:sub>
+                                          <m:r>
+                                            <a:rPr lang="en-US" altLang="ko-KR" b="0" i="1" smtClean="0">
+                                              <a:latin typeface="Cambria Math" panose="02040503050406030204" pitchFamily="18" charset="0"/>
+                                            </a:rPr>
+                                            <m:t>𝑛</m:t>
+                                          </m:r>
+                                        </m:sub>
+                                      </m:sSub>
+                                    </m:e>
+                                  </m:mr>
+                                </m:m>
+                              </m:e>
+                            </m:mr>
+                          </m:m>
+                        </m:e>
+                      </m:d>
+                      <m:r>
+                        <a:rPr lang="en-US" altLang="ko-KR" b="0" i="1" smtClean="0">
+                          <a:latin typeface="Cambria Math" panose="02040503050406030204" pitchFamily="18" charset="0"/>
+                        </a:rPr>
+                        <m:t>=</m:t>
+                      </m:r>
+                      <m:d>
+                        <m:dPr>
+                          <m:begChr m:val="["/>
+                          <m:endChr m:val="]"/>
+                          <m:ctrlPr>
+                            <a:rPr lang="en-US" altLang="ko-KR" b="0" i="1">
+                              <a:latin typeface="Cambria Math"/>
+                            </a:rPr>
+                          </m:ctrlPr>
+                        </m:dPr>
+                        <m:e>
+                          <m:m>
+                            <m:mPr>
+                              <m:mcs>
+                                <m:mc>
+                                  <m:mcPr>
+                                    <m:count m:val="1"/>
+                                    <m:mcJc m:val="center"/>
+                                  </m:mcPr>
+                                </m:mc>
+                              </m:mcs>
+                              <m:ctrlPr>
+                                <a:rPr lang="en-US" altLang="ko-KR" b="0" i="1">
+                                  <a:latin typeface="Cambria Math"/>
+                                </a:rPr>
+                              </m:ctrlPr>
+                            </m:mPr>
+                            <m:mr>
+                              <m:e>
+                                <m:m>
+                                  <m:mPr>
+                                    <m:mcs>
+                                      <m:mc>
+                                        <m:mcPr>
+                                          <m:count m:val="1"/>
+                                          <m:mcJc m:val="center"/>
+                                        </m:mcPr>
+                                      </m:mc>
+                                    </m:mcs>
+                                    <m:ctrlPr>
+                                      <a:rPr lang="en-US" altLang="ko-KR" b="0" i="1">
+                                        <a:latin typeface="Cambria Math"/>
+                                      </a:rPr>
+                                    </m:ctrlPr>
+                                  </m:mPr>
+                                  <m:mr>
+                                    <m:e>
+                                      <m:sSub>
+                                        <m:sSubPr>
+                                          <m:ctrlPr>
+                                            <a:rPr lang="en-US" altLang="ko-KR" b="0" i="1">
+                                              <a:latin typeface="Cambria Math"/>
+                                            </a:rPr>
+                                          </m:ctrlPr>
+                                        </m:sSubPr>
+                                        <m:e>
+                                          <m:r>
+                                            <a:rPr lang="en-US" altLang="ko-KR" b="0" i="1" smtClean="0">
+                                              <a:latin typeface="Cambria Math" panose="02040503050406030204" pitchFamily="18" charset="0"/>
+                                            </a:rPr>
+                                            <m:t>𝑏</m:t>
+                                          </m:r>
+                                        </m:e>
+                                        <m:sub>
+                                          <m:r>
+                                            <m:rPr>
+                                              <m:brk m:alnAt="7"/>
+                                            </m:rPr>
+                                            <a:rPr lang="en-US" altLang="ko-KR" b="0" i="1">
+                                              <a:latin typeface="Cambria Math" panose="02040503050406030204" pitchFamily="18" charset="0"/>
+                                            </a:rPr>
+                                            <m:t>1</m:t>
+                                          </m:r>
+                                        </m:sub>
+                                      </m:sSub>
+                                    </m:e>
+                                  </m:mr>
+                                  <m:mr>
+                                    <m:e>
+                                      <m:sSub>
+                                        <m:sSubPr>
+                                          <m:ctrlPr>
+                                            <a:rPr lang="en-US" altLang="ko-KR" b="0" i="1">
+                                              <a:latin typeface="Cambria Math"/>
+                                            </a:rPr>
+                                          </m:ctrlPr>
+                                        </m:sSubPr>
+                                        <m:e>
+                                          <m:r>
+                                            <a:rPr lang="en-US" altLang="ko-KR" b="0" i="1" smtClean="0">
+                                              <a:latin typeface="Cambria Math" panose="02040503050406030204" pitchFamily="18" charset="0"/>
+                                            </a:rPr>
+                                            <m:t>𝑏</m:t>
+                                          </m:r>
+                                        </m:e>
+                                        <m:sub>
+                                          <m:r>
+                                            <a:rPr lang="en-US" altLang="ko-KR" b="0" i="1">
+                                              <a:latin typeface="Cambria Math" panose="02040503050406030204" pitchFamily="18" charset="0"/>
+                                            </a:rPr>
+                                            <m:t>2</m:t>
+                                          </m:r>
+                                        </m:sub>
+                                      </m:sSub>
+                                    </m:e>
+                                  </m:mr>
+                                </m:m>
+                              </m:e>
+                            </m:mr>
+                            <m:mr>
+                              <m:e>
+                                <m:m>
+                                  <m:mPr>
+                                    <m:mcs>
+                                      <m:mc>
+                                        <m:mcPr>
+                                          <m:count m:val="1"/>
+                                          <m:mcJc m:val="center"/>
+                                        </m:mcPr>
+                                      </m:mc>
+                                    </m:mcs>
+                                    <m:ctrlPr>
+                                      <a:rPr lang="en-US" altLang="ko-KR" b="0" i="1">
+                                        <a:latin typeface="Cambria Math"/>
+                                      </a:rPr>
+                                    </m:ctrlPr>
+                                  </m:mPr>
+                                  <m:mr>
+                                    <m:e>
+                                      <m:r>
+                                        <a:rPr lang="en-US" altLang="ko-KR" b="0" i="1">
+                                          <a:latin typeface="Cambria Math" panose="02040503050406030204" pitchFamily="18" charset="0"/>
+                                        </a:rPr>
+                                        <m:t>⋮</m:t>
+                                      </m:r>
+                                    </m:e>
+                                  </m:mr>
+                                  <m:mr>
+                                    <m:e>
+                                      <m:sSub>
+                                        <m:sSubPr>
+                                          <m:ctrlPr>
+                                            <a:rPr lang="en-US" altLang="ko-KR" b="0" i="1">
+                                              <a:latin typeface="Cambria Math"/>
+                                            </a:rPr>
+                                          </m:ctrlPr>
+                                        </m:sSubPr>
+                                        <m:e>
+                                          <m:r>
+                                            <a:rPr lang="en-US" altLang="ko-KR" b="0" i="1" smtClean="0">
+                                              <a:latin typeface="Cambria Math" panose="02040503050406030204" pitchFamily="18" charset="0"/>
+                                            </a:rPr>
+                                            <m:t>𝑏</m:t>
+                                          </m:r>
+                                        </m:e>
+                                        <m:sub>
+                                          <m:r>
+                                            <a:rPr lang="en-US" altLang="ko-KR" b="0" i="1">
+                                              <a:latin typeface="Cambria Math" panose="02040503050406030204" pitchFamily="18" charset="0"/>
+                                            </a:rPr>
+                                            <m:t>𝑛</m:t>
+                                          </m:r>
+                                        </m:sub>
+                                      </m:sSub>
+                                    </m:e>
+                                  </m:mr>
+                                </m:m>
+                              </m:e>
+                            </m:mr>
+                          </m:m>
+                        </m:e>
+                      </m:d>
+                    </m:oMath>
+                  </m:oMathPara>
+                </a14:m>
+                <a:endParaRPr lang="en-US" altLang="ko-KR" b="0" i="1" dirty="0" smtClean="0">
+                  <a:latin typeface="Cambria Math" panose="02040503050406030204" pitchFamily="18" charset="0"/>
+                </a:endParaRPr>
+              </a:p>
+              <a:p>
+                <a:pPr marL="0" indent="0">
+                  <a:buNone/>
+                </a:pPr>
+                <a:endParaRPr lang="en-US" altLang="ko-KR" b="0" i="1" dirty="0">
+                  <a:latin typeface="Cambria Math" panose="02040503050406030204" pitchFamily="18" charset="0"/>
+                </a:endParaRPr>
+              </a:p>
+              <a:p>
+                <a:pPr marL="0" indent="0">
+                  <a:buNone/>
+                </a:pPr>
+                <a14:m>
+                  <m:oMathPara xmlns:m="http://schemas.openxmlformats.org/officeDocument/2006/math">
+                    <m:oMathParaPr>
+                      <m:jc m:val="centerGroup"/>
+                    </m:oMathParaPr>
+                    <m:oMath xmlns:m="http://schemas.openxmlformats.org/officeDocument/2006/math">
+                      <m:sSub>
+                        <m:sSubPr>
+                          <m:ctrlPr>
+                            <a:rPr lang="en-US" altLang="ko-KR" b="0" i="1" smtClean="0">
+                              <a:latin typeface="Cambria Math"/>
+                            </a:rPr>
+                          </m:ctrlPr>
+                        </m:sSubPr>
+                        <m:e>
+                          <m:r>
+                            <a:rPr lang="en-US" altLang="ko-KR" b="0" i="1" smtClean="0">
+                              <a:latin typeface="Cambria Math" panose="02040503050406030204" pitchFamily="18" charset="0"/>
+                            </a:rPr>
+                            <m:t>𝑥</m:t>
+                          </m:r>
+                        </m:e>
+                        <m:sub>
+                          <m:r>
+                            <a:rPr lang="en-US" altLang="ko-KR" b="0" i="1" smtClean="0">
+                              <a:latin typeface="Cambria Math" panose="02040503050406030204" pitchFamily="18" charset="0"/>
+                            </a:rPr>
+                            <m:t>𝑖</m:t>
+                          </m:r>
+                        </m:sub>
+                      </m:sSub>
+                      <m:r>
+                        <a:rPr lang="en-US" altLang="ko-KR" b="0" i="1" smtClean="0">
+                          <a:latin typeface="Cambria Math" panose="02040503050406030204" pitchFamily="18" charset="0"/>
+                        </a:rPr>
+                        <m:t>=</m:t>
+                      </m:r>
+                      <m:f>
+                        <m:fPr>
+                          <m:ctrlPr>
+                            <a:rPr lang="en-US" altLang="ko-KR" b="0" i="1" smtClean="0">
+                              <a:latin typeface="Cambria Math"/>
+                            </a:rPr>
+                          </m:ctrlPr>
+                        </m:fPr>
+                        <m:num>
+                          <m:func>
+                            <m:funcPr>
+                              <m:ctrlPr>
+                                <a:rPr lang="en-US" altLang="ko-KR" b="0" i="1" smtClean="0">
+                                  <a:latin typeface="Cambria Math"/>
+                                </a:rPr>
+                              </m:ctrlPr>
+                            </m:funcPr>
+                            <m:fName>
+                              <m:r>
+                                <m:rPr>
+                                  <m:sty m:val="p"/>
+                                </m:rPr>
+                                <a:rPr lang="en-US" altLang="ko-KR" b="0" i="0" smtClean="0">
+                                  <a:latin typeface="Cambria Math" panose="02040503050406030204" pitchFamily="18" charset="0"/>
+                                </a:rPr>
+                                <m:t>det</m:t>
+                              </m:r>
+                            </m:fName>
+                            <m:e>
+                              <m:d>
+                                <m:dPr>
+                                  <m:ctrlPr>
+                                    <a:rPr lang="en-US" altLang="ko-KR" b="0" i="1" smtClean="0">
+                                      <a:latin typeface="Cambria Math"/>
+                                    </a:rPr>
+                                  </m:ctrlPr>
+                                </m:dPr>
+                                <m:e>
+                                  <m:sSubSup>
+                                    <m:sSubSupPr>
+                                      <m:ctrlPr>
+                                        <a:rPr lang="en-US" altLang="ko-KR" b="0" i="1" smtClean="0">
+                                          <a:latin typeface="Cambria Math"/>
+                                        </a:rPr>
+                                      </m:ctrlPr>
+                                    </m:sSubSupPr>
+                                    <m:e>
+                                      <m:r>
+                                        <a:rPr lang="en-US" altLang="ko-KR" b="0" i="1" smtClean="0">
+                                          <a:latin typeface="Cambria Math" panose="02040503050406030204" pitchFamily="18" charset="0"/>
+                                        </a:rPr>
+                                        <m:t>𝐴</m:t>
+                                      </m:r>
+                                    </m:e>
+                                    <m:sub>
+                                      <m:r>
+                                        <a:rPr lang="en-US" altLang="ko-KR" b="0" i="1" smtClean="0">
+                                          <a:latin typeface="Cambria Math" panose="02040503050406030204" pitchFamily="18" charset="0"/>
+                                        </a:rPr>
+                                        <m:t>𝑖</m:t>
+                                      </m:r>
+                                    </m:sub>
+                                    <m:sup>
+                                      <m:r>
+                                        <a:rPr lang="en-US" altLang="ko-KR" b="0" i="1" smtClean="0">
+                                          <a:latin typeface="Cambria Math" panose="02040503050406030204" pitchFamily="18" charset="0"/>
+                                        </a:rPr>
+                                        <m:t>𝑟𝑒𝑝</m:t>
+                                      </m:r>
+                                    </m:sup>
+                                  </m:sSubSup>
+                                </m:e>
+                              </m:d>
+                            </m:e>
+                          </m:func>
+                        </m:num>
+                        <m:den>
+                          <m:func>
+                            <m:funcPr>
+                              <m:ctrlPr>
+                                <a:rPr lang="en-US" altLang="ko-KR" b="0" i="1" smtClean="0">
+                                  <a:latin typeface="Cambria Math"/>
+                                </a:rPr>
+                              </m:ctrlPr>
+                            </m:funcPr>
+                            <m:fName>
+                              <m:r>
+                                <m:rPr>
+                                  <m:sty m:val="p"/>
+                                </m:rPr>
+                                <a:rPr lang="en-US" altLang="ko-KR" b="0" i="0" smtClean="0">
+                                  <a:latin typeface="Cambria Math" panose="02040503050406030204" pitchFamily="18" charset="0"/>
+                                </a:rPr>
+                                <m:t>det</m:t>
+                              </m:r>
+                            </m:fName>
+                            <m:e>
+                              <m:d>
+                                <m:dPr>
+                                  <m:ctrlPr>
+                                    <a:rPr lang="en-US" altLang="ko-KR" b="0" i="1" smtClean="0">
+                                      <a:latin typeface="Cambria Math"/>
+                                    </a:rPr>
+                                  </m:ctrlPr>
+                                </m:dPr>
+                                <m:e>
+                                  <m:r>
+                                    <a:rPr lang="en-US" altLang="ko-KR" b="0" i="1" smtClean="0">
+                                      <a:latin typeface="Cambria Math" panose="02040503050406030204" pitchFamily="18" charset="0"/>
+                                    </a:rPr>
+                                    <m:t>𝐴</m:t>
+                                  </m:r>
+                                </m:e>
+                              </m:d>
+                            </m:e>
+                          </m:func>
+                        </m:den>
+                      </m:f>
+                      <m:r>
+                        <a:rPr lang="en-US" altLang="ko-KR" b="0" i="1" smtClean="0">
+                          <a:latin typeface="Cambria Math" panose="02040503050406030204" pitchFamily="18" charset="0"/>
+                        </a:rPr>
+                        <m:t>=</m:t>
+                      </m:r>
+                      <m:f>
+                        <m:fPr>
+                          <m:ctrlPr>
+                            <a:rPr lang="en-US" altLang="ko-KR" b="0" i="1" smtClean="0">
+                              <a:latin typeface="Cambria Math"/>
+                            </a:rPr>
+                          </m:ctrlPr>
+                        </m:fPr>
+                        <m:num>
+                          <m:d>
+                            <m:dPr>
+                              <m:begChr m:val="|"/>
+                              <m:endChr m:val="|"/>
+                              <m:ctrlPr>
+                                <a:rPr lang="en-US" altLang="ko-KR" b="0" i="1" smtClean="0">
+                                  <a:latin typeface="Cambria Math"/>
+                                </a:rPr>
+                              </m:ctrlPr>
+                            </m:dPr>
+                            <m:e>
+                              <m:m>
+                                <m:mPr>
+                                  <m:mcs>
+                                    <m:mc>
+                                      <m:mcPr>
+                                        <m:count m:val="3"/>
+                                        <m:mcJc m:val="center"/>
+                                      </m:mcPr>
+                                    </m:mc>
+                                  </m:mcs>
+                                  <m:ctrlPr>
+                                    <a:rPr lang="en-US" altLang="ko-KR" b="0" i="1">
+                                      <a:latin typeface="Cambria Math"/>
+                                    </a:rPr>
+                                  </m:ctrlPr>
+                                </m:mPr>
+                                <m:mr>
+                                  <m:e>
+                                    <m:m>
+                                      <m:mPr>
+                                        <m:mcs>
+                                          <m:mc>
+                                            <m:mcPr>
+                                              <m:count m:val="2"/>
+                                              <m:mcJc m:val="center"/>
+                                            </m:mcPr>
+                                          </m:mc>
+                                        </m:mcs>
+                                        <m:ctrlPr>
+                                          <a:rPr lang="en-US" altLang="ko-KR" b="0" i="1">
+                                            <a:latin typeface="Cambria Math"/>
+                                          </a:rPr>
+                                        </m:ctrlPr>
+                                      </m:mPr>
+                                      <m:mr>
+                                        <m:e>
+                                          <m:sSub>
+                                            <m:sSubPr>
+                                              <m:ctrlPr>
+                                                <a:rPr lang="en-US" altLang="ko-KR" b="0" i="1">
+                                                  <a:latin typeface="Cambria Math"/>
+                                                </a:rPr>
+                                              </m:ctrlPr>
+                                            </m:sSubPr>
+                                            <m:e>
+                                              <m:r>
+                                                <m:rPr>
+                                                  <m:brk m:alnAt="7"/>
+                                                </m:rPr>
+                                                <a:rPr lang="en-US" altLang="ko-KR" b="0" i="1">
+                                                  <a:latin typeface="Cambria Math" panose="02040503050406030204" pitchFamily="18" charset="0"/>
+                                                </a:rPr>
+                                                <m:t>𝑎</m:t>
+                                              </m:r>
+                                            </m:e>
+                                            <m:sub>
+                                              <m:r>
+                                                <m:rPr>
+                                                  <m:brk m:alnAt="7"/>
+                                                </m:rPr>
+                                                <a:rPr lang="en-US" altLang="ko-KR" b="0" i="1">
+                                                  <a:latin typeface="Cambria Math" panose="02040503050406030204" pitchFamily="18" charset="0"/>
+                                                </a:rPr>
+                                                <m:t>1</m:t>
+                                              </m:r>
+                                              <m:r>
+                                                <a:rPr lang="en-US" altLang="ko-KR" b="0" i="1">
+                                                  <a:latin typeface="Cambria Math" panose="02040503050406030204" pitchFamily="18" charset="0"/>
+                                                </a:rPr>
+                                                <m:t>1</m:t>
+                                              </m:r>
+                                            </m:sub>
+                                          </m:sSub>
+                                        </m:e>
+                                        <m:e>
+                                          <m:r>
+                                            <a:rPr lang="en-US" altLang="ko-KR" b="0" i="1">
+                                              <a:latin typeface="Cambria Math" panose="02040503050406030204" pitchFamily="18" charset="0"/>
+                                            </a:rPr>
+                                            <m:t>⋯</m:t>
+                                          </m:r>
+                                        </m:e>
+                                      </m:mr>
+                                      <m:mr>
+                                        <m:e>
+                                          <m:sSub>
+                                            <m:sSubPr>
+                                              <m:ctrlPr>
+                                                <a:rPr lang="en-US" altLang="ko-KR" b="0" i="1">
+                                                  <a:latin typeface="Cambria Math"/>
+                                                </a:rPr>
+                                              </m:ctrlPr>
+                                            </m:sSubPr>
+                                            <m:e>
+                                              <m:r>
+                                                <a:rPr lang="en-US" altLang="ko-KR" b="0" i="1">
+                                                  <a:latin typeface="Cambria Math" panose="02040503050406030204" pitchFamily="18" charset="0"/>
+                                                </a:rPr>
+                                                <m:t>𝑎</m:t>
+                                              </m:r>
+                                            </m:e>
+                                            <m:sub>
+                                              <m:r>
+                                                <a:rPr lang="en-US" altLang="ko-KR" b="0" i="1">
+                                                  <a:latin typeface="Cambria Math" panose="02040503050406030204" pitchFamily="18" charset="0"/>
+                                                </a:rPr>
+                                                <m:t>21</m:t>
+                                              </m:r>
+                                            </m:sub>
+                                          </m:sSub>
+                                        </m:e>
+                                        <m:e>
+                                          <m:r>
+                                            <m:rPr>
+                                              <m:brk m:alnAt="7"/>
+                                            </m:rPr>
+                                            <a:rPr lang="en-US" altLang="ko-KR" b="0" i="1">
+                                              <a:latin typeface="Cambria Math" panose="02040503050406030204" pitchFamily="18" charset="0"/>
+                                            </a:rPr>
+                                            <m:t>⋯</m:t>
+                                          </m:r>
+                                        </m:e>
+                                      </m:mr>
+                                    </m:m>
+                                  </m:e>
+                                  <m:e>
+                                    <m:m>
+                                      <m:mPr>
+                                        <m:mcs>
+                                          <m:mc>
+                                            <m:mcPr>
+                                              <m:count m:val="2"/>
+                                              <m:mcJc m:val="center"/>
+                                            </m:mcPr>
+                                          </m:mc>
+                                        </m:mcs>
+                                        <m:ctrlPr>
+                                          <a:rPr lang="en-US" altLang="ko-KR" b="0" i="1">
+                                            <a:latin typeface="Cambria Math"/>
+                                          </a:rPr>
+                                        </m:ctrlPr>
+                                      </m:mPr>
+                                      <m:mr>
+                                        <m:e>
+                                          <m:sSub>
+                                            <m:sSubPr>
+                                              <m:ctrlPr>
+                                                <a:rPr lang="en-US" altLang="ko-KR" b="0" i="1" smtClean="0">
+                                                  <a:solidFill>
+                                                    <a:srgbClr val="FF0000"/>
+                                                  </a:solidFill>
+                                                  <a:latin typeface="Cambria Math"/>
+                                                </a:rPr>
+                                              </m:ctrlPr>
+                                            </m:sSubPr>
+                                            <m:e>
+                                              <m:r>
+                                                <a:rPr lang="en-US" altLang="ko-KR" b="0" i="1" smtClean="0">
+                                                  <a:solidFill>
+                                                    <a:srgbClr val="FF0000"/>
+                                                  </a:solidFill>
+                                                  <a:latin typeface="Cambria Math" panose="02040503050406030204" pitchFamily="18" charset="0"/>
+                                                </a:rPr>
+                                                <m:t>𝑏</m:t>
+                                              </m:r>
+                                            </m:e>
+                                            <m:sub>
+                                              <m:r>
+                                                <a:rPr lang="en-US" altLang="ko-KR" b="0" i="1" smtClean="0">
+                                                  <a:solidFill>
+                                                    <a:srgbClr val="FF0000"/>
+                                                  </a:solidFill>
+                                                  <a:latin typeface="Cambria Math" panose="02040503050406030204" pitchFamily="18" charset="0"/>
+                                                </a:rPr>
+                                                <m:t>1</m:t>
+                                              </m:r>
+                                            </m:sub>
+                                          </m:sSub>
+                                        </m:e>
+                                        <m:e>
+                                          <m:r>
+                                            <a:rPr lang="en-US" altLang="ko-KR" b="0" i="1">
+                                              <a:latin typeface="Cambria Math" panose="02040503050406030204" pitchFamily="18" charset="0"/>
+                                            </a:rPr>
+                                            <m:t>⋯</m:t>
+                                          </m:r>
+                                        </m:e>
+                                      </m:mr>
+                                      <m:mr>
+                                        <m:e>
+                                          <m:sSub>
+                                            <m:sSubPr>
+                                              <m:ctrlPr>
+                                                <a:rPr lang="en-US" altLang="ko-KR" b="0" i="1" smtClean="0">
+                                                  <a:solidFill>
+                                                    <a:srgbClr val="FF0000"/>
+                                                  </a:solidFill>
+                                                  <a:latin typeface="Cambria Math"/>
+                                                </a:rPr>
+                                              </m:ctrlPr>
+                                            </m:sSubPr>
+                                            <m:e>
+                                              <m:r>
+                                                <a:rPr lang="en-US" altLang="ko-KR" b="0" i="1" smtClean="0">
+                                                  <a:solidFill>
+                                                    <a:srgbClr val="FF0000"/>
+                                                  </a:solidFill>
+                                                  <a:latin typeface="Cambria Math" panose="02040503050406030204" pitchFamily="18" charset="0"/>
+                                                </a:rPr>
+                                                <m:t>𝑏</m:t>
+                                              </m:r>
+                                            </m:e>
+                                            <m:sub>
+                                              <m:r>
+                                                <a:rPr lang="en-US" altLang="ko-KR" b="0" i="1" smtClean="0">
+                                                  <a:solidFill>
+                                                    <a:srgbClr val="FF0000"/>
+                                                  </a:solidFill>
+                                                  <a:latin typeface="Cambria Math" panose="02040503050406030204" pitchFamily="18" charset="0"/>
+                                                </a:rPr>
+                                                <m:t>2</m:t>
+                                              </m:r>
+                                            </m:sub>
+                                          </m:sSub>
+                                        </m:e>
+                                        <m:e>
+                                          <m:r>
+                                            <a:rPr lang="en-US" altLang="ko-KR" b="0" i="1">
+                                              <a:latin typeface="Cambria Math" panose="02040503050406030204" pitchFamily="18" charset="0"/>
+                                            </a:rPr>
+                                            <m:t>⋯</m:t>
+                                          </m:r>
+                                        </m:e>
+                                      </m:mr>
+                                    </m:m>
+                                  </m:e>
+                                  <m:e>
+                                    <m:m>
+                                      <m:mPr>
+                                        <m:mcs>
+                                          <m:mc>
+                                            <m:mcPr>
+                                              <m:count m:val="1"/>
+                                              <m:mcJc m:val="center"/>
+                                            </m:mcPr>
+                                          </m:mc>
+                                        </m:mcs>
+                                        <m:ctrlPr>
+                                          <a:rPr lang="en-US" altLang="ko-KR" b="0" i="1">
+                                            <a:latin typeface="Cambria Math"/>
+                                          </a:rPr>
+                                        </m:ctrlPr>
+                                      </m:mPr>
+                                      <m:mr>
+                                        <m:e>
+                                          <m:sSub>
+                                            <m:sSubPr>
+                                              <m:ctrlPr>
+                                                <a:rPr lang="en-US" altLang="ko-KR" b="0" i="1">
+                                                  <a:latin typeface="Cambria Math"/>
+                                                </a:rPr>
+                                              </m:ctrlPr>
+                                            </m:sSubPr>
+                                            <m:e>
+                                              <m:r>
+                                                <m:rPr>
+                                                  <m:brk m:alnAt="7"/>
+                                                </m:rPr>
+                                                <a:rPr lang="en-US" altLang="ko-KR" b="0" i="1">
+                                                  <a:latin typeface="Cambria Math" panose="02040503050406030204" pitchFamily="18" charset="0"/>
+                                                </a:rPr>
+                                                <m:t>𝑎</m:t>
+                                              </m:r>
+                                            </m:e>
+                                            <m:sub>
+                                              <m:r>
+                                                <m:rPr>
+                                                  <m:brk m:alnAt="7"/>
+                                                </m:rPr>
+                                                <a:rPr lang="en-US" altLang="ko-KR" b="0" i="1">
+                                                  <a:latin typeface="Cambria Math" panose="02040503050406030204" pitchFamily="18" charset="0"/>
+                                                </a:rPr>
+                                                <m:t>1</m:t>
+                                              </m:r>
+                                              <m:r>
+                                                <a:rPr lang="en-US" altLang="ko-KR" b="0" i="1">
+                                                  <a:latin typeface="Cambria Math" panose="02040503050406030204" pitchFamily="18" charset="0"/>
+                                                </a:rPr>
+                                                <m:t>𝑛</m:t>
+                                              </m:r>
+                                            </m:sub>
+                                          </m:sSub>
+                                        </m:e>
+                                      </m:mr>
+                                      <m:mr>
+                                        <m:e>
+                                          <m:sSub>
+                                            <m:sSubPr>
+                                              <m:ctrlPr>
+                                                <a:rPr lang="en-US" altLang="ko-KR" b="0" i="1">
+                                                  <a:latin typeface="Cambria Math"/>
+                                                </a:rPr>
+                                              </m:ctrlPr>
+                                            </m:sSubPr>
+                                            <m:e>
+                                              <m:r>
+                                                <a:rPr lang="en-US" altLang="ko-KR" b="0" i="1">
+                                                  <a:latin typeface="Cambria Math" panose="02040503050406030204" pitchFamily="18" charset="0"/>
+                                                </a:rPr>
+                                                <m:t>𝑎</m:t>
+                                              </m:r>
+                                            </m:e>
+                                            <m:sub>
+                                              <m:r>
+                                                <a:rPr lang="en-US" altLang="ko-KR" b="0" i="1">
+                                                  <a:latin typeface="Cambria Math" panose="02040503050406030204" pitchFamily="18" charset="0"/>
+                                                </a:rPr>
+                                                <m:t>2</m:t>
+                                              </m:r>
+                                              <m:r>
+                                                <a:rPr lang="en-US" altLang="ko-KR" b="0" i="1">
+                                                  <a:latin typeface="Cambria Math" panose="02040503050406030204" pitchFamily="18" charset="0"/>
+                                                </a:rPr>
+                                                <m:t>𝑛</m:t>
+                                              </m:r>
+                                            </m:sub>
+                                          </m:sSub>
+                                        </m:e>
+                                      </m:mr>
+                                    </m:m>
+                                  </m:e>
+                                </m:mr>
+                                <m:mr>
+                                  <m:e>
+                                    <m:m>
+                                      <m:mPr>
+                                        <m:mcs>
+                                          <m:mc>
+                                            <m:mcPr>
+                                              <m:count m:val="2"/>
+                                              <m:mcJc m:val="center"/>
+                                            </m:mcPr>
+                                          </m:mc>
+                                        </m:mcs>
+                                        <m:ctrlPr>
+                                          <a:rPr lang="en-US" altLang="ko-KR" b="0" i="1">
+                                            <a:latin typeface="Cambria Math"/>
+                                          </a:rPr>
+                                        </m:ctrlPr>
+                                      </m:mPr>
+                                      <m:mr>
+                                        <m:e>
+                                          <m:r>
+                                            <a:rPr lang="en-US" altLang="ko-KR" b="0" i="1">
+                                              <a:latin typeface="Cambria Math" panose="02040503050406030204" pitchFamily="18" charset="0"/>
+                                            </a:rPr>
+                                            <m:t>⋮</m:t>
+                                          </m:r>
+                                        </m:e>
+                                        <m:e>
+                                          <m:r>
+                                            <a:rPr lang="en-US" altLang="ko-KR" b="0" i="1">
+                                              <a:latin typeface="Cambria Math" panose="02040503050406030204" pitchFamily="18" charset="0"/>
+                                            </a:rPr>
+                                            <m:t> </m:t>
+                                          </m:r>
+                                        </m:e>
+                                      </m:mr>
+                                    </m:m>
+                                  </m:e>
+                                  <m:e>
+                                    <m:m>
+                                      <m:mPr>
+                                        <m:mcs>
+                                          <m:mc>
+                                            <m:mcPr>
+                                              <m:count m:val="2"/>
+                                              <m:mcJc m:val="center"/>
+                                            </m:mcPr>
+                                          </m:mc>
+                                        </m:mcs>
+                                        <m:ctrlPr>
+                                          <a:rPr lang="en-US" altLang="ko-KR" b="0" i="1" smtClean="0">
+                                            <a:solidFill>
+                                              <a:srgbClr val="FF0000"/>
+                                            </a:solidFill>
+                                            <a:latin typeface="Cambria Math"/>
+                                          </a:rPr>
+                                        </m:ctrlPr>
+                                      </m:mPr>
+                                      <m:mr>
+                                        <m:e>
+                                          <m:r>
+                                            <a:rPr lang="en-US" altLang="ko-KR" b="0" i="1">
+                                              <a:solidFill>
+                                                <a:srgbClr val="FF0000"/>
+                                              </a:solidFill>
+                                              <a:latin typeface="Cambria Math" panose="02040503050406030204" pitchFamily="18" charset="0"/>
+                                            </a:rPr>
+                                            <m:t>⋮</m:t>
+                                          </m:r>
+                                          <m:r>
+                                            <a:rPr lang="en-US" altLang="ko-KR" b="0" i="1" smtClean="0">
+                                              <a:solidFill>
+                                                <a:srgbClr val="FF0000"/>
+                                              </a:solidFill>
+                                              <a:latin typeface="Cambria Math" panose="02040503050406030204" pitchFamily="18" charset="0"/>
+                                            </a:rPr>
+                                            <m:t>   </m:t>
+                                          </m:r>
+                                        </m:e>
+                                        <m:e>
+                                          <m:r>
+                                            <a:rPr lang="en-US" altLang="ko-KR" b="0" i="1">
+                                              <a:solidFill>
+                                                <a:srgbClr val="FF0000"/>
+                                              </a:solidFill>
+                                              <a:latin typeface="Cambria Math" panose="02040503050406030204" pitchFamily="18" charset="0"/>
+                                            </a:rPr>
+                                            <m:t> </m:t>
+                                          </m:r>
+                                        </m:e>
+                                      </m:mr>
+                                    </m:m>
+                                  </m:e>
+                                  <m:e>
+                                    <m:r>
+                                      <a:rPr lang="en-US" altLang="ko-KR" b="0" i="1">
+                                        <a:latin typeface="Cambria Math" panose="02040503050406030204" pitchFamily="18" charset="0"/>
+                                      </a:rPr>
+                                      <m:t>⋮</m:t>
+                                    </m:r>
+                                  </m:e>
+                                </m:mr>
+                                <m:mr>
+                                  <m:e>
+                                    <m:m>
+                                      <m:mPr>
+                                        <m:mcs>
+                                          <m:mc>
+                                            <m:mcPr>
+                                              <m:count m:val="2"/>
+                                              <m:mcJc m:val="center"/>
+                                            </m:mcPr>
+                                          </m:mc>
+                                        </m:mcs>
+                                        <m:ctrlPr>
+                                          <a:rPr lang="en-US" altLang="ko-KR" b="0" i="1">
+                                            <a:latin typeface="Cambria Math"/>
+                                          </a:rPr>
+                                        </m:ctrlPr>
+                                      </m:mPr>
+                                      <m:mr>
+                                        <m:e>
+                                          <m:sSub>
+                                            <m:sSubPr>
+                                              <m:ctrlPr>
+                                                <a:rPr lang="en-US" altLang="ko-KR" b="0" i="1">
+                                                  <a:latin typeface="Cambria Math"/>
+                                                </a:rPr>
+                                              </m:ctrlPr>
+                                            </m:sSubPr>
+                                            <m:e>
+                                              <m:r>
+                                                <m:rPr>
+                                                  <m:brk m:alnAt="7"/>
+                                                </m:rPr>
+                                                <a:rPr lang="en-US" altLang="ko-KR" b="0" i="1">
+                                                  <a:latin typeface="Cambria Math" panose="02040503050406030204" pitchFamily="18" charset="0"/>
+                                                </a:rPr>
+                                                <m:t>𝑎</m:t>
+                                              </m:r>
+                                            </m:e>
+                                            <m:sub>
+                                              <m:r>
+                                                <m:rPr>
+                                                  <m:brk m:alnAt="7"/>
+                                                </m:rPr>
+                                                <a:rPr lang="en-US" altLang="ko-KR" b="0" i="1">
+                                                  <a:latin typeface="Cambria Math" panose="02040503050406030204" pitchFamily="18" charset="0"/>
+                                                </a:rPr>
+                                                <m:t>𝑛</m:t>
+                                              </m:r>
+                                              <m:r>
+                                                <a:rPr lang="en-US" altLang="ko-KR" b="0" i="1">
+                                                  <a:latin typeface="Cambria Math" panose="02040503050406030204" pitchFamily="18" charset="0"/>
+                                                </a:rPr>
+                                                <m:t>1</m:t>
+                                              </m:r>
+                                            </m:sub>
+                                          </m:sSub>
+                                        </m:e>
+                                        <m:e>
+                                          <m:r>
+                                            <a:rPr lang="en-US" altLang="ko-KR" b="0" i="1">
+                                              <a:latin typeface="Cambria Math" panose="02040503050406030204" pitchFamily="18" charset="0"/>
+                                            </a:rPr>
+                                            <m:t>⋯</m:t>
+                                          </m:r>
+                                        </m:e>
+                                      </m:mr>
+                                    </m:m>
+                                  </m:e>
+                                  <m:e>
+                                    <m:m>
+                                      <m:mPr>
+                                        <m:mcs>
+                                          <m:mc>
+                                            <m:mcPr>
+                                              <m:count m:val="2"/>
+                                              <m:mcJc m:val="center"/>
+                                            </m:mcPr>
+                                          </m:mc>
+                                        </m:mcs>
+                                        <m:ctrlPr>
+                                          <a:rPr lang="en-US" altLang="ko-KR" b="0" i="1">
+                                            <a:latin typeface="Cambria Math"/>
+                                          </a:rPr>
+                                        </m:ctrlPr>
+                                      </m:mPr>
+                                      <m:mr>
+                                        <m:e>
+                                          <m:sSub>
+                                            <m:sSubPr>
+                                              <m:ctrlPr>
+                                                <a:rPr lang="en-US" altLang="ko-KR" b="0" i="1" smtClean="0">
+                                                  <a:solidFill>
+                                                    <a:srgbClr val="FF0000"/>
+                                                  </a:solidFill>
+                                                  <a:latin typeface="Cambria Math"/>
+                                                </a:rPr>
+                                              </m:ctrlPr>
+                                            </m:sSubPr>
+                                            <m:e>
+                                              <m:r>
+                                                <a:rPr lang="en-US" altLang="ko-KR" b="0" i="1" smtClean="0">
+                                                  <a:solidFill>
+                                                    <a:srgbClr val="FF0000"/>
+                                                  </a:solidFill>
+                                                  <a:latin typeface="Cambria Math" panose="02040503050406030204" pitchFamily="18" charset="0"/>
+                                                </a:rPr>
+                                                <m:t>𝑏</m:t>
+                                              </m:r>
+                                            </m:e>
+                                            <m:sub>
+                                              <m:r>
+                                                <a:rPr lang="en-US" altLang="ko-KR" b="0" i="1" smtClean="0">
+                                                  <a:solidFill>
+                                                    <a:srgbClr val="FF0000"/>
+                                                  </a:solidFill>
+                                                  <a:latin typeface="Cambria Math" panose="02040503050406030204" pitchFamily="18" charset="0"/>
+                                                </a:rPr>
+                                                <m:t>𝑛</m:t>
+                                              </m:r>
+                                            </m:sub>
+                                          </m:sSub>
+                                        </m:e>
+                                        <m:e>
+                                          <m:r>
+                                            <a:rPr lang="en-US" altLang="ko-KR" b="0" i="1">
+                                              <a:latin typeface="Cambria Math" panose="02040503050406030204" pitchFamily="18" charset="0"/>
+                                            </a:rPr>
+                                            <m:t>⋯</m:t>
+                                          </m:r>
+                                        </m:e>
+                                      </m:mr>
+                                    </m:m>
+                                  </m:e>
+                                  <m:e>
+                                    <m:sSub>
+                                      <m:sSubPr>
+                                        <m:ctrlPr>
+                                          <a:rPr lang="en-US" altLang="ko-KR" b="0" i="1">
+                                            <a:latin typeface="Cambria Math"/>
+                                          </a:rPr>
+                                        </m:ctrlPr>
+                                      </m:sSubPr>
+                                      <m:e>
+                                        <m:r>
+                                          <a:rPr lang="en-US" altLang="ko-KR" b="0" i="1">
+                                            <a:latin typeface="Cambria Math" panose="02040503050406030204" pitchFamily="18" charset="0"/>
+                                          </a:rPr>
+                                          <m:t>𝑎</m:t>
+                                        </m:r>
+                                      </m:e>
+                                      <m:sub>
+                                        <m:r>
+                                          <a:rPr lang="en-US" altLang="ko-KR" b="0" i="1">
+                                            <a:latin typeface="Cambria Math" panose="02040503050406030204" pitchFamily="18" charset="0"/>
+                                          </a:rPr>
+                                          <m:t>𝑛𝑛</m:t>
+                                        </m:r>
+                                      </m:sub>
+                                    </m:sSub>
+                                  </m:e>
+                                </m:mr>
+                              </m:m>
+                            </m:e>
+                          </m:d>
+                        </m:num>
+                        <m:den>
+                          <m:d>
+                            <m:dPr>
+                              <m:begChr m:val="|"/>
+                              <m:endChr m:val="|"/>
+                              <m:ctrlPr>
+                                <a:rPr lang="en-US" altLang="ko-KR" b="0" i="1">
+                                  <a:latin typeface="Cambria Math"/>
+                                </a:rPr>
+                              </m:ctrlPr>
+                            </m:dPr>
+                            <m:e>
+                              <m:m>
+                                <m:mPr>
+                                  <m:mcs>
+                                    <m:mc>
+                                      <m:mcPr>
+                                        <m:count m:val="3"/>
+                                        <m:mcJc m:val="center"/>
+                                      </m:mcPr>
+                                    </m:mc>
+                                  </m:mcs>
+                                  <m:ctrlPr>
+                                    <a:rPr lang="en-US" altLang="ko-KR" b="0" i="1">
+                                      <a:latin typeface="Cambria Math"/>
+                                    </a:rPr>
+                                  </m:ctrlPr>
+                                </m:mPr>
+                                <m:mr>
+                                  <m:e>
+                                    <m:m>
+                                      <m:mPr>
+                                        <m:mcs>
+                                          <m:mc>
+                                            <m:mcPr>
+                                              <m:count m:val="2"/>
+                                              <m:mcJc m:val="center"/>
+                                            </m:mcPr>
+                                          </m:mc>
+                                        </m:mcs>
+                                        <m:ctrlPr>
+                                          <a:rPr lang="en-US" altLang="ko-KR" b="0" i="1">
+                                            <a:latin typeface="Cambria Math"/>
+                                          </a:rPr>
+                                        </m:ctrlPr>
+                                      </m:mPr>
+                                      <m:mr>
+                                        <m:e>
+                                          <m:sSub>
+                                            <m:sSubPr>
+                                              <m:ctrlPr>
+                                                <a:rPr lang="en-US" altLang="ko-KR" b="0" i="1">
+                                                  <a:latin typeface="Cambria Math"/>
+                                                </a:rPr>
+                                              </m:ctrlPr>
+                                            </m:sSubPr>
+                                            <m:e>
+                                              <m:r>
+                                                <m:rPr>
+                                                  <m:brk m:alnAt="7"/>
+                                                </m:rPr>
+                                                <a:rPr lang="en-US" altLang="ko-KR" b="0" i="1">
+                                                  <a:latin typeface="Cambria Math" panose="02040503050406030204" pitchFamily="18" charset="0"/>
+                                                </a:rPr>
+                                                <m:t>𝑎</m:t>
+                                              </m:r>
+                                            </m:e>
+                                            <m:sub>
+                                              <m:r>
+                                                <m:rPr>
+                                                  <m:brk m:alnAt="7"/>
+                                                </m:rPr>
+                                                <a:rPr lang="en-US" altLang="ko-KR" b="0" i="1">
+                                                  <a:latin typeface="Cambria Math" panose="02040503050406030204" pitchFamily="18" charset="0"/>
+                                                </a:rPr>
+                                                <m:t>1</m:t>
+                                              </m:r>
+                                              <m:r>
+                                                <a:rPr lang="en-US" altLang="ko-KR" b="0" i="1">
+                                                  <a:latin typeface="Cambria Math" panose="02040503050406030204" pitchFamily="18" charset="0"/>
+                                                </a:rPr>
+                                                <m:t>1</m:t>
+                                              </m:r>
+                                            </m:sub>
+                                          </m:sSub>
+                                        </m:e>
+                                        <m:e>
+                                          <m:r>
+                                            <a:rPr lang="en-US" altLang="ko-KR" b="0" i="1">
+                                              <a:latin typeface="Cambria Math" panose="02040503050406030204" pitchFamily="18" charset="0"/>
+                                            </a:rPr>
+                                            <m:t>⋯</m:t>
+                                          </m:r>
+                                        </m:e>
+                                      </m:mr>
+                                      <m:mr>
+                                        <m:e>
+                                          <m:sSub>
+                                            <m:sSubPr>
+                                              <m:ctrlPr>
+                                                <a:rPr lang="en-US" altLang="ko-KR" b="0" i="1">
+                                                  <a:latin typeface="Cambria Math"/>
+                                                </a:rPr>
+                                              </m:ctrlPr>
+                                            </m:sSubPr>
+                                            <m:e>
+                                              <m:r>
+                                                <a:rPr lang="en-US" altLang="ko-KR" b="0" i="1">
+                                                  <a:latin typeface="Cambria Math" panose="02040503050406030204" pitchFamily="18" charset="0"/>
+                                                </a:rPr>
+                                                <m:t>𝑎</m:t>
+                                              </m:r>
+                                            </m:e>
+                                            <m:sub>
+                                              <m:r>
+                                                <a:rPr lang="en-US" altLang="ko-KR" b="0" i="1">
+                                                  <a:latin typeface="Cambria Math" panose="02040503050406030204" pitchFamily="18" charset="0"/>
+                                                </a:rPr>
+                                                <m:t>21</m:t>
+                                              </m:r>
+                                            </m:sub>
+                                          </m:sSub>
+                                        </m:e>
+                                        <m:e>
+                                          <m:r>
+                                            <m:rPr>
+                                              <m:brk m:alnAt="7"/>
+                                            </m:rPr>
+                                            <a:rPr lang="en-US" altLang="ko-KR" b="0" i="1">
+                                              <a:latin typeface="Cambria Math" panose="02040503050406030204" pitchFamily="18" charset="0"/>
+                                            </a:rPr>
+                                            <m:t>⋯</m:t>
+                                          </m:r>
+                                        </m:e>
+                                      </m:mr>
+                                    </m:m>
+                                  </m:e>
+                                  <m:e>
+                                    <m:m>
+                                      <m:mPr>
+                                        <m:mcs>
+                                          <m:mc>
+                                            <m:mcPr>
+                                              <m:count m:val="2"/>
+                                              <m:mcJc m:val="center"/>
+                                            </m:mcPr>
+                                          </m:mc>
+                                        </m:mcs>
+                                        <m:ctrlPr>
+                                          <a:rPr lang="en-US" altLang="ko-KR" b="0" i="1">
+                                            <a:latin typeface="Cambria Math"/>
+                                          </a:rPr>
+                                        </m:ctrlPr>
+                                      </m:mPr>
+                                      <m:mr>
+                                        <m:e>
+                                          <m:sSub>
+                                            <m:sSubPr>
+                                              <m:ctrlPr>
+                                                <a:rPr lang="en-US" altLang="ko-KR" b="0" i="1">
+                                                  <a:latin typeface="Cambria Math"/>
+                                                </a:rPr>
+                                              </m:ctrlPr>
+                                            </m:sSubPr>
+                                            <m:e>
+                                              <m:r>
+                                                <m:rPr>
+                                                  <m:brk m:alnAt="7"/>
+                                                </m:rPr>
+                                                <a:rPr lang="en-US" altLang="ko-KR" b="0" i="1">
+                                                  <a:latin typeface="Cambria Math" panose="02040503050406030204" pitchFamily="18" charset="0"/>
+                                                </a:rPr>
+                                                <m:t>𝑎</m:t>
+                                              </m:r>
+                                            </m:e>
+                                            <m:sub>
+                                              <m:r>
+                                                <m:rPr>
+                                                  <m:brk m:alnAt="7"/>
+                                                </m:rPr>
+                                                <a:rPr lang="en-US" altLang="ko-KR" b="0" i="1">
+                                                  <a:latin typeface="Cambria Math" panose="02040503050406030204" pitchFamily="18" charset="0"/>
+                                                </a:rPr>
+                                                <m:t>1</m:t>
+                                              </m:r>
+                                              <m:r>
+                                                <a:rPr lang="en-US" altLang="ko-KR" b="0" i="1" smtClean="0">
+                                                  <a:latin typeface="Cambria Math" panose="02040503050406030204" pitchFamily="18" charset="0"/>
+                                                </a:rPr>
+                                                <m:t>𝑖</m:t>
+                                              </m:r>
+                                            </m:sub>
+                                          </m:sSub>
+                                        </m:e>
+                                        <m:e>
+                                          <m:r>
+                                            <a:rPr lang="en-US" altLang="ko-KR" b="0" i="1">
+                                              <a:latin typeface="Cambria Math" panose="02040503050406030204" pitchFamily="18" charset="0"/>
+                                            </a:rPr>
+                                            <m:t>⋯</m:t>
+                                          </m:r>
+                                        </m:e>
+                                      </m:mr>
+                                      <m:mr>
+                                        <m:e>
+                                          <m:sSub>
+                                            <m:sSubPr>
+                                              <m:ctrlPr>
+                                                <a:rPr lang="en-US" altLang="ko-KR" b="0" i="1">
+                                                  <a:latin typeface="Cambria Math"/>
+                                                </a:rPr>
+                                              </m:ctrlPr>
+                                            </m:sSubPr>
+                                            <m:e>
+                                              <m:r>
+                                                <a:rPr lang="en-US" altLang="ko-KR" b="0" i="1">
+                                                  <a:latin typeface="Cambria Math" panose="02040503050406030204" pitchFamily="18" charset="0"/>
+                                                </a:rPr>
+                                                <m:t>𝑎</m:t>
+                                              </m:r>
+                                            </m:e>
+                                            <m:sub>
+                                              <m:r>
+                                                <a:rPr lang="en-US" altLang="ko-KR" b="0" i="1">
+                                                  <a:latin typeface="Cambria Math" panose="02040503050406030204" pitchFamily="18" charset="0"/>
+                                                </a:rPr>
+                                                <m:t>2</m:t>
+                                              </m:r>
+                                              <m:r>
+                                                <a:rPr lang="en-US" altLang="ko-KR" b="0" i="1" smtClean="0">
+                                                  <a:latin typeface="Cambria Math" panose="02040503050406030204" pitchFamily="18" charset="0"/>
+                                                </a:rPr>
+                                                <m:t>𝑖</m:t>
+                                              </m:r>
+                                            </m:sub>
+                                          </m:sSub>
+                                        </m:e>
+                                        <m:e>
+                                          <m:r>
+                                            <a:rPr lang="en-US" altLang="ko-KR" b="0" i="1">
+                                              <a:latin typeface="Cambria Math" panose="02040503050406030204" pitchFamily="18" charset="0"/>
+                                            </a:rPr>
+                                            <m:t>⋯</m:t>
+                                          </m:r>
+                                        </m:e>
+                                      </m:mr>
+                                    </m:m>
+                                  </m:e>
+                                  <m:e>
+                                    <m:m>
+                                      <m:mPr>
+                                        <m:mcs>
+                                          <m:mc>
+                                            <m:mcPr>
+                                              <m:count m:val="1"/>
+                                              <m:mcJc m:val="center"/>
+                                            </m:mcPr>
+                                          </m:mc>
+                                        </m:mcs>
+                                        <m:ctrlPr>
+                                          <a:rPr lang="en-US" altLang="ko-KR" b="0" i="1">
+                                            <a:latin typeface="Cambria Math"/>
+                                          </a:rPr>
+                                        </m:ctrlPr>
+                                      </m:mPr>
+                                      <m:mr>
+                                        <m:e>
+                                          <m:sSub>
+                                            <m:sSubPr>
+                                              <m:ctrlPr>
+                                                <a:rPr lang="en-US" altLang="ko-KR" b="0" i="1">
+                                                  <a:latin typeface="Cambria Math"/>
+                                                </a:rPr>
+                                              </m:ctrlPr>
+                                            </m:sSubPr>
+                                            <m:e>
+                                              <m:r>
+                                                <m:rPr>
+                                                  <m:brk m:alnAt="7"/>
+                                                </m:rPr>
+                                                <a:rPr lang="en-US" altLang="ko-KR" b="0" i="1">
+                                                  <a:latin typeface="Cambria Math" panose="02040503050406030204" pitchFamily="18" charset="0"/>
+                                                </a:rPr>
+                                                <m:t>𝑎</m:t>
+                                              </m:r>
+                                            </m:e>
+                                            <m:sub>
+                                              <m:r>
+                                                <m:rPr>
+                                                  <m:brk m:alnAt="7"/>
+                                                </m:rPr>
+                                                <a:rPr lang="en-US" altLang="ko-KR" b="0" i="1">
+                                                  <a:latin typeface="Cambria Math" panose="02040503050406030204" pitchFamily="18" charset="0"/>
+                                                </a:rPr>
+                                                <m:t>1</m:t>
+                                              </m:r>
+                                              <m:r>
+                                                <a:rPr lang="en-US" altLang="ko-KR" b="0" i="1">
+                                                  <a:latin typeface="Cambria Math" panose="02040503050406030204" pitchFamily="18" charset="0"/>
+                                                </a:rPr>
+                                                <m:t>𝑛</m:t>
+                                              </m:r>
+                                            </m:sub>
+                                          </m:sSub>
+                                        </m:e>
+                                      </m:mr>
+                                      <m:mr>
+                                        <m:e>
+                                          <m:sSub>
+                                            <m:sSubPr>
+                                              <m:ctrlPr>
+                                                <a:rPr lang="en-US" altLang="ko-KR" b="0" i="1">
+                                                  <a:latin typeface="Cambria Math"/>
+                                                </a:rPr>
+                                              </m:ctrlPr>
+                                            </m:sSubPr>
+                                            <m:e>
+                                              <m:r>
+                                                <a:rPr lang="en-US" altLang="ko-KR" b="0" i="1">
+                                                  <a:latin typeface="Cambria Math" panose="02040503050406030204" pitchFamily="18" charset="0"/>
+                                                </a:rPr>
+                                                <m:t>𝑎</m:t>
+                                              </m:r>
+                                            </m:e>
+                                            <m:sub>
+                                              <m:r>
+                                                <a:rPr lang="en-US" altLang="ko-KR" b="0" i="1">
+                                                  <a:latin typeface="Cambria Math" panose="02040503050406030204" pitchFamily="18" charset="0"/>
+                                                </a:rPr>
+                                                <m:t>2</m:t>
+                                              </m:r>
+                                              <m:r>
+                                                <a:rPr lang="en-US" altLang="ko-KR" b="0" i="1">
+                                                  <a:latin typeface="Cambria Math" panose="02040503050406030204" pitchFamily="18" charset="0"/>
+                                                </a:rPr>
+                                                <m:t>𝑛</m:t>
+                                              </m:r>
+                                            </m:sub>
+                                          </m:sSub>
+                                        </m:e>
+                                      </m:mr>
+                                    </m:m>
+                                  </m:e>
+                                </m:mr>
+                                <m:mr>
+                                  <m:e>
+                                    <m:m>
+                                      <m:mPr>
+                                        <m:mcs>
+                                          <m:mc>
+                                            <m:mcPr>
+                                              <m:count m:val="2"/>
+                                              <m:mcJc m:val="center"/>
+                                            </m:mcPr>
+                                          </m:mc>
+                                        </m:mcs>
+                                        <m:ctrlPr>
+                                          <a:rPr lang="en-US" altLang="ko-KR" b="0" i="1">
+                                            <a:latin typeface="Cambria Math"/>
+                                          </a:rPr>
+                                        </m:ctrlPr>
+                                      </m:mPr>
+                                      <m:mr>
+                                        <m:e>
+                                          <m:r>
+                                            <a:rPr lang="en-US" altLang="ko-KR" b="0" i="1">
+                                              <a:latin typeface="Cambria Math" panose="02040503050406030204" pitchFamily="18" charset="0"/>
+                                            </a:rPr>
+                                            <m:t>⋮</m:t>
+                                          </m:r>
+                                          <m:r>
+                                            <a:rPr lang="en-US" altLang="ko-KR" b="0" i="1" smtClean="0">
+                                              <a:latin typeface="Cambria Math" panose="02040503050406030204" pitchFamily="18" charset="0"/>
+                                            </a:rPr>
+                                            <m:t>  </m:t>
+                                          </m:r>
+                                        </m:e>
+                                        <m:e>
+                                          <m:r>
+                                            <a:rPr lang="en-US" altLang="ko-KR" b="0" i="1">
+                                              <a:latin typeface="Cambria Math" panose="02040503050406030204" pitchFamily="18" charset="0"/>
+                                            </a:rPr>
+                                            <m:t> </m:t>
+                                          </m:r>
+                                        </m:e>
+                                      </m:mr>
+                                    </m:m>
+                                  </m:e>
+                                  <m:e>
+                                    <m:m>
+                                      <m:mPr>
+                                        <m:mcs>
+                                          <m:mc>
+                                            <m:mcPr>
+                                              <m:count m:val="2"/>
+                                              <m:mcJc m:val="center"/>
+                                            </m:mcPr>
+                                          </m:mc>
+                                        </m:mcs>
+                                        <m:ctrlPr>
+                                          <a:rPr lang="en-US" altLang="ko-KR" b="0" i="1">
+                                            <a:latin typeface="Cambria Math"/>
+                                          </a:rPr>
+                                        </m:ctrlPr>
+                                      </m:mPr>
+                                      <m:mr>
+                                        <m:e>
+                                          <m:r>
+                                            <a:rPr lang="en-US" altLang="ko-KR" b="0" i="1">
+                                              <a:latin typeface="Cambria Math" panose="02040503050406030204" pitchFamily="18" charset="0"/>
+                                            </a:rPr>
+                                            <m:t>⋮</m:t>
+                                          </m:r>
+                                          <m:r>
+                                            <a:rPr lang="en-US" altLang="ko-KR" b="0" i="1" smtClean="0">
+                                              <a:latin typeface="Cambria Math" panose="02040503050406030204" pitchFamily="18" charset="0"/>
+                                            </a:rPr>
+                                            <m:t>  </m:t>
+                                          </m:r>
+                                        </m:e>
+                                        <m:e>
+                                          <m:r>
+                                            <a:rPr lang="en-US" altLang="ko-KR" b="0" i="1">
+                                              <a:latin typeface="Cambria Math" panose="02040503050406030204" pitchFamily="18" charset="0"/>
+                                            </a:rPr>
+                                            <m:t> </m:t>
+                                          </m:r>
+                                        </m:e>
+                                      </m:mr>
+                                    </m:m>
+                                  </m:e>
+                                  <m:e>
+                                    <m:r>
+                                      <a:rPr lang="en-US" altLang="ko-KR" b="0" i="1">
+                                        <a:latin typeface="Cambria Math" panose="02040503050406030204" pitchFamily="18" charset="0"/>
+                                      </a:rPr>
+                                      <m:t>⋮</m:t>
+                                    </m:r>
+                                  </m:e>
+                                </m:mr>
+                                <m:mr>
+                                  <m:e>
+                                    <m:m>
+                                      <m:mPr>
+                                        <m:mcs>
+                                          <m:mc>
+                                            <m:mcPr>
+                                              <m:count m:val="2"/>
+                                              <m:mcJc m:val="center"/>
+                                            </m:mcPr>
+                                          </m:mc>
+                                        </m:mcs>
+                                        <m:ctrlPr>
+                                          <a:rPr lang="en-US" altLang="ko-KR" b="0" i="1">
+                                            <a:latin typeface="Cambria Math"/>
+                                          </a:rPr>
+                                        </m:ctrlPr>
+                                      </m:mPr>
+                                      <m:mr>
+                                        <m:e>
+                                          <m:sSub>
+                                            <m:sSubPr>
+                                              <m:ctrlPr>
+                                                <a:rPr lang="en-US" altLang="ko-KR" b="0" i="1">
+                                                  <a:latin typeface="Cambria Math"/>
+                                                </a:rPr>
+                                              </m:ctrlPr>
+                                            </m:sSubPr>
+                                            <m:e>
+                                              <m:r>
+                                                <m:rPr>
+                                                  <m:brk m:alnAt="7"/>
+                                                </m:rPr>
+                                                <a:rPr lang="en-US" altLang="ko-KR" b="0" i="1">
+                                                  <a:latin typeface="Cambria Math" panose="02040503050406030204" pitchFamily="18" charset="0"/>
+                                                </a:rPr>
+                                                <m:t>𝑎</m:t>
+                                              </m:r>
+                                            </m:e>
+                                            <m:sub>
+                                              <m:r>
+                                                <m:rPr>
+                                                  <m:brk m:alnAt="7"/>
+                                                </m:rPr>
+                                                <a:rPr lang="en-US" altLang="ko-KR" b="0" i="1">
+                                                  <a:latin typeface="Cambria Math" panose="02040503050406030204" pitchFamily="18" charset="0"/>
+                                                </a:rPr>
+                                                <m:t>𝑛</m:t>
+                                              </m:r>
+                                              <m:r>
+                                                <a:rPr lang="en-US" altLang="ko-KR" b="0" i="1">
+                                                  <a:latin typeface="Cambria Math" panose="02040503050406030204" pitchFamily="18" charset="0"/>
+                                                </a:rPr>
+                                                <m:t>1</m:t>
+                                              </m:r>
+                                            </m:sub>
+                                          </m:sSub>
+                                        </m:e>
+                                        <m:e>
+                                          <m:r>
+                                            <a:rPr lang="en-US" altLang="ko-KR" b="0" i="1">
+                                              <a:latin typeface="Cambria Math" panose="02040503050406030204" pitchFamily="18" charset="0"/>
+                                            </a:rPr>
+                                            <m:t>⋯</m:t>
+                                          </m:r>
+                                        </m:e>
+                                      </m:mr>
+                                    </m:m>
+                                  </m:e>
+                                  <m:e>
+                                    <m:m>
+                                      <m:mPr>
+                                        <m:mcs>
+                                          <m:mc>
+                                            <m:mcPr>
+                                              <m:count m:val="2"/>
+                                              <m:mcJc m:val="center"/>
+                                            </m:mcPr>
+                                          </m:mc>
+                                        </m:mcs>
+                                        <m:ctrlPr>
+                                          <a:rPr lang="en-US" altLang="ko-KR" b="0" i="1">
+                                            <a:latin typeface="Cambria Math"/>
+                                          </a:rPr>
+                                        </m:ctrlPr>
+                                      </m:mPr>
+                                      <m:mr>
+                                        <m:e>
+                                          <m:sSub>
+                                            <m:sSubPr>
+                                              <m:ctrlPr>
+                                                <a:rPr lang="en-US" altLang="ko-KR" b="0" i="1">
+                                                  <a:latin typeface="Cambria Math"/>
+                                                </a:rPr>
+                                              </m:ctrlPr>
+                                            </m:sSubPr>
+                                            <m:e>
+                                              <m:r>
+                                                <m:rPr>
+                                                  <m:brk m:alnAt="7"/>
+                                                </m:rPr>
+                                                <a:rPr lang="en-US" altLang="ko-KR" b="0" i="1">
+                                                  <a:latin typeface="Cambria Math" panose="02040503050406030204" pitchFamily="18" charset="0"/>
+                                                </a:rPr>
+                                                <m:t>𝑎</m:t>
+                                              </m:r>
+                                            </m:e>
+                                            <m:sub>
+                                              <m:r>
+                                                <m:rPr>
+                                                  <m:brk m:alnAt="7"/>
+                                                </m:rPr>
+                                                <a:rPr lang="en-US" altLang="ko-KR" b="0" i="1">
+                                                  <a:latin typeface="Cambria Math" panose="02040503050406030204" pitchFamily="18" charset="0"/>
+                                                </a:rPr>
+                                                <m:t>𝑛</m:t>
+                                              </m:r>
+                                              <m:r>
+                                                <a:rPr lang="en-US" altLang="ko-KR" b="0" i="1" smtClean="0">
+                                                  <a:latin typeface="Cambria Math" panose="02040503050406030204" pitchFamily="18" charset="0"/>
+                                                </a:rPr>
+                                                <m:t>𝑖</m:t>
+                                              </m:r>
+                                            </m:sub>
+                                          </m:sSub>
+                                        </m:e>
+                                        <m:e>
+                                          <m:r>
+                                            <a:rPr lang="en-US" altLang="ko-KR" b="0" i="1">
+                                              <a:latin typeface="Cambria Math" panose="02040503050406030204" pitchFamily="18" charset="0"/>
+                                            </a:rPr>
+                                            <m:t>⋯</m:t>
+                                          </m:r>
+                                        </m:e>
+                                      </m:mr>
+                                    </m:m>
+                                  </m:e>
+                                  <m:e>
+                                    <m:sSub>
+                                      <m:sSubPr>
+                                        <m:ctrlPr>
+                                          <a:rPr lang="en-US" altLang="ko-KR" b="0" i="1">
+                                            <a:latin typeface="Cambria Math"/>
+                                          </a:rPr>
+                                        </m:ctrlPr>
+                                      </m:sSubPr>
+                                      <m:e>
+                                        <m:r>
+                                          <a:rPr lang="en-US" altLang="ko-KR" b="0" i="1">
+                                            <a:latin typeface="Cambria Math" panose="02040503050406030204" pitchFamily="18" charset="0"/>
+                                          </a:rPr>
+                                          <m:t>𝑎</m:t>
+                                        </m:r>
+                                      </m:e>
+                                      <m:sub>
+                                        <m:r>
+                                          <a:rPr lang="en-US" altLang="ko-KR" b="0" i="1">
+                                            <a:latin typeface="Cambria Math" panose="02040503050406030204" pitchFamily="18" charset="0"/>
+                                          </a:rPr>
+                                          <m:t>𝑛𝑛</m:t>
+                                        </m:r>
+                                      </m:sub>
+                                    </m:sSub>
+                                  </m:e>
+                                </m:mr>
+                              </m:m>
+                            </m:e>
+                          </m:d>
+                        </m:den>
+                      </m:f>
+                      <m:r>
+                        <a:rPr lang="en-US" altLang="ko-KR" b="0" i="1" smtClean="0">
+                          <a:latin typeface="Cambria Math" panose="02040503050406030204" pitchFamily="18" charset="0"/>
+                        </a:rPr>
+                        <m:t> (</m:t>
+                      </m:r>
+                      <m:r>
+                        <a:rPr lang="en-US" altLang="ko-KR" b="0" i="1" smtClean="0">
+                          <a:latin typeface="Cambria Math" panose="02040503050406030204" pitchFamily="18" charset="0"/>
+                        </a:rPr>
+                        <m:t>𝑖</m:t>
+                      </m:r>
+                      <m:r>
+                        <a:rPr lang="en-US" altLang="ko-KR" b="0" i="1" smtClean="0">
+                          <a:latin typeface="Cambria Math" panose="02040503050406030204" pitchFamily="18" charset="0"/>
+                        </a:rPr>
+                        <m:t>=1,2,⋯,</m:t>
+                      </m:r>
+                      <m:r>
+                        <a:rPr lang="en-US" altLang="ko-KR" b="0" i="1" smtClean="0">
+                          <a:latin typeface="Cambria Math" panose="02040503050406030204" pitchFamily="18" charset="0"/>
+                        </a:rPr>
+                        <m:t>𝑛</m:t>
+                      </m:r>
+                      <m:r>
+                        <a:rPr lang="en-US" altLang="ko-KR" b="0" i="1" smtClean="0">
+                          <a:latin typeface="Cambria Math" panose="02040503050406030204" pitchFamily="18" charset="0"/>
+                        </a:rPr>
+                        <m:t>)</m:t>
+                      </m:r>
+                    </m:oMath>
+                  </m:oMathPara>
+                </a14:m>
+                <a:endParaRPr lang="ko-KR" altLang="en-US" b="0" dirty="0"/>
+              </a:p>
+            </p:txBody>
+          </p:sp>
+        </mc:Choice>
+        <mc:Fallback>
+          <p:sp>
+            <p:nvSpPr>
+              <p:cNvPr id="4" name="내용 개체 틀 2">
+                <a:extLst>
+                  <a:ext uri="{FF2B5EF4-FFF2-40B4-BE49-F238E27FC236}">
+                    <a16:creationId xmlns:a16="http://schemas.microsoft.com/office/drawing/2014/main" xmlns:a14="http://schemas.microsoft.com/office/drawing/2010/main" xmlns="" id="{CCF159EF-1CF5-4F52-939B-F9AC2F719955}"/>
+                  </a:ext>
+                </a:extLst>
+              </p:cNvPr>
+              <p:cNvSpPr>
+                <a:spLocks noGrp="1" noRot="1" noChangeAspect="1" noMove="1" noResize="1" noEditPoints="1" noAdjustHandles="1" noChangeArrowheads="1" noChangeShapeType="1" noTextEdit="1"/>
+              </p:cNvSpPr>
+              <p:nvPr>
+                <p:ph idx="1"/>
+              </p:nvPr>
+            </p:nvSpPr>
+            <p:spPr>
+              <a:xfrm>
+                <a:off x="838200" y="690113"/>
+                <a:ext cx="10515600" cy="5510000"/>
+              </a:xfrm>
+              <a:blipFill rotWithShape="1">
+                <a:blip r:embed="rId2"/>
+                <a:stretch>
+                  <a:fillRect t="-442"/>
+                </a:stretch>
+              </a:blipFill>
+            </p:spPr>
+            <p:txBody>
+              <a:bodyPr/>
+              <a:lstStyle/>
+              <a:p>
+                <a:r>
+                  <a:rPr lang="ko-KR" altLang="en-US">
+                    <a:noFill/>
+                  </a:rPr>
+                  <a:t> </a:t>
+                </a:r>
+              </a:p>
+            </p:txBody>
+          </p:sp>
+        </mc:Fallback>
+      </mc:AlternateContent>
+    </p:spTree>
+    <p:extLst>
+      <p:ext uri="{BB962C8B-B14F-4D97-AF65-F5344CB8AC3E}">
+        <p14:creationId xmlns:p14="http://schemas.microsoft.com/office/powerpoint/2010/main" val="3852693546"/>
+      </p:ext>
+    </p:extLst>
+  </p:cSld>
+  <p:clrMapOvr>
+    <a:masterClrMapping/>
+  </p:clrMapOvr>
+</p:sld>
+</file>
+
+<file path=ppt/slides/slide3.xml><?xml version="1.0" encoding="utf-8"?>
+<p:sld xmlns:a="http://schemas.openxmlformats.org/drawingml/2006/main" xmlns:r="http://schemas.openxmlformats.org/officeDocument/2006/relationships" xmlns:p="http://schemas.openxmlformats.org/presentationml/2006/main">
+  <p:cSld>
+    <p:spTree>
+      <p:nvGrpSpPr>
+        <p:cNvPr id="1" name=""/>
+        <p:cNvGrpSpPr/>
+        <p:nvPr/>
+      </p:nvGrpSpPr>
+      <p:grpSpPr>
+        <a:xfrm>
+          <a:off x="0" y="0"/>
+          <a:ext cx="0" cy="0"/>
+          <a:chOff x="0" y="0"/>
+          <a:chExt cx="0" cy="0"/>
+        </a:xfrm>
+      </p:grpSpPr>
       <p:cxnSp>
         <p:nvCxnSpPr>
           <p:cNvPr id="44" name="직선 화살표 연결선 43">
             <a:extLst>
               <a:ext uri="{FF2B5EF4-FFF2-40B4-BE49-F238E27FC236}">
-                <a16:creationId xmlns:a16="http://schemas.microsoft.com/office/drawing/2014/main" id="{408DA4CA-9C07-4C1F-816E-6FF32020E8EE}"/>
+                <a16:creationId xmlns:a16="http://schemas.microsoft.com/office/drawing/2014/main" xmlns="" id="{408DA4CA-9C07-4C1F-816E-6FF32020E8EE}"/>
               </a:ext>
             </a:extLst>
           </p:cNvPr>
@@ -4850,7 +7430,7 @@
           <p:cNvPr id="35" name="자유형: 도형 34">
             <a:extLst>
               <a:ext uri="{FF2B5EF4-FFF2-40B4-BE49-F238E27FC236}">
-                <a16:creationId xmlns:a16="http://schemas.microsoft.com/office/drawing/2014/main" id="{235A2CFD-712E-461D-9FCE-4AF1789681F8}"/>
+                <a16:creationId xmlns:a16="http://schemas.microsoft.com/office/drawing/2014/main" xmlns="" id="{235A2CFD-712E-461D-9FCE-4AF1789681F8}"/>
               </a:ext>
             </a:extLst>
           </p:cNvPr>
@@ -4960,7 +7540,7 @@
           <p:cNvPr id="21" name="직선 화살표 연결선 20">
             <a:extLst>
               <a:ext uri="{FF2B5EF4-FFF2-40B4-BE49-F238E27FC236}">
-                <a16:creationId xmlns:a16="http://schemas.microsoft.com/office/drawing/2014/main" id="{63FBEDD2-9FDD-4417-8099-C8AAE33FABFC}"/>
+                <a16:creationId xmlns:a16="http://schemas.microsoft.com/office/drawing/2014/main" xmlns="" id="{63FBEDD2-9FDD-4417-8099-C8AAE33FABFC}"/>
               </a:ext>
             </a:extLst>
           </p:cNvPr>
@@ -5008,7 +7588,7 @@
           <p:cNvPr id="18" name="직선 화살표 연결선 17">
             <a:extLst>
               <a:ext uri="{FF2B5EF4-FFF2-40B4-BE49-F238E27FC236}">
-                <a16:creationId xmlns:a16="http://schemas.microsoft.com/office/drawing/2014/main" id="{B4DDF3C4-C30E-465B-BFD6-9C6F153ECD21}"/>
+                <a16:creationId xmlns:a16="http://schemas.microsoft.com/office/drawing/2014/main" xmlns="" id="{B4DDF3C4-C30E-465B-BFD6-9C6F153ECD21}"/>
               </a:ext>
             </a:extLst>
           </p:cNvPr>
@@ -5056,7 +7636,7 @@
           <p:cNvPr id="13" name="직선 화살표 연결선 12">
             <a:extLst>
               <a:ext uri="{FF2B5EF4-FFF2-40B4-BE49-F238E27FC236}">
-                <a16:creationId xmlns:a16="http://schemas.microsoft.com/office/drawing/2014/main" id="{479EAD9D-DDD0-4CAE-8E4A-409E686834DF}"/>
+                <a16:creationId xmlns:a16="http://schemas.microsoft.com/office/drawing/2014/main" xmlns="" id="{479EAD9D-DDD0-4CAE-8E4A-409E686834DF}"/>
               </a:ext>
             </a:extLst>
           </p:cNvPr>
@@ -5095,7 +7675,7 @@
           <p:cNvPr id="14" name="직선 화살표 연결선 13">
             <a:extLst>
               <a:ext uri="{FF2B5EF4-FFF2-40B4-BE49-F238E27FC236}">
-                <a16:creationId xmlns:a16="http://schemas.microsoft.com/office/drawing/2014/main" id="{CF1D3714-B5A2-440B-A543-9AD09A05DCF9}"/>
+                <a16:creationId xmlns:a16="http://schemas.microsoft.com/office/drawing/2014/main" xmlns="" id="{CF1D3714-B5A2-440B-A543-9AD09A05DCF9}"/>
               </a:ext>
             </a:extLst>
           </p:cNvPr>
@@ -5141,7 +7721,7 @@
               <p:cNvPr id="39" name="TextBox 38">
                 <a:extLst>
                   <a:ext uri="{FF2B5EF4-FFF2-40B4-BE49-F238E27FC236}">
-                    <a16:creationId xmlns:a16="http://schemas.microsoft.com/office/drawing/2014/main" id="{FF1C23B8-2998-4007-8A52-6E605179BA34}"/>
+                    <a16:creationId xmlns:a16="http://schemas.microsoft.com/office/drawing/2014/main" xmlns="" id="{FF1C23B8-2998-4007-8A52-6E605179BA34}"/>
                   </a:ext>
                 </a:extLst>
               </p:cNvPr>
@@ -5180,7 +7760,7 @@
                               <a:solidFill>
                                 <a:schemeClr val="accent1"/>
                               </a:solidFill>
-                              <a:latin typeface="Cambria Math" panose="02040503050406030204" pitchFamily="18" charset="0"/>
+                              <a:latin typeface="Cambria Math"/>
                             </a:rPr>
                           </m:ctrlPr>
                         </m:dPr>
@@ -5200,7 +7780,7 @@
                                   <a:solidFill>
                                     <a:schemeClr val="accent1"/>
                                   </a:solidFill>
-                                  <a:latin typeface="Cambria Math" panose="02040503050406030204" pitchFamily="18" charset="0"/>
+                                  <a:latin typeface="Cambria Math"/>
                                 </a:rPr>
                               </m:ctrlPr>
                             </m:mPr>
@@ -5300,7 +7880,7 @@
               <p:cNvPr id="41" name="TextBox 40">
                 <a:extLst>
                   <a:ext uri="{FF2B5EF4-FFF2-40B4-BE49-F238E27FC236}">
-                    <a16:creationId xmlns:a16="http://schemas.microsoft.com/office/drawing/2014/main" id="{A6FFDD7E-9292-42FD-8C42-EC950A10460A}"/>
+                    <a16:creationId xmlns:a16="http://schemas.microsoft.com/office/drawing/2014/main" xmlns="" id="{A6FFDD7E-9292-42FD-8C42-EC950A10460A}"/>
                   </a:ext>
                 </a:extLst>
               </p:cNvPr>
@@ -5340,7 +7920,7 @@
                                   <a:lumOff val="80000"/>
                                 </a:schemeClr>
                               </a:solidFill>
-                              <a:latin typeface="Cambria Math" panose="02040503050406030204" pitchFamily="18" charset="0"/>
+                              <a:latin typeface="Cambria Math"/>
                             </a:rPr>
                           </m:ctrlPr>
                         </m:sSubPr>
@@ -5385,7 +7965,7 @@
                                   <a:lumOff val="80000"/>
                                 </a:schemeClr>
                               </a:solidFill>
-                              <a:latin typeface="Cambria Math" panose="02040503050406030204" pitchFamily="18" charset="0"/>
+                              <a:latin typeface="Cambria Math"/>
                             </a:rPr>
                           </m:ctrlPr>
                         </m:dPr>
@@ -5408,7 +7988,7 @@
                                       <a:lumOff val="80000"/>
                                     </a:schemeClr>
                                   </a:solidFill>
-                                  <a:latin typeface="Cambria Math" panose="02040503050406030204" pitchFamily="18" charset="0"/>
+                                  <a:latin typeface="Cambria Math"/>
                                 </a:rPr>
                               </m:ctrlPr>
                             </m:mPr>
@@ -5517,7 +8097,7 @@
               <p:cNvPr id="42" name="TextBox 41">
                 <a:extLst>
                   <a:ext uri="{FF2B5EF4-FFF2-40B4-BE49-F238E27FC236}">
-                    <a16:creationId xmlns:a16="http://schemas.microsoft.com/office/drawing/2014/main" id="{3167C7FE-2BED-4D69-9D09-8E641660B37F}"/>
+                    <a16:creationId xmlns:a16="http://schemas.microsoft.com/office/drawing/2014/main" xmlns="" id="{3167C7FE-2BED-4D69-9D09-8E641660B37F}"/>
                   </a:ext>
                 </a:extLst>
               </p:cNvPr>
@@ -5556,7 +8136,7 @@
                               <a:solidFill>
                                 <a:schemeClr val="accent2"/>
                               </a:solidFill>
-                              <a:latin typeface="Cambria Math" panose="02040503050406030204" pitchFamily="18" charset="0"/>
+                              <a:latin typeface="Cambria Math"/>
                             </a:rPr>
                           </m:ctrlPr>
                         </m:dPr>
@@ -5576,7 +8156,7 @@
                                   <a:solidFill>
                                     <a:schemeClr val="accent2"/>
                                   </a:solidFill>
-                                  <a:latin typeface="Cambria Math" panose="02040503050406030204" pitchFamily="18" charset="0"/>
+                                  <a:latin typeface="Cambria Math"/>
                                 </a:rPr>
                               </m:ctrlPr>
                             </m:mPr>
@@ -5673,7 +8253,7 @@
               <p:cNvPr id="43" name="TextBox 42">
                 <a:extLst>
                   <a:ext uri="{FF2B5EF4-FFF2-40B4-BE49-F238E27FC236}">
-                    <a16:creationId xmlns:a16="http://schemas.microsoft.com/office/drawing/2014/main" id="{68C30D00-2045-4CBB-818E-7E315DBE5CB3}"/>
+                    <a16:creationId xmlns:a16="http://schemas.microsoft.com/office/drawing/2014/main" xmlns="" id="{68C30D00-2045-4CBB-818E-7E315DBE5CB3}"/>
                   </a:ext>
                 </a:extLst>
               </p:cNvPr>
@@ -5710,7 +8290,7 @@
                               <a:solidFill>
                                 <a:schemeClr val="accent2"/>
                               </a:solidFill>
-                              <a:latin typeface="Cambria Math" panose="02040503050406030204" pitchFamily="18" charset="0"/>
+                              <a:latin typeface="Cambria Math"/>
                             </a:rPr>
                           </m:ctrlPr>
                         </m:sSubPr>
@@ -5746,7 +8326,7 @@
                               <a:solidFill>
                                 <a:schemeClr val="accent2"/>
                               </a:solidFill>
-                              <a:latin typeface="Cambria Math" panose="02040503050406030204" pitchFamily="18" charset="0"/>
+                              <a:latin typeface="Cambria Math"/>
                             </a:rPr>
                           </m:ctrlPr>
                         </m:dPr>
@@ -5766,7 +8346,7 @@
                                   <a:solidFill>
                                     <a:schemeClr val="accent2"/>
                                   </a:solidFill>
-                                  <a:latin typeface="Cambria Math" panose="02040503050406030204" pitchFamily="18" charset="0"/>
+                                  <a:latin typeface="Cambria Math"/>
                                 </a:rPr>
                               </m:ctrlPr>
                             </m:mPr>
@@ -5861,7 +8441,7 @@
           <p:cNvPr id="49" name="직선 화살표 연결선 48">
             <a:extLst>
               <a:ext uri="{FF2B5EF4-FFF2-40B4-BE49-F238E27FC236}">
-                <a16:creationId xmlns:a16="http://schemas.microsoft.com/office/drawing/2014/main" id="{25ACF200-05F2-4660-92AE-B1A7B9F5D4B9}"/>
+                <a16:creationId xmlns:a16="http://schemas.microsoft.com/office/drawing/2014/main" xmlns="" id="{25ACF200-05F2-4660-92AE-B1A7B9F5D4B9}"/>
               </a:ext>
             </a:extLst>
           </p:cNvPr>
@@ -5909,7 +8489,7 @@
           <p:cNvPr id="50" name="직선 화살표 연결선 49">
             <a:extLst>
               <a:ext uri="{FF2B5EF4-FFF2-40B4-BE49-F238E27FC236}">
-                <a16:creationId xmlns:a16="http://schemas.microsoft.com/office/drawing/2014/main" id="{0F178B99-7DC6-4819-8EC6-929DF8488493}"/>
+                <a16:creationId xmlns:a16="http://schemas.microsoft.com/office/drawing/2014/main" xmlns="" id="{0F178B99-7DC6-4819-8EC6-929DF8488493}"/>
               </a:ext>
             </a:extLst>
           </p:cNvPr>
@@ -5959,7 +8539,7 @@
               <p:cNvPr id="17" name="TextBox 16">
                 <a:extLst>
                   <a:ext uri="{FF2B5EF4-FFF2-40B4-BE49-F238E27FC236}">
-                    <a16:creationId xmlns:a16="http://schemas.microsoft.com/office/drawing/2014/main" id="{49842504-4EBE-45F0-A4DC-E3E1155D1C7B}"/>
+                    <a16:creationId xmlns:a16="http://schemas.microsoft.com/office/drawing/2014/main" xmlns="" id="{49842504-4EBE-45F0-A4DC-E3E1155D1C7B}"/>
                   </a:ext>
                 </a:extLst>
               </p:cNvPr>
@@ -6006,7 +8586,7 @@
                               <a:effectLst/>
                               <a:uLnTx/>
                               <a:uFillTx/>
-                              <a:latin typeface="Cambria Math" panose="02040503050406030204" pitchFamily="18" charset="0"/>
+                              <a:latin typeface="Cambria Math"/>
                               <a:cs typeface="+mn-cs"/>
                             </a:rPr>
                           </m:ctrlPr>
@@ -6035,7 +8615,7 @@
                                   <a:effectLst/>
                                   <a:uLnTx/>
                                   <a:uFillTx/>
-                                  <a:latin typeface="Cambria Math" panose="02040503050406030204" pitchFamily="18" charset="0"/>
+                                  <a:latin typeface="Cambria Math"/>
                                   <a:cs typeface="+mn-cs"/>
                                 </a:rPr>
                               </m:ctrlPr>
@@ -6057,7 +8637,7 @@
                                         <a:effectLst/>
                                         <a:uLnTx/>
                                         <a:uFillTx/>
-                                        <a:latin typeface="Cambria Math" panose="02040503050406030204" pitchFamily="18" charset="0"/>
+                                        <a:latin typeface="Cambria Math"/>
                                         <a:cs typeface="+mn-cs"/>
                                       </a:rPr>
                                     </m:ctrlPr>
@@ -6122,7 +8702,7 @@
                                         <a:effectLst/>
                                         <a:uLnTx/>
                                         <a:uFillTx/>
-                                        <a:latin typeface="Cambria Math" panose="02040503050406030204" pitchFamily="18" charset="0"/>
+                                        <a:latin typeface="Cambria Math"/>
                                         <a:cs typeface="+mn-cs"/>
                                       </a:rPr>
                                     </m:ctrlPr>
@@ -6239,7 +8819,7 @@
               <p:cNvPr id="19" name="TextBox 18">
                 <a:extLst>
                   <a:ext uri="{FF2B5EF4-FFF2-40B4-BE49-F238E27FC236}">
-                    <a16:creationId xmlns:a16="http://schemas.microsoft.com/office/drawing/2014/main" id="{3DFE12EC-016C-4325-902D-060AA87E4E2E}"/>
+                    <a16:creationId xmlns:a16="http://schemas.microsoft.com/office/drawing/2014/main" xmlns="" id="{3DFE12EC-016C-4325-902D-060AA87E4E2E}"/>
                   </a:ext>
                 </a:extLst>
               </p:cNvPr>
@@ -6276,7 +8856,7 @@
                               <a:solidFill>
                                 <a:schemeClr val="accent6"/>
                               </a:solidFill>
-                              <a:latin typeface="Cambria Math" panose="02040503050406030204" pitchFamily="18" charset="0"/>
+                              <a:latin typeface="Cambria Math"/>
                             </a:rPr>
                           </m:ctrlPr>
                         </m:funcPr>
@@ -6302,7 +8882,7 @@
                                   <a:solidFill>
                                     <a:schemeClr val="accent6"/>
                                   </a:solidFill>
-                                  <a:latin typeface="Cambria Math" panose="02040503050406030204" pitchFamily="18" charset="0"/>
+                                  <a:latin typeface="Cambria Math"/>
                                 </a:rPr>
                               </m:ctrlPr>
                             </m:dPr>
@@ -6316,7 +8896,7 @@
                                       <a:solidFill>
                                         <a:schemeClr val="accent6"/>
                                       </a:solidFill>
-                                      <a:latin typeface="Cambria Math" panose="02040503050406030204" pitchFamily="18" charset="0"/>
+                                      <a:latin typeface="Cambria Math"/>
                                     </a:rPr>
                                   </m:ctrlPr>
                                 </m:dPr>
@@ -6336,7 +8916,7 @@
                                           <a:solidFill>
                                             <a:schemeClr val="accent6"/>
                                           </a:solidFill>
-                                          <a:latin typeface="Cambria Math" panose="02040503050406030204" pitchFamily="18" charset="0"/>
+                                          <a:latin typeface="Cambria Math"/>
                                         </a:rPr>
                                       </m:ctrlPr>
                                     </m:mPr>
@@ -6468,7 +9048,7 @@
 </p:sld>
 </file>
 
-<file path=ppt/slides/slide3.xml><?xml version="1.0" encoding="utf-8"?>
+<file path=ppt/slides/slide4.xml><?xml version="1.0" encoding="utf-8"?>
 <p:sld xmlns:a="http://schemas.openxmlformats.org/drawingml/2006/main" xmlns:r="http://schemas.openxmlformats.org/officeDocument/2006/relationships" xmlns:p="http://schemas.openxmlformats.org/presentationml/2006/main">
   <p:cSld>
     <p:spTree>
@@ -6490,7 +9070,7 @@
           <p:cNvPr id="44" name="직선 화살표 연결선 43">
             <a:extLst>
               <a:ext uri="{FF2B5EF4-FFF2-40B4-BE49-F238E27FC236}">
-                <a16:creationId xmlns:a16="http://schemas.microsoft.com/office/drawing/2014/main" id="{408DA4CA-9C07-4C1F-816E-6FF32020E8EE}"/>
+                <a16:creationId xmlns:a16="http://schemas.microsoft.com/office/drawing/2014/main" xmlns="" id="{408DA4CA-9C07-4C1F-816E-6FF32020E8EE}"/>
               </a:ext>
             </a:extLst>
           </p:cNvPr>
@@ -6537,7 +9117,7 @@
           <p:cNvPr id="22" name="자유형: 도형 21">
             <a:extLst>
               <a:ext uri="{FF2B5EF4-FFF2-40B4-BE49-F238E27FC236}">
-                <a16:creationId xmlns:a16="http://schemas.microsoft.com/office/drawing/2014/main" id="{2FEAE739-7B88-43C2-8A1E-915028B1FCAB}"/>
+                <a16:creationId xmlns:a16="http://schemas.microsoft.com/office/drawing/2014/main" xmlns="" id="{2FEAE739-7B88-43C2-8A1E-915028B1FCAB}"/>
               </a:ext>
             </a:extLst>
           </p:cNvPr>
@@ -6641,7 +9221,7 @@
           <p:cNvPr id="21" name="직선 화살표 연결선 20">
             <a:extLst>
               <a:ext uri="{FF2B5EF4-FFF2-40B4-BE49-F238E27FC236}">
-                <a16:creationId xmlns:a16="http://schemas.microsoft.com/office/drawing/2014/main" id="{63FBEDD2-9FDD-4417-8099-C8AAE33FABFC}"/>
+                <a16:creationId xmlns:a16="http://schemas.microsoft.com/office/drawing/2014/main" xmlns="" id="{63FBEDD2-9FDD-4417-8099-C8AAE33FABFC}"/>
               </a:ext>
             </a:extLst>
           </p:cNvPr>
@@ -6686,7 +9266,7 @@
           <p:cNvPr id="18" name="직선 화살표 연결선 17">
             <a:extLst>
               <a:ext uri="{FF2B5EF4-FFF2-40B4-BE49-F238E27FC236}">
-                <a16:creationId xmlns:a16="http://schemas.microsoft.com/office/drawing/2014/main" id="{B4DDF3C4-C30E-465B-BFD6-9C6F153ECD21}"/>
+                <a16:creationId xmlns:a16="http://schemas.microsoft.com/office/drawing/2014/main" xmlns="" id="{B4DDF3C4-C30E-465B-BFD6-9C6F153ECD21}"/>
               </a:ext>
             </a:extLst>
           </p:cNvPr>
@@ -6734,7 +9314,7 @@
           <p:cNvPr id="13" name="직선 화살표 연결선 12">
             <a:extLst>
               <a:ext uri="{FF2B5EF4-FFF2-40B4-BE49-F238E27FC236}">
-                <a16:creationId xmlns:a16="http://schemas.microsoft.com/office/drawing/2014/main" id="{479EAD9D-DDD0-4CAE-8E4A-409E686834DF}"/>
+                <a16:creationId xmlns:a16="http://schemas.microsoft.com/office/drawing/2014/main" xmlns="" id="{479EAD9D-DDD0-4CAE-8E4A-409E686834DF}"/>
               </a:ext>
             </a:extLst>
           </p:cNvPr>
@@ -6773,7 +9353,7 @@
           <p:cNvPr id="14" name="직선 화살표 연결선 13">
             <a:extLst>
               <a:ext uri="{FF2B5EF4-FFF2-40B4-BE49-F238E27FC236}">
-                <a16:creationId xmlns:a16="http://schemas.microsoft.com/office/drawing/2014/main" id="{CF1D3714-B5A2-440B-A543-9AD09A05DCF9}"/>
+                <a16:creationId xmlns:a16="http://schemas.microsoft.com/office/drawing/2014/main" xmlns="" id="{CF1D3714-B5A2-440B-A543-9AD09A05DCF9}"/>
               </a:ext>
             </a:extLst>
           </p:cNvPr>
@@ -6819,7 +9399,7 @@
               <p:cNvPr id="39" name="TextBox 38">
                 <a:extLst>
                   <a:ext uri="{FF2B5EF4-FFF2-40B4-BE49-F238E27FC236}">
-                    <a16:creationId xmlns:a16="http://schemas.microsoft.com/office/drawing/2014/main" id="{FF1C23B8-2998-4007-8A52-6E605179BA34}"/>
+                    <a16:creationId xmlns:a16="http://schemas.microsoft.com/office/drawing/2014/main" xmlns="" id="{FF1C23B8-2998-4007-8A52-6E605179BA34}"/>
                   </a:ext>
                 </a:extLst>
               </p:cNvPr>
@@ -6858,7 +9438,7 @@
                               <a:solidFill>
                                 <a:schemeClr val="accent1"/>
                               </a:solidFill>
-                              <a:latin typeface="Cambria Math" panose="02040503050406030204" pitchFamily="18" charset="0"/>
+                              <a:latin typeface="Cambria Math"/>
                             </a:rPr>
                           </m:ctrlPr>
                         </m:dPr>
@@ -6878,7 +9458,7 @@
                                   <a:solidFill>
                                     <a:schemeClr val="accent1"/>
                                   </a:solidFill>
-                                  <a:latin typeface="Cambria Math" panose="02040503050406030204" pitchFamily="18" charset="0"/>
+                                  <a:latin typeface="Cambria Math"/>
                                 </a:rPr>
                               </m:ctrlPr>
                             </m:mPr>
@@ -6978,7 +9558,7 @@
               <p:cNvPr id="41" name="TextBox 40">
                 <a:extLst>
                   <a:ext uri="{FF2B5EF4-FFF2-40B4-BE49-F238E27FC236}">
-                    <a16:creationId xmlns:a16="http://schemas.microsoft.com/office/drawing/2014/main" id="{A6FFDD7E-9292-42FD-8C42-EC950A10460A}"/>
+                    <a16:creationId xmlns:a16="http://schemas.microsoft.com/office/drawing/2014/main" xmlns="" id="{A6FFDD7E-9292-42FD-8C42-EC950A10460A}"/>
                   </a:ext>
                 </a:extLst>
               </p:cNvPr>
@@ -7018,7 +9598,7 @@
                                   <a:lumOff val="80000"/>
                                 </a:schemeClr>
                               </a:solidFill>
-                              <a:latin typeface="Cambria Math" panose="02040503050406030204" pitchFamily="18" charset="0"/>
+                              <a:latin typeface="Cambria Math"/>
                             </a:rPr>
                           </m:ctrlPr>
                         </m:sSubPr>
@@ -7063,7 +9643,7 @@
                                   <a:lumOff val="80000"/>
                                 </a:schemeClr>
                               </a:solidFill>
-                              <a:latin typeface="Cambria Math" panose="02040503050406030204" pitchFamily="18" charset="0"/>
+                              <a:latin typeface="Cambria Math"/>
                             </a:rPr>
                           </m:ctrlPr>
                         </m:dPr>
@@ -7086,7 +9666,7 @@
                                       <a:lumOff val="80000"/>
                                     </a:schemeClr>
                                   </a:solidFill>
-                                  <a:latin typeface="Cambria Math" panose="02040503050406030204" pitchFamily="18" charset="0"/>
+                                  <a:latin typeface="Cambria Math"/>
                                 </a:rPr>
                               </m:ctrlPr>
                             </m:mPr>
@@ -7195,7 +9775,7 @@
               <p:cNvPr id="42" name="TextBox 41">
                 <a:extLst>
                   <a:ext uri="{FF2B5EF4-FFF2-40B4-BE49-F238E27FC236}">
-                    <a16:creationId xmlns:a16="http://schemas.microsoft.com/office/drawing/2014/main" id="{3167C7FE-2BED-4D69-9D09-8E641660B37F}"/>
+                    <a16:creationId xmlns:a16="http://schemas.microsoft.com/office/drawing/2014/main" xmlns="" id="{3167C7FE-2BED-4D69-9D09-8E641660B37F}"/>
                   </a:ext>
                 </a:extLst>
               </p:cNvPr>
@@ -7234,7 +9814,7 @@
                               <a:solidFill>
                                 <a:schemeClr val="accent2"/>
                               </a:solidFill>
-                              <a:latin typeface="Cambria Math" panose="02040503050406030204" pitchFamily="18" charset="0"/>
+                              <a:latin typeface="Cambria Math"/>
                             </a:rPr>
                           </m:ctrlPr>
                         </m:dPr>
@@ -7254,7 +9834,7 @@
                                   <a:solidFill>
                                     <a:schemeClr val="accent2"/>
                                   </a:solidFill>
-                                  <a:latin typeface="Cambria Math" panose="02040503050406030204" pitchFamily="18" charset="0"/>
+                                  <a:latin typeface="Cambria Math"/>
                                 </a:rPr>
                               </m:ctrlPr>
                             </m:mPr>
@@ -7351,7 +9931,7 @@
               <p:cNvPr id="43" name="TextBox 42">
                 <a:extLst>
                   <a:ext uri="{FF2B5EF4-FFF2-40B4-BE49-F238E27FC236}">
-                    <a16:creationId xmlns:a16="http://schemas.microsoft.com/office/drawing/2014/main" id="{68C30D00-2045-4CBB-818E-7E315DBE5CB3}"/>
+                    <a16:creationId xmlns:a16="http://schemas.microsoft.com/office/drawing/2014/main" xmlns="" id="{68C30D00-2045-4CBB-818E-7E315DBE5CB3}"/>
                   </a:ext>
                 </a:extLst>
               </p:cNvPr>
@@ -7388,7 +9968,7 @@
                               <a:solidFill>
                                 <a:schemeClr val="accent2"/>
                               </a:solidFill>
-                              <a:latin typeface="Cambria Math" panose="02040503050406030204" pitchFamily="18" charset="0"/>
+                              <a:latin typeface="Cambria Math"/>
                             </a:rPr>
                           </m:ctrlPr>
                         </m:sSubPr>
@@ -7424,7 +10004,7 @@
                               <a:solidFill>
                                 <a:schemeClr val="accent2"/>
                               </a:solidFill>
-                              <a:latin typeface="Cambria Math" panose="02040503050406030204" pitchFamily="18" charset="0"/>
+                              <a:latin typeface="Cambria Math"/>
                             </a:rPr>
                           </m:ctrlPr>
                         </m:dPr>
@@ -7444,7 +10024,7 @@
                                   <a:solidFill>
                                     <a:schemeClr val="accent2"/>
                                   </a:solidFill>
-                                  <a:latin typeface="Cambria Math" panose="02040503050406030204" pitchFamily="18" charset="0"/>
+                                  <a:latin typeface="Cambria Math"/>
                                 </a:rPr>
                               </m:ctrlPr>
                             </m:mPr>
@@ -7539,7 +10119,7 @@
           <p:cNvPr id="49" name="직선 화살표 연결선 48">
             <a:extLst>
               <a:ext uri="{FF2B5EF4-FFF2-40B4-BE49-F238E27FC236}">
-                <a16:creationId xmlns:a16="http://schemas.microsoft.com/office/drawing/2014/main" id="{25ACF200-05F2-4660-92AE-B1A7B9F5D4B9}"/>
+                <a16:creationId xmlns:a16="http://schemas.microsoft.com/office/drawing/2014/main" xmlns="" id="{25ACF200-05F2-4660-92AE-B1A7B9F5D4B9}"/>
               </a:ext>
             </a:extLst>
           </p:cNvPr>
@@ -7587,7 +10167,7 @@
           <p:cNvPr id="50" name="직선 화살표 연결선 49">
             <a:extLst>
               <a:ext uri="{FF2B5EF4-FFF2-40B4-BE49-F238E27FC236}">
-                <a16:creationId xmlns:a16="http://schemas.microsoft.com/office/drawing/2014/main" id="{0F178B99-7DC6-4819-8EC6-929DF8488493}"/>
+                <a16:creationId xmlns:a16="http://schemas.microsoft.com/office/drawing/2014/main" xmlns="" id="{0F178B99-7DC6-4819-8EC6-929DF8488493}"/>
               </a:ext>
             </a:extLst>
           </p:cNvPr>
@@ -7637,7 +10217,7 @@
               <p:cNvPr id="17" name="TextBox 16">
                 <a:extLst>
                   <a:ext uri="{FF2B5EF4-FFF2-40B4-BE49-F238E27FC236}">
-                    <a16:creationId xmlns:a16="http://schemas.microsoft.com/office/drawing/2014/main" id="{49842504-4EBE-45F0-A4DC-E3E1155D1C7B}"/>
+                    <a16:creationId xmlns:a16="http://schemas.microsoft.com/office/drawing/2014/main" xmlns="" id="{49842504-4EBE-45F0-A4DC-E3E1155D1C7B}"/>
                   </a:ext>
                 </a:extLst>
               </p:cNvPr>
@@ -7684,7 +10264,7 @@
                               <a:effectLst/>
                               <a:uLnTx/>
                               <a:uFillTx/>
-                              <a:latin typeface="Cambria Math" panose="02040503050406030204" pitchFamily="18" charset="0"/>
+                              <a:latin typeface="Cambria Math"/>
                               <a:cs typeface="+mn-cs"/>
                             </a:rPr>
                           </m:ctrlPr>
@@ -7713,7 +10293,7 @@
                                   <a:effectLst/>
                                   <a:uLnTx/>
                                   <a:uFillTx/>
-                                  <a:latin typeface="Cambria Math" panose="02040503050406030204" pitchFamily="18" charset="0"/>
+                                  <a:latin typeface="Cambria Math"/>
                                   <a:cs typeface="+mn-cs"/>
                                 </a:rPr>
                               </m:ctrlPr>
@@ -7735,7 +10315,7 @@
                                         <a:effectLst/>
                                         <a:uLnTx/>
                                         <a:uFillTx/>
-                                        <a:latin typeface="Cambria Math" panose="02040503050406030204" pitchFamily="18" charset="0"/>
+                                        <a:latin typeface="Cambria Math"/>
                                         <a:cs typeface="+mn-cs"/>
                                       </a:rPr>
                                     </m:ctrlPr>
@@ -7800,7 +10380,7 @@
                                         <a:effectLst/>
                                         <a:uLnTx/>
                                         <a:uFillTx/>
-                                        <a:latin typeface="Cambria Math" panose="02040503050406030204" pitchFamily="18" charset="0"/>
+                                        <a:latin typeface="Cambria Math"/>
                                         <a:cs typeface="+mn-cs"/>
                                       </a:rPr>
                                     </m:ctrlPr>
@@ -7917,7 +10497,7 @@
               <p:cNvPr id="19" name="TextBox 18">
                 <a:extLst>
                   <a:ext uri="{FF2B5EF4-FFF2-40B4-BE49-F238E27FC236}">
-                    <a16:creationId xmlns:a16="http://schemas.microsoft.com/office/drawing/2014/main" id="{3DFE12EC-016C-4325-902D-060AA87E4E2E}"/>
+                    <a16:creationId xmlns:a16="http://schemas.microsoft.com/office/drawing/2014/main" xmlns="" id="{3DFE12EC-016C-4325-902D-060AA87E4E2E}"/>
                   </a:ext>
                 </a:extLst>
               </p:cNvPr>
@@ -7954,7 +10534,7 @@
                               <a:solidFill>
                                 <a:schemeClr val="accent6"/>
                               </a:solidFill>
-                              <a:latin typeface="Cambria Math" panose="02040503050406030204" pitchFamily="18" charset="0"/>
+                              <a:latin typeface="Cambria Math"/>
                             </a:rPr>
                           </m:ctrlPr>
                         </m:sSubPr>
@@ -7988,7 +10568,7 @@
                               <a:solidFill>
                                 <a:schemeClr val="accent6"/>
                               </a:solidFill>
-                              <a:latin typeface="Cambria Math" panose="02040503050406030204" pitchFamily="18" charset="0"/>
+                              <a:latin typeface="Cambria Math"/>
                             </a:rPr>
                           </m:ctrlPr>
                         </m:funcPr>
@@ -8014,7 +10594,7 @@
                                   <a:solidFill>
                                     <a:schemeClr val="accent6"/>
                                   </a:solidFill>
-                                  <a:latin typeface="Cambria Math" panose="02040503050406030204" pitchFamily="18" charset="0"/>
+                                  <a:latin typeface="Cambria Math"/>
                                 </a:rPr>
                               </m:ctrlPr>
                             </m:dPr>
@@ -8028,7 +10608,7 @@
                                       <a:solidFill>
                                         <a:schemeClr val="accent6"/>
                                       </a:solidFill>
-                                      <a:latin typeface="Cambria Math" panose="02040503050406030204" pitchFamily="18" charset="0"/>
+                                      <a:latin typeface="Cambria Math"/>
                                     </a:rPr>
                                   </m:ctrlPr>
                                 </m:dPr>
@@ -8048,7 +10628,7 @@
                                           <a:solidFill>
                                             <a:schemeClr val="accent6"/>
                                           </a:solidFill>
-                                          <a:latin typeface="Cambria Math" panose="02040503050406030204" pitchFamily="18" charset="0"/>
+                                          <a:latin typeface="Cambria Math"/>
                                         </a:rPr>
                                       </m:ctrlPr>
                                     </m:mPr>
@@ -8180,7 +10760,7 @@
 </p:sld>
 </file>
 
-<file path=ppt/slides/slide4.xml><?xml version="1.0" encoding="utf-8"?>
+<file path=ppt/slides/slide5.xml><?xml version="1.0" encoding="utf-8"?>
 <p:sld xmlns:a="http://schemas.openxmlformats.org/drawingml/2006/main" xmlns:r="http://schemas.openxmlformats.org/officeDocument/2006/relationships" xmlns:p="http://schemas.openxmlformats.org/presentationml/2006/main">
   <p:cSld>
     <p:spTree>
@@ -8202,7 +10782,7 @@
           <p:cNvPr id="24" name="자유형: 도형 23">
             <a:extLst>
               <a:ext uri="{FF2B5EF4-FFF2-40B4-BE49-F238E27FC236}">
-                <a16:creationId xmlns:a16="http://schemas.microsoft.com/office/drawing/2014/main" id="{A18B4ADF-2D42-463F-82FC-EE3EEC434CE2}"/>
+                <a16:creationId xmlns:a16="http://schemas.microsoft.com/office/drawing/2014/main" xmlns="" id="{A18B4ADF-2D42-463F-82FC-EE3EEC434CE2}"/>
               </a:ext>
             </a:extLst>
           </p:cNvPr>
@@ -8306,7 +10886,7 @@
           <p:cNvPr id="21" name="직선 화살표 연결선 20">
             <a:extLst>
               <a:ext uri="{FF2B5EF4-FFF2-40B4-BE49-F238E27FC236}">
-                <a16:creationId xmlns:a16="http://schemas.microsoft.com/office/drawing/2014/main" id="{63FBEDD2-9FDD-4417-8099-C8AAE33FABFC}"/>
+                <a16:creationId xmlns:a16="http://schemas.microsoft.com/office/drawing/2014/main" xmlns="" id="{63FBEDD2-9FDD-4417-8099-C8AAE33FABFC}"/>
               </a:ext>
             </a:extLst>
           </p:cNvPr>
@@ -8354,7 +10934,7 @@
           <p:cNvPr id="18" name="직선 화살표 연결선 17">
             <a:extLst>
               <a:ext uri="{FF2B5EF4-FFF2-40B4-BE49-F238E27FC236}">
-                <a16:creationId xmlns:a16="http://schemas.microsoft.com/office/drawing/2014/main" id="{B4DDF3C4-C30E-465B-BFD6-9C6F153ECD21}"/>
+                <a16:creationId xmlns:a16="http://schemas.microsoft.com/office/drawing/2014/main" xmlns="" id="{B4DDF3C4-C30E-465B-BFD6-9C6F153ECD21}"/>
               </a:ext>
             </a:extLst>
           </p:cNvPr>
@@ -8402,7 +10982,7 @@
           <p:cNvPr id="13" name="직선 화살표 연결선 12">
             <a:extLst>
               <a:ext uri="{FF2B5EF4-FFF2-40B4-BE49-F238E27FC236}">
-                <a16:creationId xmlns:a16="http://schemas.microsoft.com/office/drawing/2014/main" id="{479EAD9D-DDD0-4CAE-8E4A-409E686834DF}"/>
+                <a16:creationId xmlns:a16="http://schemas.microsoft.com/office/drawing/2014/main" xmlns="" id="{479EAD9D-DDD0-4CAE-8E4A-409E686834DF}"/>
               </a:ext>
             </a:extLst>
           </p:cNvPr>
@@ -8441,7 +11021,7 @@
           <p:cNvPr id="14" name="직선 화살표 연결선 13">
             <a:extLst>
               <a:ext uri="{FF2B5EF4-FFF2-40B4-BE49-F238E27FC236}">
-                <a16:creationId xmlns:a16="http://schemas.microsoft.com/office/drawing/2014/main" id="{CF1D3714-B5A2-440B-A543-9AD09A05DCF9}"/>
+                <a16:creationId xmlns:a16="http://schemas.microsoft.com/office/drawing/2014/main" xmlns="" id="{CF1D3714-B5A2-440B-A543-9AD09A05DCF9}"/>
               </a:ext>
             </a:extLst>
           </p:cNvPr>
@@ -8480,14 +11060,14 @@
           </a:fontRef>
         </p:style>
       </p:cxnSp>
-      <mc:AlternateContent xmlns:mc="http://schemas.openxmlformats.org/markup-compatibility/2006">
-        <mc:Choice xmlns:a14="http://schemas.microsoft.com/office/drawing/2010/main" Requires="a14">
+      <mc:AlternateContent xmlns:mc="http://schemas.openxmlformats.org/markup-compatibility/2006" xmlns:a14="http://schemas.microsoft.com/office/drawing/2010/main">
+        <mc:Choice Requires="a14">
           <p:sp>
             <p:nvSpPr>
               <p:cNvPr id="39" name="TextBox 38">
                 <a:extLst>
                   <a:ext uri="{FF2B5EF4-FFF2-40B4-BE49-F238E27FC236}">
-                    <a16:creationId xmlns:a16="http://schemas.microsoft.com/office/drawing/2014/main" id="{FF1C23B8-2998-4007-8A52-6E605179BA34}"/>
+                    <a16:creationId xmlns:a16="http://schemas.microsoft.com/office/drawing/2014/main" xmlns="" id="{FF1C23B8-2998-4007-8A52-6E605179BA34}"/>
                   </a:ext>
                 </a:extLst>
               </p:cNvPr>
@@ -8526,7 +11106,7 @@
                               <a:solidFill>
                                 <a:schemeClr val="accent1"/>
                               </a:solidFill>
-                              <a:latin typeface="Cambria Math" panose="02040503050406030204" pitchFamily="18" charset="0"/>
+                              <a:latin typeface="Cambria Math"/>
                             </a:rPr>
                           </m:ctrlPr>
                         </m:dPr>
@@ -8546,7 +11126,7 @@
                                   <a:solidFill>
                                     <a:schemeClr val="accent1"/>
                                   </a:solidFill>
-                                  <a:latin typeface="Cambria Math" panose="02040503050406030204" pitchFamily="18" charset="0"/>
+                                  <a:latin typeface="Cambria Math"/>
                                 </a:rPr>
                               </m:ctrlPr>
                             </m:mPr>
@@ -8594,7 +11174,7 @@
             </p:txBody>
           </p:sp>
         </mc:Choice>
-        <mc:Fallback>
+        <mc:Fallback xmlns="">
           <p:sp>
             <p:nvSpPr>
               <p:cNvPr id="39" name="TextBox 38">
@@ -8639,14 +11219,14 @@
           </p:sp>
         </mc:Fallback>
       </mc:AlternateContent>
-      <mc:AlternateContent xmlns:mc="http://schemas.openxmlformats.org/markup-compatibility/2006">
-        <mc:Choice xmlns:a14="http://schemas.microsoft.com/office/drawing/2010/main" Requires="a14">
+      <mc:AlternateContent xmlns:mc="http://schemas.openxmlformats.org/markup-compatibility/2006" xmlns:a14="http://schemas.microsoft.com/office/drawing/2010/main">
+        <mc:Choice Requires="a14">
           <p:sp>
             <p:nvSpPr>
               <p:cNvPr id="41" name="TextBox 40">
                 <a:extLst>
                   <a:ext uri="{FF2B5EF4-FFF2-40B4-BE49-F238E27FC236}">
-                    <a16:creationId xmlns:a16="http://schemas.microsoft.com/office/drawing/2014/main" id="{A6FFDD7E-9292-42FD-8C42-EC950A10460A}"/>
+                    <a16:creationId xmlns:a16="http://schemas.microsoft.com/office/drawing/2014/main" xmlns="" id="{A6FFDD7E-9292-42FD-8C42-EC950A10460A}"/>
                   </a:ext>
                 </a:extLst>
               </p:cNvPr>
@@ -8686,7 +11266,7 @@
                                   <a:lumOff val="80000"/>
                                 </a:schemeClr>
                               </a:solidFill>
-                              <a:latin typeface="Cambria Math" panose="02040503050406030204" pitchFamily="18" charset="0"/>
+                              <a:latin typeface="Cambria Math"/>
                             </a:rPr>
                           </m:ctrlPr>
                         </m:sSubPr>
@@ -8731,7 +11311,7 @@
                                   <a:lumOff val="80000"/>
                                 </a:schemeClr>
                               </a:solidFill>
-                              <a:latin typeface="Cambria Math" panose="02040503050406030204" pitchFamily="18" charset="0"/>
+                              <a:latin typeface="Cambria Math"/>
                             </a:rPr>
                           </m:ctrlPr>
                         </m:dPr>
@@ -8754,7 +11334,7 @@
                                       <a:lumOff val="80000"/>
                                     </a:schemeClr>
                                   </a:solidFill>
-                                  <a:latin typeface="Cambria Math" panose="02040503050406030204" pitchFamily="18" charset="0"/>
+                                  <a:latin typeface="Cambria Math"/>
                                 </a:rPr>
                               </m:ctrlPr>
                             </m:mPr>
@@ -8811,7 +11391,7 @@
             </p:txBody>
           </p:sp>
         </mc:Choice>
-        <mc:Fallback>
+        <mc:Fallback xmlns="">
           <p:sp>
             <p:nvSpPr>
               <p:cNvPr id="41" name="TextBox 40">
@@ -8856,14 +11436,14 @@
           </p:sp>
         </mc:Fallback>
       </mc:AlternateContent>
-      <mc:AlternateContent xmlns:mc="http://schemas.openxmlformats.org/markup-compatibility/2006">
-        <mc:Choice xmlns:a14="http://schemas.microsoft.com/office/drawing/2010/main" Requires="a14">
+      <mc:AlternateContent xmlns:mc="http://schemas.openxmlformats.org/markup-compatibility/2006" xmlns:a14="http://schemas.microsoft.com/office/drawing/2010/main">
+        <mc:Choice Requires="a14">
           <p:sp>
             <p:nvSpPr>
               <p:cNvPr id="42" name="TextBox 41">
                 <a:extLst>
                   <a:ext uri="{FF2B5EF4-FFF2-40B4-BE49-F238E27FC236}">
-                    <a16:creationId xmlns:a16="http://schemas.microsoft.com/office/drawing/2014/main" id="{3167C7FE-2BED-4D69-9D09-8E641660B37F}"/>
+                    <a16:creationId xmlns:a16="http://schemas.microsoft.com/office/drawing/2014/main" xmlns="" id="{3167C7FE-2BED-4D69-9D09-8E641660B37F}"/>
                   </a:ext>
                 </a:extLst>
               </p:cNvPr>
@@ -8902,7 +11482,7 @@
                               <a:solidFill>
                                 <a:schemeClr val="accent2"/>
                               </a:solidFill>
-                              <a:latin typeface="Cambria Math" panose="02040503050406030204" pitchFamily="18" charset="0"/>
+                              <a:latin typeface="Cambria Math"/>
                             </a:rPr>
                           </m:ctrlPr>
                         </m:dPr>
@@ -8922,7 +11502,7 @@
                                   <a:solidFill>
                                     <a:schemeClr val="accent2"/>
                                   </a:solidFill>
-                                  <a:latin typeface="Cambria Math" panose="02040503050406030204" pitchFamily="18" charset="0"/>
+                                  <a:latin typeface="Cambria Math"/>
                                 </a:rPr>
                               </m:ctrlPr>
                             </m:mPr>
@@ -8967,7 +11547,7 @@
             </p:txBody>
           </p:sp>
         </mc:Choice>
-        <mc:Fallback>
+        <mc:Fallback xmlns="">
           <p:sp>
             <p:nvSpPr>
               <p:cNvPr id="42" name="TextBox 41">
@@ -9012,14 +11592,14 @@
           </p:sp>
         </mc:Fallback>
       </mc:AlternateContent>
-      <mc:AlternateContent xmlns:mc="http://schemas.openxmlformats.org/markup-compatibility/2006">
-        <mc:Choice xmlns:a14="http://schemas.microsoft.com/office/drawing/2010/main" Requires="a14">
+      <mc:AlternateContent xmlns:mc="http://schemas.openxmlformats.org/markup-compatibility/2006" xmlns:a14="http://schemas.microsoft.com/office/drawing/2010/main">
+        <mc:Choice Requires="a14">
           <p:sp>
             <p:nvSpPr>
               <p:cNvPr id="43" name="TextBox 42">
                 <a:extLst>
                   <a:ext uri="{FF2B5EF4-FFF2-40B4-BE49-F238E27FC236}">
-                    <a16:creationId xmlns:a16="http://schemas.microsoft.com/office/drawing/2014/main" id="{68C30D00-2045-4CBB-818E-7E315DBE5CB3}"/>
+                    <a16:creationId xmlns:a16="http://schemas.microsoft.com/office/drawing/2014/main" xmlns="" id="{68C30D00-2045-4CBB-818E-7E315DBE5CB3}"/>
                   </a:ext>
                 </a:extLst>
               </p:cNvPr>
@@ -9059,7 +11639,7 @@
                                   <a:lumOff val="80000"/>
                                 </a:schemeClr>
                               </a:solidFill>
-                              <a:latin typeface="Cambria Math" panose="02040503050406030204" pitchFamily="18" charset="0"/>
+                              <a:latin typeface="Cambria Math"/>
                             </a:rPr>
                           </m:ctrlPr>
                         </m:sSubPr>
@@ -9104,7 +11684,7 @@
                                   <a:lumOff val="80000"/>
                                 </a:schemeClr>
                               </a:solidFill>
-                              <a:latin typeface="Cambria Math" panose="02040503050406030204" pitchFamily="18" charset="0"/>
+                              <a:latin typeface="Cambria Math"/>
                             </a:rPr>
                           </m:ctrlPr>
                         </m:dPr>
@@ -9127,7 +11707,7 @@
                                       <a:lumOff val="80000"/>
                                     </a:schemeClr>
                                   </a:solidFill>
-                                  <a:latin typeface="Cambria Math" panose="02040503050406030204" pitchFamily="18" charset="0"/>
+                                  <a:latin typeface="Cambria Math"/>
                                 </a:rPr>
                               </m:ctrlPr>
                             </m:mPr>
@@ -9181,7 +11761,7 @@
             </p:txBody>
           </p:sp>
         </mc:Choice>
-        <mc:Fallback>
+        <mc:Fallback xmlns="">
           <p:sp>
             <p:nvSpPr>
               <p:cNvPr id="43" name="TextBox 42">
@@ -9231,7 +11811,7 @@
           <p:cNvPr id="49" name="직선 화살표 연결선 48">
             <a:extLst>
               <a:ext uri="{FF2B5EF4-FFF2-40B4-BE49-F238E27FC236}">
-                <a16:creationId xmlns:a16="http://schemas.microsoft.com/office/drawing/2014/main" id="{25ACF200-05F2-4660-92AE-B1A7B9F5D4B9}"/>
+                <a16:creationId xmlns:a16="http://schemas.microsoft.com/office/drawing/2014/main" xmlns="" id="{25ACF200-05F2-4660-92AE-B1A7B9F5D4B9}"/>
               </a:ext>
             </a:extLst>
           </p:cNvPr>
@@ -9279,7 +11859,7 @@
           <p:cNvPr id="50" name="직선 화살표 연결선 49">
             <a:extLst>
               <a:ext uri="{FF2B5EF4-FFF2-40B4-BE49-F238E27FC236}">
-                <a16:creationId xmlns:a16="http://schemas.microsoft.com/office/drawing/2014/main" id="{0F178B99-7DC6-4819-8EC6-929DF8488493}"/>
+                <a16:creationId xmlns:a16="http://schemas.microsoft.com/office/drawing/2014/main" xmlns="" id="{0F178B99-7DC6-4819-8EC6-929DF8488493}"/>
               </a:ext>
             </a:extLst>
           </p:cNvPr>
@@ -9322,14 +11902,14 @@
           </a:fontRef>
         </p:style>
       </p:cxnSp>
-      <mc:AlternateContent xmlns:mc="http://schemas.openxmlformats.org/markup-compatibility/2006">
-        <mc:Choice xmlns:a14="http://schemas.microsoft.com/office/drawing/2010/main" Requires="a14">
+      <mc:AlternateContent xmlns:mc="http://schemas.openxmlformats.org/markup-compatibility/2006" xmlns:a14="http://schemas.microsoft.com/office/drawing/2010/main">
+        <mc:Choice Requires="a14">
           <p:sp>
             <p:nvSpPr>
               <p:cNvPr id="17" name="TextBox 16">
                 <a:extLst>
                   <a:ext uri="{FF2B5EF4-FFF2-40B4-BE49-F238E27FC236}">
-                    <a16:creationId xmlns:a16="http://schemas.microsoft.com/office/drawing/2014/main" id="{49842504-4EBE-45F0-A4DC-E3E1155D1C7B}"/>
+                    <a16:creationId xmlns:a16="http://schemas.microsoft.com/office/drawing/2014/main" xmlns="" id="{49842504-4EBE-45F0-A4DC-E3E1155D1C7B}"/>
                   </a:ext>
                 </a:extLst>
               </p:cNvPr>
@@ -9374,7 +11954,7 @@
                               <a:effectLst/>
                               <a:uLnTx/>
                               <a:uFillTx/>
-                              <a:latin typeface="Cambria Math" panose="02040503050406030204" pitchFamily="18" charset="0"/>
+                              <a:latin typeface="Cambria Math"/>
                               <a:cs typeface="+mn-cs"/>
                             </a:rPr>
                           </m:ctrlPr>
@@ -9401,7 +11981,7 @@
                                   <a:effectLst/>
                                   <a:uLnTx/>
                                   <a:uFillTx/>
-                                  <a:latin typeface="Cambria Math" panose="02040503050406030204" pitchFamily="18" charset="0"/>
+                                  <a:latin typeface="Cambria Math"/>
                                   <a:cs typeface="+mn-cs"/>
                                 </a:rPr>
                               </m:ctrlPr>
@@ -9421,7 +12001,7 @@
                                         <a:effectLst/>
                                         <a:uLnTx/>
                                         <a:uFillTx/>
-                                        <a:latin typeface="Cambria Math" panose="02040503050406030204" pitchFamily="18" charset="0"/>
+                                        <a:latin typeface="Cambria Math"/>
                                         <a:cs typeface="+mn-cs"/>
                                       </a:rPr>
                                     </m:ctrlPr>
@@ -9480,7 +12060,7 @@
                                         <a:effectLst/>
                                         <a:uLnTx/>
                                         <a:uFillTx/>
-                                        <a:latin typeface="Cambria Math" panose="02040503050406030204" pitchFamily="18" charset="0"/>
+                                        <a:latin typeface="Cambria Math"/>
                                         <a:cs typeface="+mn-cs"/>
                                       </a:rPr>
                                     </m:ctrlPr>
@@ -9539,7 +12119,7 @@
             </p:txBody>
           </p:sp>
         </mc:Choice>
-        <mc:Fallback>
+        <mc:Fallback xmlns="">
           <p:sp>
             <p:nvSpPr>
               <p:cNvPr id="17" name="TextBox 16">
@@ -9584,14 +12164,14 @@
           </p:sp>
         </mc:Fallback>
       </mc:AlternateContent>
-      <mc:AlternateContent xmlns:mc="http://schemas.openxmlformats.org/markup-compatibility/2006">
-        <mc:Choice xmlns:a14="http://schemas.microsoft.com/office/drawing/2010/main" Requires="a14">
+      <mc:AlternateContent xmlns:mc="http://schemas.openxmlformats.org/markup-compatibility/2006" xmlns:a14="http://schemas.microsoft.com/office/drawing/2010/main">
+        <mc:Choice Requires="a14">
           <p:sp>
             <p:nvSpPr>
               <p:cNvPr id="19" name="TextBox 18">
                 <a:extLst>
                   <a:ext uri="{FF2B5EF4-FFF2-40B4-BE49-F238E27FC236}">
-                    <a16:creationId xmlns:a16="http://schemas.microsoft.com/office/drawing/2014/main" id="{3DFE12EC-016C-4325-902D-060AA87E4E2E}"/>
+                    <a16:creationId xmlns:a16="http://schemas.microsoft.com/office/drawing/2014/main" xmlns="" id="{3DFE12EC-016C-4325-902D-060AA87E4E2E}"/>
                   </a:ext>
                 </a:extLst>
               </p:cNvPr>
@@ -9628,7 +12208,7 @@
                               <a:solidFill>
                                 <a:schemeClr val="accent6"/>
                               </a:solidFill>
-                              <a:latin typeface="Cambria Math" panose="02040503050406030204" pitchFamily="18" charset="0"/>
+                              <a:latin typeface="Cambria Math"/>
                             </a:rPr>
                           </m:ctrlPr>
                         </m:funcPr>
@@ -9654,7 +12234,7 @@
                                   <a:solidFill>
                                     <a:schemeClr val="accent6"/>
                                   </a:solidFill>
-                                  <a:latin typeface="Cambria Math" panose="02040503050406030204" pitchFamily="18" charset="0"/>
+                                  <a:latin typeface="Cambria Math"/>
                                 </a:rPr>
                               </m:ctrlPr>
                             </m:dPr>
@@ -9668,7 +12248,7 @@
                                       <a:solidFill>
                                         <a:schemeClr val="accent6"/>
                                       </a:solidFill>
-                                      <a:latin typeface="Cambria Math" panose="02040503050406030204" pitchFamily="18" charset="0"/>
+                                      <a:latin typeface="Cambria Math"/>
                                     </a:rPr>
                                   </m:ctrlPr>
                                 </m:dPr>
@@ -9688,7 +12268,7 @@
                                           <a:solidFill>
                                             <a:schemeClr val="accent6"/>
                                           </a:solidFill>
-                                          <a:latin typeface="Cambria Math" panose="02040503050406030204" pitchFamily="18" charset="0"/>
+                                          <a:latin typeface="Cambria Math"/>
                                         </a:rPr>
                                       </m:ctrlPr>
                                     </m:mPr>
@@ -9715,7 +12295,7 @@
                                                 <a:solidFill>
                                                   <a:schemeClr val="accent6"/>
                                                 </a:solidFill>
-                                                <a:latin typeface="Cambria Math" panose="02040503050406030204" pitchFamily="18" charset="0"/>
+                                                <a:latin typeface="Cambria Math"/>
                                               </a:rPr>
                                             </m:ctrlPr>
                                           </m:sSubPr>
@@ -9764,7 +12344,7 @@
                                                 <a:solidFill>
                                                   <a:schemeClr val="accent6"/>
                                                 </a:solidFill>
-                                                <a:latin typeface="Cambria Math" panose="02040503050406030204" pitchFamily="18" charset="0"/>
+                                                <a:latin typeface="Cambria Math"/>
                                               </a:rPr>
                                             </m:ctrlPr>
                                           </m:sSubPr>
@@ -9812,7 +12392,7 @@
             </p:txBody>
           </p:sp>
         </mc:Choice>
-        <mc:Fallback>
+        <mc:Fallback xmlns="">
           <p:sp>
             <p:nvSpPr>
               <p:cNvPr id="19" name="TextBox 18">
@@ -9862,7 +12442,7 @@
           <p:cNvPr id="44" name="직선 화살표 연결선 43">
             <a:extLst>
               <a:ext uri="{FF2B5EF4-FFF2-40B4-BE49-F238E27FC236}">
-                <a16:creationId xmlns:a16="http://schemas.microsoft.com/office/drawing/2014/main" id="{408DA4CA-9C07-4C1F-816E-6FF32020E8EE}"/>
+                <a16:creationId xmlns:a16="http://schemas.microsoft.com/office/drawing/2014/main" xmlns="" id="{408DA4CA-9C07-4C1F-816E-6FF32020E8EE}"/>
               </a:ext>
             </a:extLst>
           </p:cNvPr>
@@ -9958,7 +12538,7 @@
     </a:clrScheme>
     <a:fontScheme name="Office">
       <a:majorFont>
-        <a:latin typeface="맑은 고딕" panose="020F0302020204030204"/>
+        <a:latin typeface="맑은 고딕"/>
         <a:ea typeface=""/>
         <a:cs typeface=""/>
         <a:font script="Jpan" typeface="游ゴシック Light"/>
@@ -10010,7 +12590,7 @@
         <a:font script="Tfng" typeface="Ebrima"/>
       </a:majorFont>
       <a:minorFont>
-        <a:latin typeface="맑은 고딕" panose="020F0502020204030204"/>
+        <a:latin typeface="맑은 고딕"/>
         <a:ea typeface=""/>
         <a:cs typeface=""/>
         <a:font script="Jpan" typeface="游ゴシック"/>
@@ -10204,7 +12784,7 @@
   <a:extraClrSchemeLst/>
   <a:extLst>
     <a:ext uri="{05A4C25C-085E-4340-85A3-A5531E510DB2}">
-      <thm15:themeFamily xmlns:thm15="http://schemas.microsoft.com/office/thememl/2012/main" name="Office Theme" id="{62F939B6-93AF-4DB8-9C6B-D6C7DFDC589F}" vid="{4A3C46E8-61CC-4603-A589-7422A47A8E4A}"/>
+      <thm15:themeFamily xmlns:thm15="http://schemas.microsoft.com/office/thememl/2012/main" xmlns="" name="Office Theme" id="{62F939B6-93AF-4DB8-9C6B-D6C7DFDC589F}" vid="{4A3C46E8-61CC-4603-A589-7422A47A8E4A}"/>
     </a:ext>
   </a:extLst>
 </a:theme>

</xml_diff>